<commit_message>
lecturer's code in 4th day afternoon
</commit_message>
<xml_diff>
--- a/lecturer/20150604.pptx
+++ b/lecturer/20150604.pptx
@@ -8,6 +8,23 @@
     <p:sldId id="256" r:id="rId2"/>
     <p:sldId id="257" r:id="rId3"/>
     <p:sldId id="258" r:id="rId4"/>
+    <p:sldId id="259" r:id="rId5"/>
+    <p:sldId id="260" r:id="rId6"/>
+    <p:sldId id="261" r:id="rId7"/>
+    <p:sldId id="262" r:id="rId8"/>
+    <p:sldId id="263" r:id="rId9"/>
+    <p:sldId id="264" r:id="rId10"/>
+    <p:sldId id="265" r:id="rId11"/>
+    <p:sldId id="266" r:id="rId12"/>
+    <p:sldId id="267" r:id="rId13"/>
+    <p:sldId id="268" r:id="rId14"/>
+    <p:sldId id="269" r:id="rId15"/>
+    <p:sldId id="270" r:id="rId16"/>
+    <p:sldId id="271" r:id="rId17"/>
+    <p:sldId id="272" r:id="rId18"/>
+    <p:sldId id="273" r:id="rId19"/>
+    <p:sldId id="274" r:id="rId20"/>
+    <p:sldId id="275" r:id="rId21"/>
   </p:sldIdLst>
   <p:sldSz cx="12192000" cy="6858000"/>
   <p:notesSz cx="6858000" cy="9144000"/>
@@ -3317,6 +3334,2764 @@
 </p:sld>
 </file>
 
+<file path=ppt/slides/slide10.xml><?xml version="1.0" encoding="utf-8"?>
+<p:sld xmlns:a="http://schemas.openxmlformats.org/drawingml/2006/main" xmlns:r="http://schemas.openxmlformats.org/officeDocument/2006/relationships" xmlns:p="http://schemas.openxmlformats.org/presentationml/2006/main">
+  <p:cSld>
+    <p:spTree>
+      <p:nvGrpSpPr>
+        <p:cNvPr id="1" name=""/>
+        <p:cNvGrpSpPr/>
+        <p:nvPr/>
+      </p:nvGrpSpPr>
+      <p:grpSpPr>
+        <a:xfrm>
+          <a:off x="0" y="0"/>
+          <a:ext cx="0" cy="0"/>
+          <a:chOff x="0" y="0"/>
+          <a:chExt cx="0" cy="0"/>
+        </a:xfrm>
+      </p:grpSpPr>
+      <p:sp>
+        <p:nvSpPr>
+          <p:cNvPr id="4" name="TextBox 3"/>
+          <p:cNvSpPr txBox="1"/>
+          <p:nvPr/>
+        </p:nvSpPr>
+        <p:spPr>
+          <a:xfrm>
+            <a:off x="298174" y="427383"/>
+            <a:ext cx="10572125" cy="4093428"/>
+          </a:xfrm>
+          <a:prstGeom prst="rect">
+            <a:avLst/>
+          </a:prstGeom>
+          <a:noFill/>
+        </p:spPr>
+        <p:txBody>
+          <a:bodyPr wrap="none" rtlCol="0">
+            <a:spAutoFit/>
+          </a:bodyPr>
+          <a:lstStyle/>
+          <a:p>
+            <a:r>
+              <a:rPr lang="en-US" altLang="ko-KR" sz="2000" smtClean="0">
+                <a:latin typeface="나눔고딕코딩" panose="020D0009000000000000" pitchFamily="49" charset="-127"/>
+                <a:ea typeface="나눔고딕코딩" panose="020D0009000000000000" pitchFamily="49" charset="-127"/>
+              </a:rPr>
+              <a:t>&lt; PDK </a:t>
+            </a:r>
+            <a:r>
+              <a:rPr lang="ko-KR" altLang="en-US" sz="2000" smtClean="0">
+                <a:latin typeface="나눔고딕코딩" panose="020D0009000000000000" pitchFamily="49" charset="-127"/>
+                <a:ea typeface="나눔고딕코딩" panose="020D0009000000000000" pitchFamily="49" charset="-127"/>
+              </a:rPr>
+              <a:t>제약 조건 </a:t>
+            </a:r>
+            <a:r>
+              <a:rPr lang="en-US" altLang="ko-KR" sz="2000" smtClean="0">
+                <a:latin typeface="나눔고딕코딩" panose="020D0009000000000000" pitchFamily="49" charset="-127"/>
+                <a:ea typeface="나눔고딕코딩" panose="020D0009000000000000" pitchFamily="49" charset="-127"/>
+              </a:rPr>
+              <a:t>&gt;</a:t>
+            </a:r>
+          </a:p>
+          <a:p>
+            <a:r>
+              <a:rPr lang="en-US" altLang="ko-KR" sz="2000" smtClean="0">
+                <a:latin typeface="나눔고딕코딩" panose="020D0009000000000000" pitchFamily="49" charset="-127"/>
+                <a:ea typeface="나눔고딕코딩" panose="020D0009000000000000" pitchFamily="49" charset="-127"/>
+              </a:rPr>
+              <a:t>-&gt; </a:t>
+            </a:r>
+            <a:r>
+              <a:rPr lang="ko-KR" altLang="en-US" sz="2000" smtClean="0">
+                <a:latin typeface="나눔고딕코딩" panose="020D0009000000000000" pitchFamily="49" charset="-127"/>
+                <a:ea typeface="나눔고딕코딩" panose="020D0009000000000000" pitchFamily="49" charset="-127"/>
+              </a:rPr>
+              <a:t>반드시 </a:t>
+            </a:r>
+            <a:r>
+              <a:rPr lang="ko-KR" altLang="en-US" sz="2000" smtClean="0">
+                <a:solidFill>
+                  <a:srgbClr val="FF0000"/>
+                </a:solidFill>
+                <a:latin typeface="나눔고딕코딩" panose="020D0009000000000000" pitchFamily="49" charset="-127"/>
+                <a:ea typeface="나눔고딕코딩" panose="020D0009000000000000" pitchFamily="49" charset="-127"/>
+              </a:rPr>
+              <a:t>프로젝트 폴더는 </a:t>
+            </a:r>
+            <a:r>
+              <a:rPr lang="en-US" altLang="ko-KR" sz="2000" smtClean="0">
+                <a:solidFill>
+                  <a:srgbClr val="FF0000"/>
+                </a:solidFill>
+                <a:latin typeface="나눔고딕코딩" panose="020D0009000000000000" pitchFamily="49" charset="-127"/>
+                <a:ea typeface="나눔고딕코딩" panose="020D0009000000000000" pitchFamily="49" charset="-127"/>
+              </a:rPr>
+              <a:t>aosp </a:t>
+            </a:r>
+            <a:r>
+              <a:rPr lang="ko-KR" altLang="en-US" sz="2000" smtClean="0">
+                <a:solidFill>
+                  <a:srgbClr val="FF0000"/>
+                </a:solidFill>
+                <a:latin typeface="나눔고딕코딩" panose="020D0009000000000000" pitchFamily="49" charset="-127"/>
+                <a:ea typeface="나눔고딕코딩" panose="020D0009000000000000" pitchFamily="49" charset="-127"/>
+              </a:rPr>
+              <a:t>폴더 내에서 작업</a:t>
+            </a:r>
+            <a:endParaRPr lang="en-US" altLang="ko-KR" sz="2000" smtClean="0">
+              <a:solidFill>
+                <a:srgbClr val="FF0000"/>
+              </a:solidFill>
+              <a:latin typeface="나눔고딕코딩" panose="020D0009000000000000" pitchFamily="49" charset="-127"/>
+              <a:ea typeface="나눔고딕코딩" panose="020D0009000000000000" pitchFamily="49" charset="-127"/>
+            </a:endParaRPr>
+          </a:p>
+          <a:p>
+            <a:r>
+              <a:rPr lang="ko-KR" altLang="en-US" sz="2000" smtClean="0">
+                <a:latin typeface="나눔고딕코딩" panose="020D0009000000000000" pitchFamily="49" charset="-127"/>
+                <a:ea typeface="나눔고딕코딩" panose="020D0009000000000000" pitchFamily="49" charset="-127"/>
+              </a:rPr>
+              <a:t>현재 우리의 과정에서는 </a:t>
+            </a:r>
+            <a:r>
+              <a:rPr lang="en-US" altLang="ko-KR" sz="2000" smtClean="0">
+                <a:latin typeface="나눔고딕코딩" panose="020D0009000000000000" pitchFamily="49" charset="-127"/>
+                <a:ea typeface="나눔고딕코딩" panose="020D0009000000000000" pitchFamily="49" charset="-127"/>
+              </a:rPr>
+              <a:t>android-google </a:t>
+            </a:r>
+            <a:r>
+              <a:rPr lang="ko-KR" altLang="en-US" sz="2000" smtClean="0">
+                <a:latin typeface="나눔고딕코딩" panose="020D0009000000000000" pitchFamily="49" charset="-127"/>
+                <a:ea typeface="나눔고딕코딩" panose="020D0009000000000000" pitchFamily="49" charset="-127"/>
+              </a:rPr>
+              <a:t>폴더가 바로 </a:t>
+            </a:r>
+            <a:r>
+              <a:rPr lang="en-US" altLang="ko-KR" sz="2000" smtClean="0">
+                <a:latin typeface="나눔고딕코딩" panose="020D0009000000000000" pitchFamily="49" charset="-127"/>
+                <a:ea typeface="나눔고딕코딩" panose="020D0009000000000000" pitchFamily="49" charset="-127"/>
+              </a:rPr>
+              <a:t>aosp </a:t>
+            </a:r>
+            <a:r>
+              <a:rPr lang="ko-KR" altLang="en-US" sz="2000" smtClean="0">
+                <a:latin typeface="나눔고딕코딩" panose="020D0009000000000000" pitchFamily="49" charset="-127"/>
+                <a:ea typeface="나눔고딕코딩" panose="020D0009000000000000" pitchFamily="49" charset="-127"/>
+              </a:rPr>
+              <a:t>폴더 입니다</a:t>
+            </a:r>
+            <a:r>
+              <a:rPr lang="en-US" altLang="ko-KR" sz="2000" smtClean="0">
+                <a:latin typeface="나눔고딕코딩" panose="020D0009000000000000" pitchFamily="49" charset="-127"/>
+                <a:ea typeface="나눔고딕코딩" panose="020D0009000000000000" pitchFamily="49" charset="-127"/>
+              </a:rPr>
+              <a:t>.</a:t>
+            </a:r>
+          </a:p>
+          <a:p>
+            <a:endParaRPr lang="en-US" altLang="ko-KR" sz="2000">
+              <a:latin typeface="나눔고딕코딩" panose="020D0009000000000000" pitchFamily="49" charset="-127"/>
+              <a:ea typeface="나눔고딕코딩" panose="020D0009000000000000" pitchFamily="49" charset="-127"/>
+            </a:endParaRPr>
+          </a:p>
+          <a:p>
+            <a:endParaRPr lang="en-US" altLang="ko-KR" sz="2000" smtClean="0">
+              <a:latin typeface="나눔고딕코딩" panose="020D0009000000000000" pitchFamily="49" charset="-127"/>
+              <a:ea typeface="나눔고딕코딩" panose="020D0009000000000000" pitchFamily="49" charset="-127"/>
+            </a:endParaRPr>
+          </a:p>
+          <a:p>
+            <a:r>
+              <a:rPr lang="en-US" altLang="ko-KR" sz="2000" smtClean="0">
+                <a:latin typeface="나눔고딕코딩" panose="020D0009000000000000" pitchFamily="49" charset="-127"/>
+                <a:ea typeface="나눔고딕코딩" panose="020D0009000000000000" pitchFamily="49" charset="-127"/>
+              </a:rPr>
+              <a:t>1. PDK </a:t>
+            </a:r>
+            <a:r>
+              <a:rPr lang="ko-KR" altLang="en-US" sz="2000" smtClean="0">
+                <a:latin typeface="나눔고딕코딩" panose="020D0009000000000000" pitchFamily="49" charset="-127"/>
+                <a:ea typeface="나눔고딕코딩" panose="020D0009000000000000" pitchFamily="49" charset="-127"/>
+              </a:rPr>
+              <a:t>빌드를 위한 환경 변수 로딩</a:t>
+            </a:r>
+            <a:endParaRPr lang="en-US" altLang="ko-KR" sz="2000" smtClean="0">
+              <a:latin typeface="나눔고딕코딩" panose="020D0009000000000000" pitchFamily="49" charset="-127"/>
+              <a:ea typeface="나눔고딕코딩" panose="020D0009000000000000" pitchFamily="49" charset="-127"/>
+            </a:endParaRPr>
+          </a:p>
+          <a:p>
+            <a:r>
+              <a:rPr lang="ko-KR" altLang="en-US" sz="2000" smtClean="0">
+                <a:latin typeface="나눔고딕코딩" panose="020D0009000000000000" pitchFamily="49" charset="-127"/>
+                <a:ea typeface="나눔고딕코딩" panose="020D0009000000000000" pitchFamily="49" charset="-127"/>
+              </a:rPr>
+              <a:t>먼저 </a:t>
+            </a:r>
+            <a:r>
+              <a:rPr lang="en-US" altLang="ko-KR" sz="2000" smtClean="0">
+                <a:latin typeface="나눔고딕코딩" panose="020D0009000000000000" pitchFamily="49" charset="-127"/>
+                <a:ea typeface="나눔고딕코딩" panose="020D0009000000000000" pitchFamily="49" charset="-127"/>
+              </a:rPr>
+              <a:t>aosp </a:t>
+            </a:r>
+            <a:r>
+              <a:rPr lang="ko-KR" altLang="en-US" sz="2000" smtClean="0">
+                <a:latin typeface="나눔고딕코딩" panose="020D0009000000000000" pitchFamily="49" charset="-127"/>
+                <a:ea typeface="나눔고딕코딩" panose="020D0009000000000000" pitchFamily="49" charset="-127"/>
+              </a:rPr>
+              <a:t>폴더로 이동합니다</a:t>
+            </a:r>
+            <a:r>
+              <a:rPr lang="en-US" altLang="ko-KR" sz="2000" smtClean="0">
+                <a:latin typeface="나눔고딕코딩" panose="020D0009000000000000" pitchFamily="49" charset="-127"/>
+                <a:ea typeface="나눔고딕코딩" panose="020D0009000000000000" pitchFamily="49" charset="-127"/>
+              </a:rPr>
+              <a:t>.</a:t>
+            </a:r>
+          </a:p>
+          <a:p>
+            <a:r>
+              <a:rPr lang="en-US" altLang="ko-KR" sz="2000" smtClean="0">
+                <a:latin typeface="나눔고딕코딩" panose="020D0009000000000000" pitchFamily="49" charset="-127"/>
+                <a:ea typeface="나눔고딕코딩" panose="020D0009000000000000" pitchFamily="49" charset="-127"/>
+              </a:rPr>
+              <a:t># cd ~/android-google</a:t>
+            </a:r>
+          </a:p>
+          <a:p>
+            <a:r>
+              <a:rPr lang="en-US" altLang="ko-KR" sz="2000" smtClean="0">
+                <a:latin typeface="나눔고딕코딩" panose="020D0009000000000000" pitchFamily="49" charset="-127"/>
+                <a:ea typeface="나눔고딕코딩" panose="020D0009000000000000" pitchFamily="49" charset="-127"/>
+              </a:rPr>
+              <a:t># ls</a:t>
+            </a:r>
+          </a:p>
+          <a:p>
+            <a:r>
+              <a:rPr lang="en-US" altLang="ko-KR" sz="2000" smtClean="0">
+                <a:latin typeface="나눔고딕코딩" panose="020D0009000000000000" pitchFamily="49" charset="-127"/>
+                <a:ea typeface="나눔고딕코딩" panose="020D0009000000000000" pitchFamily="49" charset="-127"/>
+              </a:rPr>
+              <a:t>Makefile  bionic    cts          device      hardware         ndk       prebuilts</a:t>
+            </a:r>
+          </a:p>
+          <a:p>
+            <a:r>
+              <a:rPr lang="en-US" altLang="ko-KR" sz="2000" smtClean="0">
+                <a:latin typeface="나눔고딕코딩" panose="020D0009000000000000" pitchFamily="49" charset="-127"/>
+                <a:ea typeface="나눔고딕코딩" panose="020D0009000000000000" pitchFamily="49" charset="-127"/>
+              </a:rPr>
+              <a:t>abi       bootable  dalvik       docs        java_tags        </a:t>
+            </a:r>
+            <a:r>
+              <a:rPr lang="en-US" altLang="ko-KR" sz="2000" smtClean="0">
+                <a:solidFill>
+                  <a:srgbClr val="FF0000"/>
+                </a:solidFill>
+                <a:latin typeface="나눔고딕코딩" panose="020D0009000000000000" pitchFamily="49" charset="-127"/>
+                <a:ea typeface="나눔고딕코딩" panose="020D0009000000000000" pitchFamily="49" charset="-127"/>
+              </a:rPr>
+              <a:t>out</a:t>
+            </a:r>
+            <a:r>
+              <a:rPr lang="en-US" altLang="ko-KR" sz="2000" smtClean="0">
+                <a:latin typeface="나눔고딕코딩" panose="020D0009000000000000" pitchFamily="49" charset="-127"/>
+                <a:ea typeface="나눔고딕코딩" panose="020D0009000000000000" pitchFamily="49" charset="-127"/>
+              </a:rPr>
+              <a:t>       sdk</a:t>
+            </a:r>
+          </a:p>
+          <a:p>
+            <a:r>
+              <a:rPr lang="en-US" altLang="ko-KR" sz="2000" smtClean="0">
+                <a:latin typeface="나눔고딕코딩" panose="020D0009000000000000" pitchFamily="49" charset="-127"/>
+                <a:ea typeface="나눔고딕코딩" panose="020D0009000000000000" pitchFamily="49" charset="-127"/>
+              </a:rPr>
+              <a:t>art       </a:t>
+            </a:r>
+            <a:r>
+              <a:rPr lang="en-US" altLang="ko-KR" sz="2000" smtClean="0">
+                <a:solidFill>
+                  <a:srgbClr val="FF0000"/>
+                </a:solidFill>
+                <a:latin typeface="나눔고딕코딩" panose="020D0009000000000000" pitchFamily="49" charset="-127"/>
+                <a:ea typeface="나눔고딕코딩" panose="020D0009000000000000" pitchFamily="49" charset="-127"/>
+              </a:rPr>
+              <a:t>build</a:t>
+            </a:r>
+            <a:r>
+              <a:rPr lang="en-US" altLang="ko-KR" sz="2000" smtClean="0">
+                <a:latin typeface="나눔고딕코딩" panose="020D0009000000000000" pitchFamily="49" charset="-127"/>
+                <a:ea typeface="나눔고딕코딩" panose="020D0009000000000000" pitchFamily="49" charset="-127"/>
+              </a:rPr>
+              <a:t>     developers   external    libcore          packages  system</a:t>
+            </a:r>
+          </a:p>
+          <a:p>
+            <a:r>
+              <a:rPr lang="en-US" altLang="ko-KR" sz="2000" smtClean="0">
+                <a:latin typeface="나눔고딕코딩" panose="020D0009000000000000" pitchFamily="49" charset="-127"/>
+                <a:ea typeface="나눔고딕코딩" panose="020D0009000000000000" pitchFamily="49" charset="-127"/>
+              </a:rPr>
+              <a:t>asm_tags  c_tags    development  frameworks  libnativehelper  pdk       tools</a:t>
+            </a:r>
+            <a:endParaRPr lang="ko-KR" altLang="en-US" sz="2000" smtClean="0">
+              <a:latin typeface="나눔고딕코딩" panose="020D0009000000000000" pitchFamily="49" charset="-127"/>
+              <a:ea typeface="나눔고딕코딩" panose="020D0009000000000000" pitchFamily="49" charset="-127"/>
+            </a:endParaRPr>
+          </a:p>
+        </p:txBody>
+      </p:sp>
+    </p:spTree>
+    <p:extLst>
+      <p:ext uri="{BB962C8B-B14F-4D97-AF65-F5344CB8AC3E}">
+        <p14:creationId xmlns:p14="http://schemas.microsoft.com/office/powerpoint/2010/main" val="4162864155"/>
+      </p:ext>
+    </p:extLst>
+  </p:cSld>
+  <p:clrMapOvr>
+    <a:masterClrMapping/>
+  </p:clrMapOvr>
+</p:sld>
+</file>
+
+<file path=ppt/slides/slide11.xml><?xml version="1.0" encoding="utf-8"?>
+<p:sld xmlns:a="http://schemas.openxmlformats.org/drawingml/2006/main" xmlns:r="http://schemas.openxmlformats.org/officeDocument/2006/relationships" xmlns:p="http://schemas.openxmlformats.org/presentationml/2006/main">
+  <p:cSld>
+    <p:spTree>
+      <p:nvGrpSpPr>
+        <p:cNvPr id="1" name=""/>
+        <p:cNvGrpSpPr/>
+        <p:nvPr/>
+      </p:nvGrpSpPr>
+      <p:grpSpPr>
+        <a:xfrm>
+          <a:off x="0" y="0"/>
+          <a:ext cx="0" cy="0"/>
+          <a:chOff x="0" y="0"/>
+          <a:chExt cx="0" cy="0"/>
+        </a:xfrm>
+      </p:grpSpPr>
+      <p:sp>
+        <p:nvSpPr>
+          <p:cNvPr id="4" name="TextBox 3"/>
+          <p:cNvSpPr txBox="1"/>
+          <p:nvPr/>
+        </p:nvSpPr>
+        <p:spPr>
+          <a:xfrm>
+            <a:off x="298174" y="427383"/>
+            <a:ext cx="8648521" cy="5324535"/>
+          </a:xfrm>
+          <a:prstGeom prst="rect">
+            <a:avLst/>
+          </a:prstGeom>
+          <a:noFill/>
+        </p:spPr>
+        <p:txBody>
+          <a:bodyPr wrap="none" rtlCol="0">
+            <a:spAutoFit/>
+          </a:bodyPr>
+          <a:lstStyle/>
+          <a:p>
+            <a:r>
+              <a:rPr lang="en-US" altLang="ko-KR" sz="2000" smtClean="0">
+                <a:latin typeface="나눔고딕코딩" panose="020D0009000000000000" pitchFamily="49" charset="-127"/>
+                <a:ea typeface="나눔고딕코딩" panose="020D0009000000000000" pitchFamily="49" charset="-127"/>
+              </a:rPr>
+              <a:t># . build/envsetup.sh </a:t>
+            </a:r>
+            <a:r>
+              <a:rPr lang="ko-KR" altLang="en-US" sz="2000" smtClean="0">
+                <a:latin typeface="나눔고딕코딩" panose="020D0009000000000000" pitchFamily="49" charset="-127"/>
+                <a:ea typeface="나눔고딕코딩" panose="020D0009000000000000" pitchFamily="49" charset="-127"/>
+              </a:rPr>
+              <a:t>또는 </a:t>
+            </a:r>
+            <a:r>
+              <a:rPr lang="en-US" altLang="ko-KR" sz="2000" smtClean="0">
+                <a:latin typeface="나눔고딕코딩" panose="020D0009000000000000" pitchFamily="49" charset="-127"/>
+                <a:ea typeface="나눔고딕코딩" panose="020D0009000000000000" pitchFamily="49" charset="-127"/>
+              </a:rPr>
+              <a:t># source build/envsetup.sh</a:t>
+            </a:r>
+          </a:p>
+          <a:p>
+            <a:r>
+              <a:rPr lang="en-US" altLang="ko-KR" sz="2000" smtClean="0">
+                <a:latin typeface="나눔고딕코딩" panose="020D0009000000000000" pitchFamily="49" charset="-127"/>
+                <a:ea typeface="나눔고딕코딩" panose="020D0009000000000000" pitchFamily="49" charset="-127"/>
+              </a:rPr>
+              <a:t>including device/generic/mini-emulator-arm64/vendorsetup.sh</a:t>
+            </a:r>
+          </a:p>
+          <a:p>
+            <a:r>
+              <a:rPr lang="en-US" altLang="ko-KR" sz="2000" smtClean="0">
+                <a:latin typeface="나눔고딕코딩" panose="020D0009000000000000" pitchFamily="49" charset="-127"/>
+                <a:ea typeface="나눔고딕코딩" panose="020D0009000000000000" pitchFamily="49" charset="-127"/>
+              </a:rPr>
+              <a:t>including device/generic/mini-emulator-armv7-a-neon/vendorsetup.sh</a:t>
+            </a:r>
+          </a:p>
+          <a:p>
+            <a:r>
+              <a:rPr lang="en-US" altLang="ko-KR" sz="2000" smtClean="0">
+                <a:latin typeface="나눔고딕코딩" panose="020D0009000000000000" pitchFamily="49" charset="-127"/>
+                <a:ea typeface="나눔고딕코딩" panose="020D0009000000000000" pitchFamily="49" charset="-127"/>
+              </a:rPr>
+              <a:t>including device/generic/mini-emulator-x86/vendorsetup.sh</a:t>
+            </a:r>
+          </a:p>
+          <a:p>
+            <a:r>
+              <a:rPr lang="en-US" altLang="ko-KR" sz="2000" smtClean="0">
+                <a:latin typeface="나눔고딕코딩" panose="020D0009000000000000" pitchFamily="49" charset="-127"/>
+                <a:ea typeface="나눔고딕코딩" panose="020D0009000000000000" pitchFamily="49" charset="-127"/>
+              </a:rPr>
+              <a:t>including device/generic/mini-emulator-mips/vendorsetup.sh</a:t>
+            </a:r>
+          </a:p>
+          <a:p>
+            <a:r>
+              <a:rPr lang="en-US" altLang="ko-KR" sz="2000" smtClean="0">
+                <a:latin typeface="나눔고딕코딩" panose="020D0009000000000000" pitchFamily="49" charset="-127"/>
+                <a:ea typeface="나눔고딕코딩" panose="020D0009000000000000" pitchFamily="49" charset="-127"/>
+              </a:rPr>
+              <a:t>including device/generic/mini-emulator-x86_64/vendorsetup.sh</a:t>
+            </a:r>
+          </a:p>
+          <a:p>
+            <a:r>
+              <a:rPr lang="en-US" altLang="ko-KR" sz="2000" smtClean="0">
+                <a:latin typeface="나눔고딕코딩" panose="020D0009000000000000" pitchFamily="49" charset="-127"/>
+                <a:ea typeface="나눔고딕코딩" panose="020D0009000000000000" pitchFamily="49" charset="-127"/>
+              </a:rPr>
+              <a:t>including device/lge/mako/vendorsetup.sh</a:t>
+            </a:r>
+          </a:p>
+          <a:p>
+            <a:r>
+              <a:rPr lang="en-US" altLang="ko-KR" sz="2000" smtClean="0">
+                <a:latin typeface="나눔고딕코딩" panose="020D0009000000000000" pitchFamily="49" charset="-127"/>
+                <a:ea typeface="나눔고딕코딩" panose="020D0009000000000000" pitchFamily="49" charset="-127"/>
+              </a:rPr>
+              <a:t>including device/lge/hammerhead/vendorsetup.sh</a:t>
+            </a:r>
+          </a:p>
+          <a:p>
+            <a:r>
+              <a:rPr lang="en-US" altLang="ko-KR" sz="2000" smtClean="0">
+                <a:latin typeface="나눔고딕코딩" panose="020D0009000000000000" pitchFamily="49" charset="-127"/>
+                <a:ea typeface="나눔고딕코딩" panose="020D0009000000000000" pitchFamily="49" charset="-127"/>
+              </a:rPr>
+              <a:t>including device/samsung/manta/vendorsetup.sh</a:t>
+            </a:r>
+          </a:p>
+          <a:p>
+            <a:r>
+              <a:rPr lang="en-US" altLang="ko-KR" sz="2000" smtClean="0">
+                <a:latin typeface="나눔고딕코딩" panose="020D0009000000000000" pitchFamily="49" charset="-127"/>
+                <a:ea typeface="나눔고딕코딩" panose="020D0009000000000000" pitchFamily="49" charset="-127"/>
+              </a:rPr>
+              <a:t>including device/moto/shamu/vendorsetup.sh</a:t>
+            </a:r>
+          </a:p>
+          <a:p>
+            <a:r>
+              <a:rPr lang="en-US" altLang="ko-KR" sz="2000" smtClean="0">
+                <a:latin typeface="나눔고딕코딩" panose="020D0009000000000000" pitchFamily="49" charset="-127"/>
+                <a:ea typeface="나눔고딕코딩" panose="020D0009000000000000" pitchFamily="49" charset="-127"/>
+              </a:rPr>
+              <a:t>including device/asus/fugu/vendorsetup.sh</a:t>
+            </a:r>
+          </a:p>
+          <a:p>
+            <a:r>
+              <a:rPr lang="en-US" altLang="ko-KR" sz="2000" smtClean="0">
+                <a:latin typeface="나눔고딕코딩" panose="020D0009000000000000" pitchFamily="49" charset="-127"/>
+                <a:ea typeface="나눔고딕코딩" panose="020D0009000000000000" pitchFamily="49" charset="-127"/>
+              </a:rPr>
+              <a:t>including device/asus/deb/vendorsetup.sh</a:t>
+            </a:r>
+          </a:p>
+          <a:p>
+            <a:r>
+              <a:rPr lang="en-US" altLang="ko-KR" sz="2000" smtClean="0">
+                <a:latin typeface="나눔고딕코딩" panose="020D0009000000000000" pitchFamily="49" charset="-127"/>
+                <a:ea typeface="나눔고딕코딩" panose="020D0009000000000000" pitchFamily="49" charset="-127"/>
+              </a:rPr>
+              <a:t>including device/asus/grouper/vendorsetup.sh</a:t>
+            </a:r>
+          </a:p>
+          <a:p>
+            <a:r>
+              <a:rPr lang="en-US" altLang="ko-KR" sz="2000" smtClean="0">
+                <a:latin typeface="나눔고딕코딩" panose="020D0009000000000000" pitchFamily="49" charset="-127"/>
+                <a:ea typeface="나눔고딕코딩" panose="020D0009000000000000" pitchFamily="49" charset="-127"/>
+              </a:rPr>
+              <a:t>including device/asus/tilapia/vendorsetup.sh</a:t>
+            </a:r>
+          </a:p>
+          <a:p>
+            <a:r>
+              <a:rPr lang="en-US" altLang="ko-KR" sz="2000" smtClean="0">
+                <a:latin typeface="나눔고딕코딩" panose="020D0009000000000000" pitchFamily="49" charset="-127"/>
+                <a:ea typeface="나눔고딕코딩" panose="020D0009000000000000" pitchFamily="49" charset="-127"/>
+              </a:rPr>
+              <a:t>including device/asus/flo/vendorsetup.sh</a:t>
+            </a:r>
+          </a:p>
+          <a:p>
+            <a:r>
+              <a:rPr lang="en-US" altLang="ko-KR" sz="2000" smtClean="0">
+                <a:latin typeface="나눔고딕코딩" panose="020D0009000000000000" pitchFamily="49" charset="-127"/>
+                <a:ea typeface="나눔고딕코딩" panose="020D0009000000000000" pitchFamily="49" charset="-127"/>
+              </a:rPr>
+              <a:t>including sdk/bash_completion/adb.bash</a:t>
+            </a:r>
+          </a:p>
+          <a:p>
+            <a:endParaRPr lang="ko-KR" altLang="en-US" sz="2000" smtClean="0">
+              <a:latin typeface="나눔고딕코딩" panose="020D0009000000000000" pitchFamily="49" charset="-127"/>
+              <a:ea typeface="나눔고딕코딩" panose="020D0009000000000000" pitchFamily="49" charset="-127"/>
+            </a:endParaRPr>
+          </a:p>
+        </p:txBody>
+      </p:sp>
+    </p:spTree>
+    <p:extLst>
+      <p:ext uri="{BB962C8B-B14F-4D97-AF65-F5344CB8AC3E}">
+        <p14:creationId xmlns:p14="http://schemas.microsoft.com/office/powerpoint/2010/main" val="1929866452"/>
+      </p:ext>
+    </p:extLst>
+  </p:cSld>
+  <p:clrMapOvr>
+    <a:masterClrMapping/>
+  </p:clrMapOvr>
+</p:sld>
+</file>
+
+<file path=ppt/slides/slide12.xml><?xml version="1.0" encoding="utf-8"?>
+<p:sld xmlns:a="http://schemas.openxmlformats.org/drawingml/2006/main" xmlns:r="http://schemas.openxmlformats.org/officeDocument/2006/relationships" xmlns:p="http://schemas.openxmlformats.org/presentationml/2006/main">
+  <p:cSld>
+    <p:spTree>
+      <p:nvGrpSpPr>
+        <p:cNvPr id="1" name=""/>
+        <p:cNvGrpSpPr/>
+        <p:nvPr/>
+      </p:nvGrpSpPr>
+      <p:grpSpPr>
+        <a:xfrm>
+          <a:off x="0" y="0"/>
+          <a:ext cx="0" cy="0"/>
+          <a:chOff x="0" y="0"/>
+          <a:chExt cx="0" cy="0"/>
+        </a:xfrm>
+      </p:grpSpPr>
+      <p:sp>
+        <p:nvSpPr>
+          <p:cNvPr id="4" name="TextBox 3"/>
+          <p:cNvSpPr txBox="1"/>
+          <p:nvPr/>
+        </p:nvSpPr>
+        <p:spPr>
+          <a:xfrm>
+            <a:off x="298174" y="198783"/>
+            <a:ext cx="6853158" cy="5324535"/>
+          </a:xfrm>
+          <a:prstGeom prst="rect">
+            <a:avLst/>
+          </a:prstGeom>
+          <a:noFill/>
+        </p:spPr>
+        <p:txBody>
+          <a:bodyPr wrap="none" rtlCol="0">
+            <a:spAutoFit/>
+          </a:bodyPr>
+          <a:lstStyle/>
+          <a:p>
+            <a:r>
+              <a:rPr lang="en-US" altLang="ko-KR" sz="2000" smtClean="0">
+                <a:latin typeface="나눔고딕코딩" panose="020D0009000000000000" pitchFamily="49" charset="-127"/>
+                <a:ea typeface="나눔고딕코딩" panose="020D0009000000000000" pitchFamily="49" charset="-127"/>
+              </a:rPr>
+              <a:t>2. </a:t>
+            </a:r>
+            <a:r>
+              <a:rPr lang="ko-KR" altLang="en-US" sz="2000" smtClean="0">
+                <a:latin typeface="나눔고딕코딩" panose="020D0009000000000000" pitchFamily="49" charset="-127"/>
+                <a:ea typeface="나눔고딕코딩" panose="020D0009000000000000" pitchFamily="49" charset="-127"/>
+              </a:rPr>
+              <a:t>개발 버전 설정</a:t>
+            </a:r>
+            <a:endParaRPr lang="en-US" altLang="ko-KR" sz="2000" smtClean="0">
+              <a:latin typeface="나눔고딕코딩" panose="020D0009000000000000" pitchFamily="49" charset="-127"/>
+              <a:ea typeface="나눔고딕코딩" panose="020D0009000000000000" pitchFamily="49" charset="-127"/>
+            </a:endParaRPr>
+          </a:p>
+          <a:p>
+            <a:r>
+              <a:rPr lang="en-US" altLang="ko-KR" sz="2000" smtClean="0">
+                <a:latin typeface="나눔고딕코딩" panose="020D0009000000000000" pitchFamily="49" charset="-127"/>
+                <a:ea typeface="나눔고딕코딩" panose="020D0009000000000000" pitchFamily="49" charset="-127"/>
+              </a:rPr>
+              <a:t># lunch</a:t>
+            </a:r>
+          </a:p>
+          <a:p>
+            <a:r>
+              <a:rPr lang="en-US" altLang="ko-KR" sz="2000" smtClean="0">
+                <a:latin typeface="나눔고딕코딩" panose="020D0009000000000000" pitchFamily="49" charset="-127"/>
+                <a:ea typeface="나눔고딕코딩" panose="020D0009000000000000" pitchFamily="49" charset="-127"/>
+              </a:rPr>
+              <a:t>Lunch menu... pick a combo:</a:t>
+            </a:r>
+          </a:p>
+          <a:p>
+            <a:r>
+              <a:rPr lang="en-US" altLang="ko-KR" sz="2000" smtClean="0">
+                <a:latin typeface="나눔고딕코딩" panose="020D0009000000000000" pitchFamily="49" charset="-127"/>
+                <a:ea typeface="나눔고딕코딩" panose="020D0009000000000000" pitchFamily="49" charset="-127"/>
+              </a:rPr>
+              <a:t>     1. aosp_arm-eng</a:t>
+            </a:r>
+          </a:p>
+          <a:p>
+            <a:r>
+              <a:rPr lang="en-US" altLang="ko-KR" sz="2000" smtClean="0">
+                <a:latin typeface="나눔고딕코딩" panose="020D0009000000000000" pitchFamily="49" charset="-127"/>
+                <a:ea typeface="나눔고딕코딩" panose="020D0009000000000000" pitchFamily="49" charset="-127"/>
+              </a:rPr>
+              <a:t>     2. aosp_arm64-eng</a:t>
+            </a:r>
+          </a:p>
+          <a:p>
+            <a:r>
+              <a:rPr lang="en-US" altLang="ko-KR" sz="2000" smtClean="0">
+                <a:latin typeface="나눔고딕코딩" panose="020D0009000000000000" pitchFamily="49" charset="-127"/>
+                <a:ea typeface="나눔고딕코딩" panose="020D0009000000000000" pitchFamily="49" charset="-127"/>
+              </a:rPr>
+              <a:t>     3. aosp_mips-eng</a:t>
+            </a:r>
+          </a:p>
+          <a:p>
+            <a:r>
+              <a:rPr lang="en-US" altLang="ko-KR" sz="2000" smtClean="0">
+                <a:latin typeface="나눔고딕코딩" panose="020D0009000000000000" pitchFamily="49" charset="-127"/>
+                <a:ea typeface="나눔고딕코딩" panose="020D0009000000000000" pitchFamily="49" charset="-127"/>
+              </a:rPr>
+              <a:t>     // </a:t>
+            </a:r>
+            <a:r>
+              <a:rPr lang="ko-KR" altLang="en-US" sz="2000" smtClean="0">
+                <a:latin typeface="나눔고딕코딩" panose="020D0009000000000000" pitchFamily="49" charset="-127"/>
+                <a:ea typeface="나눔고딕코딩" panose="020D0009000000000000" pitchFamily="49" charset="-127"/>
+              </a:rPr>
+              <a:t>중략</a:t>
+            </a:r>
+            <a:endParaRPr lang="en-US" altLang="ko-KR" sz="2000" smtClean="0">
+              <a:latin typeface="나눔고딕코딩" panose="020D0009000000000000" pitchFamily="49" charset="-127"/>
+              <a:ea typeface="나눔고딕코딩" panose="020D0009000000000000" pitchFamily="49" charset="-127"/>
+            </a:endParaRPr>
+          </a:p>
+          <a:p>
+            <a:r>
+              <a:rPr lang="en-US" altLang="ko-KR" sz="2000" smtClean="0">
+                <a:latin typeface="나눔고딕코딩" panose="020D0009000000000000" pitchFamily="49" charset="-127"/>
+                <a:ea typeface="나눔고딕코딩" panose="020D0009000000000000" pitchFamily="49" charset="-127"/>
+              </a:rPr>
+              <a:t>     20. aosp_tilapia-userdebug</a:t>
+            </a:r>
+          </a:p>
+          <a:p>
+            <a:r>
+              <a:rPr lang="en-US" altLang="ko-KR" sz="2000" smtClean="0">
+                <a:latin typeface="나눔고딕코딩" panose="020D0009000000000000" pitchFamily="49" charset="-127"/>
+                <a:ea typeface="나눔고딕코딩" panose="020D0009000000000000" pitchFamily="49" charset="-127"/>
+              </a:rPr>
+              <a:t>     21. aosp_flo-userdebug</a:t>
+            </a:r>
+          </a:p>
+          <a:p>
+            <a:endParaRPr lang="en-US" altLang="ko-KR" sz="2000" smtClean="0">
+              <a:latin typeface="나눔고딕코딩" panose="020D0009000000000000" pitchFamily="49" charset="-127"/>
+              <a:ea typeface="나눔고딕코딩" panose="020D0009000000000000" pitchFamily="49" charset="-127"/>
+            </a:endParaRPr>
+          </a:p>
+          <a:p>
+            <a:r>
+              <a:rPr lang="en-US" altLang="ko-KR" sz="2000" smtClean="0">
+                <a:latin typeface="나눔고딕코딩" panose="020D0009000000000000" pitchFamily="49" charset="-127"/>
+                <a:ea typeface="나눔고딕코딩" panose="020D0009000000000000" pitchFamily="49" charset="-127"/>
+              </a:rPr>
+              <a:t>Which would you like? [aosp_arm-eng]</a:t>
+            </a:r>
+          </a:p>
+          <a:p>
+            <a:endParaRPr lang="en-US" altLang="ko-KR" sz="2000">
+              <a:latin typeface="나눔고딕코딩" panose="020D0009000000000000" pitchFamily="49" charset="-127"/>
+              <a:ea typeface="나눔고딕코딩" panose="020D0009000000000000" pitchFamily="49" charset="-127"/>
+            </a:endParaRPr>
+          </a:p>
+          <a:p>
+            <a:r>
+              <a:rPr lang="ko-KR" altLang="en-US" sz="2000" smtClean="0">
+                <a:latin typeface="나눔고딕코딩" panose="020D0009000000000000" pitchFamily="49" charset="-127"/>
+                <a:ea typeface="나눔고딕코딩" panose="020D0009000000000000" pitchFamily="49" charset="-127"/>
+              </a:rPr>
+              <a:t>위의 리스트에는 현재 단말기에 대한 정보가 없습니다</a:t>
+            </a:r>
+            <a:r>
+              <a:rPr lang="en-US" altLang="ko-KR" sz="2000" smtClean="0">
+                <a:latin typeface="나눔고딕코딩" panose="020D0009000000000000" pitchFamily="49" charset="-127"/>
+                <a:ea typeface="나눔고딕코딩" panose="020D0009000000000000" pitchFamily="49" charset="-127"/>
+              </a:rPr>
+              <a:t>. </a:t>
+            </a:r>
+          </a:p>
+          <a:p>
+            <a:r>
+              <a:rPr lang="en-US" altLang="ko-KR" sz="2000" smtClean="0">
+                <a:latin typeface="나눔고딕코딩" panose="020D0009000000000000" pitchFamily="49" charset="-127"/>
+                <a:ea typeface="나눔고딕코딩" panose="020D0009000000000000" pitchFamily="49" charset="-127"/>
+              </a:rPr>
+              <a:t>aosp_flounder-eng</a:t>
+            </a:r>
+          </a:p>
+          <a:p>
+            <a:endParaRPr lang="en-US" altLang="ko-KR" sz="2000">
+              <a:latin typeface="나눔고딕코딩" panose="020D0009000000000000" pitchFamily="49" charset="-127"/>
+              <a:ea typeface="나눔고딕코딩" panose="020D0009000000000000" pitchFamily="49" charset="-127"/>
+            </a:endParaRPr>
+          </a:p>
+          <a:p>
+            <a:r>
+              <a:rPr lang="ko-KR" altLang="en-US" sz="2000" smtClean="0">
+                <a:latin typeface="나눔고딕코딩" panose="020D0009000000000000" pitchFamily="49" charset="-127"/>
+                <a:ea typeface="나눔고딕코딩" panose="020D0009000000000000" pitchFamily="49" charset="-127"/>
+              </a:rPr>
+              <a:t>직접 입력합니다</a:t>
+            </a:r>
+            <a:r>
+              <a:rPr lang="en-US" altLang="ko-KR" sz="2000" smtClean="0">
+                <a:latin typeface="나눔고딕코딩" panose="020D0009000000000000" pitchFamily="49" charset="-127"/>
+                <a:ea typeface="나눔고딕코딩" panose="020D0009000000000000" pitchFamily="49" charset="-127"/>
+              </a:rPr>
+              <a:t>.</a:t>
+            </a:r>
+          </a:p>
+          <a:p>
+            <a:r>
+              <a:rPr lang="en-US" altLang="ko-KR" sz="2000" smtClean="0">
+                <a:latin typeface="나눔고딕코딩" panose="020D0009000000000000" pitchFamily="49" charset="-127"/>
+                <a:ea typeface="나눔고딕코딩" panose="020D0009000000000000" pitchFamily="49" charset="-127"/>
+              </a:rPr>
+              <a:t># lunch aosp_flounder-eng</a:t>
+            </a:r>
+          </a:p>
+        </p:txBody>
+      </p:sp>
+    </p:spTree>
+    <p:extLst>
+      <p:ext uri="{BB962C8B-B14F-4D97-AF65-F5344CB8AC3E}">
+        <p14:creationId xmlns:p14="http://schemas.microsoft.com/office/powerpoint/2010/main" val="2033781830"/>
+      </p:ext>
+    </p:extLst>
+  </p:cSld>
+  <p:clrMapOvr>
+    <a:masterClrMapping/>
+  </p:clrMapOvr>
+</p:sld>
+</file>
+
+<file path=ppt/slides/slide13.xml><?xml version="1.0" encoding="utf-8"?>
+<p:sld xmlns:a="http://schemas.openxmlformats.org/drawingml/2006/main" xmlns:r="http://schemas.openxmlformats.org/officeDocument/2006/relationships" xmlns:p="http://schemas.openxmlformats.org/presentationml/2006/main">
+  <p:cSld>
+    <p:spTree>
+      <p:nvGrpSpPr>
+        <p:cNvPr id="1" name=""/>
+        <p:cNvGrpSpPr/>
+        <p:nvPr/>
+      </p:nvGrpSpPr>
+      <p:grpSpPr>
+        <a:xfrm>
+          <a:off x="0" y="0"/>
+          <a:ext cx="0" cy="0"/>
+          <a:chOff x="0" y="0"/>
+          <a:chExt cx="0" cy="0"/>
+        </a:xfrm>
+      </p:grpSpPr>
+      <p:sp>
+        <p:nvSpPr>
+          <p:cNvPr id="4" name="TextBox 3"/>
+          <p:cNvSpPr txBox="1"/>
+          <p:nvPr/>
+        </p:nvSpPr>
+        <p:spPr>
+          <a:xfrm>
+            <a:off x="298174" y="198783"/>
+            <a:ext cx="9033242" cy="6555641"/>
+          </a:xfrm>
+          <a:prstGeom prst="rect">
+            <a:avLst/>
+          </a:prstGeom>
+          <a:noFill/>
+        </p:spPr>
+        <p:txBody>
+          <a:bodyPr wrap="none" rtlCol="0">
+            <a:spAutoFit/>
+          </a:bodyPr>
+          <a:lstStyle/>
+          <a:p>
+            <a:r>
+              <a:rPr lang="en-US" altLang="ko-KR" sz="2000" smtClean="0">
+                <a:latin typeface="나눔고딕코딩" panose="020D0009000000000000" pitchFamily="49" charset="-127"/>
+                <a:ea typeface="나눔고딕코딩" panose="020D0009000000000000" pitchFamily="49" charset="-127"/>
+              </a:rPr>
+              <a:t># lunch aosp_flounder-eng</a:t>
+            </a:r>
+          </a:p>
+          <a:p>
+            <a:r>
+              <a:rPr lang="en-US" altLang="ko-KR" sz="2000" smtClean="0">
+                <a:latin typeface="나눔고딕코딩" panose="020D0009000000000000" pitchFamily="49" charset="-127"/>
+                <a:ea typeface="나눔고딕코딩" panose="020D0009000000000000" pitchFamily="49" charset="-127"/>
+              </a:rPr>
+              <a:t>============================================</a:t>
+            </a:r>
+          </a:p>
+          <a:p>
+            <a:r>
+              <a:rPr lang="en-US" altLang="ko-KR" sz="2000" smtClean="0">
+                <a:latin typeface="나눔고딕코딩" panose="020D0009000000000000" pitchFamily="49" charset="-127"/>
+                <a:ea typeface="나눔고딕코딩" panose="020D0009000000000000" pitchFamily="49" charset="-127"/>
+              </a:rPr>
+              <a:t>PLATFORM_VERSION_CODENAME=REL</a:t>
+            </a:r>
+          </a:p>
+          <a:p>
+            <a:r>
+              <a:rPr lang="en-US" altLang="ko-KR" sz="2000" smtClean="0">
+                <a:latin typeface="나눔고딕코딩" panose="020D0009000000000000" pitchFamily="49" charset="-127"/>
+                <a:ea typeface="나눔고딕코딩" panose="020D0009000000000000" pitchFamily="49" charset="-127"/>
+              </a:rPr>
+              <a:t>PLATFORM_VERSION=5.0.2</a:t>
+            </a:r>
+          </a:p>
+          <a:p>
+            <a:r>
+              <a:rPr lang="en-US" altLang="ko-KR" sz="2000" smtClean="0">
+                <a:latin typeface="나눔고딕코딩" panose="020D0009000000000000" pitchFamily="49" charset="-127"/>
+                <a:ea typeface="나눔고딕코딩" panose="020D0009000000000000" pitchFamily="49" charset="-127"/>
+              </a:rPr>
+              <a:t>TARGET_PRODUCT=aosp_flounder</a:t>
+            </a:r>
+          </a:p>
+          <a:p>
+            <a:r>
+              <a:rPr lang="en-US" altLang="ko-KR" sz="2000" smtClean="0">
+                <a:latin typeface="나눔고딕코딩" panose="020D0009000000000000" pitchFamily="49" charset="-127"/>
+                <a:ea typeface="나눔고딕코딩" panose="020D0009000000000000" pitchFamily="49" charset="-127"/>
+              </a:rPr>
+              <a:t>TARGET_BUILD_VARIANT=eng</a:t>
+            </a:r>
+          </a:p>
+          <a:p>
+            <a:r>
+              <a:rPr lang="en-US" altLang="ko-KR" sz="2000" smtClean="0">
+                <a:latin typeface="나눔고딕코딩" panose="020D0009000000000000" pitchFamily="49" charset="-127"/>
+                <a:ea typeface="나눔고딕코딩" panose="020D0009000000000000" pitchFamily="49" charset="-127"/>
+              </a:rPr>
+              <a:t>TARGET_BUILD_TYPE=release</a:t>
+            </a:r>
+          </a:p>
+          <a:p>
+            <a:r>
+              <a:rPr lang="en-US" altLang="ko-KR" sz="2000" smtClean="0">
+                <a:latin typeface="나눔고딕코딩" panose="020D0009000000000000" pitchFamily="49" charset="-127"/>
+                <a:ea typeface="나눔고딕코딩" panose="020D0009000000000000" pitchFamily="49" charset="-127"/>
+              </a:rPr>
+              <a:t>TARGET_BUILD_APPS=</a:t>
+            </a:r>
+          </a:p>
+          <a:p>
+            <a:r>
+              <a:rPr lang="en-US" altLang="ko-KR" sz="2000" smtClean="0">
+                <a:latin typeface="나눔고딕코딩" panose="020D0009000000000000" pitchFamily="49" charset="-127"/>
+                <a:ea typeface="나눔고딕코딩" panose="020D0009000000000000" pitchFamily="49" charset="-127"/>
+              </a:rPr>
+              <a:t>TARGET_ARCH=arm64</a:t>
+            </a:r>
+          </a:p>
+          <a:p>
+            <a:r>
+              <a:rPr lang="en-US" altLang="ko-KR" sz="2000" smtClean="0">
+                <a:latin typeface="나눔고딕코딩" panose="020D0009000000000000" pitchFamily="49" charset="-127"/>
+                <a:ea typeface="나눔고딕코딩" panose="020D0009000000000000" pitchFamily="49" charset="-127"/>
+              </a:rPr>
+              <a:t>TARGET_ARCH_VARIANT=armv8-a</a:t>
+            </a:r>
+          </a:p>
+          <a:p>
+            <a:r>
+              <a:rPr lang="en-US" altLang="ko-KR" sz="2000" smtClean="0">
+                <a:latin typeface="나눔고딕코딩" panose="020D0009000000000000" pitchFamily="49" charset="-127"/>
+                <a:ea typeface="나눔고딕코딩" panose="020D0009000000000000" pitchFamily="49" charset="-127"/>
+              </a:rPr>
+              <a:t>TARGET_CPU_VARIANT=denver64</a:t>
+            </a:r>
+          </a:p>
+          <a:p>
+            <a:r>
+              <a:rPr lang="en-US" altLang="ko-KR" sz="2000" smtClean="0">
+                <a:latin typeface="나눔고딕코딩" panose="020D0009000000000000" pitchFamily="49" charset="-127"/>
+                <a:ea typeface="나눔고딕코딩" panose="020D0009000000000000" pitchFamily="49" charset="-127"/>
+              </a:rPr>
+              <a:t>TARGET_2ND_ARCH=arm</a:t>
+            </a:r>
+          </a:p>
+          <a:p>
+            <a:r>
+              <a:rPr lang="en-US" altLang="ko-KR" sz="2000" smtClean="0">
+                <a:latin typeface="나눔고딕코딩" panose="020D0009000000000000" pitchFamily="49" charset="-127"/>
+                <a:ea typeface="나눔고딕코딩" panose="020D0009000000000000" pitchFamily="49" charset="-127"/>
+              </a:rPr>
+              <a:t>TARGET_2ND_ARCH_VARIANT=armv7-a-neon</a:t>
+            </a:r>
+          </a:p>
+          <a:p>
+            <a:r>
+              <a:rPr lang="en-US" altLang="ko-KR" sz="2000" smtClean="0">
+                <a:latin typeface="나눔고딕코딩" panose="020D0009000000000000" pitchFamily="49" charset="-127"/>
+                <a:ea typeface="나눔고딕코딩" panose="020D0009000000000000" pitchFamily="49" charset="-127"/>
+              </a:rPr>
+              <a:t>TARGET_2ND_CPU_VARIANT=denver</a:t>
+            </a:r>
+          </a:p>
+          <a:p>
+            <a:r>
+              <a:rPr lang="en-US" altLang="ko-KR" sz="2000" smtClean="0">
+                <a:latin typeface="나눔고딕코딩" panose="020D0009000000000000" pitchFamily="49" charset="-127"/>
+                <a:ea typeface="나눔고딕코딩" panose="020D0009000000000000" pitchFamily="49" charset="-127"/>
+              </a:rPr>
+              <a:t>HOST_ARCH=x86_64</a:t>
+            </a:r>
+          </a:p>
+          <a:p>
+            <a:r>
+              <a:rPr lang="en-US" altLang="ko-KR" sz="2000" smtClean="0">
+                <a:latin typeface="나눔고딕코딩" panose="020D0009000000000000" pitchFamily="49" charset="-127"/>
+                <a:ea typeface="나눔고딕코딩" panose="020D0009000000000000" pitchFamily="49" charset="-127"/>
+              </a:rPr>
+              <a:t>HOST_OS=linux</a:t>
+            </a:r>
+          </a:p>
+          <a:p>
+            <a:r>
+              <a:rPr lang="en-US" altLang="ko-KR" sz="2000" smtClean="0">
+                <a:latin typeface="나눔고딕코딩" panose="020D0009000000000000" pitchFamily="49" charset="-127"/>
+                <a:ea typeface="나눔고딕코딩" panose="020D0009000000000000" pitchFamily="49" charset="-127"/>
+              </a:rPr>
+              <a:t>HOST_OS_EXTRA=Linux-3.13.0-24-generic-x86_64-with-Ubuntu-14.04-trusty</a:t>
+            </a:r>
+          </a:p>
+          <a:p>
+            <a:r>
+              <a:rPr lang="en-US" altLang="ko-KR" sz="2000" smtClean="0">
+                <a:latin typeface="나눔고딕코딩" panose="020D0009000000000000" pitchFamily="49" charset="-127"/>
+                <a:ea typeface="나눔고딕코딩" panose="020D0009000000000000" pitchFamily="49" charset="-127"/>
+              </a:rPr>
+              <a:t>HOST_BUILD_TYPE=release</a:t>
+            </a:r>
+          </a:p>
+          <a:p>
+            <a:r>
+              <a:rPr lang="en-US" altLang="ko-KR" sz="2000" smtClean="0">
+                <a:latin typeface="나눔고딕코딩" panose="020D0009000000000000" pitchFamily="49" charset="-127"/>
+                <a:ea typeface="나눔고딕코딩" panose="020D0009000000000000" pitchFamily="49" charset="-127"/>
+              </a:rPr>
+              <a:t>BUILD_ID=LRX22G</a:t>
+            </a:r>
+          </a:p>
+          <a:p>
+            <a:r>
+              <a:rPr lang="en-US" altLang="ko-KR" sz="2000" smtClean="0">
+                <a:latin typeface="나눔고딕코딩" panose="020D0009000000000000" pitchFamily="49" charset="-127"/>
+                <a:ea typeface="나눔고딕코딩" panose="020D0009000000000000" pitchFamily="49" charset="-127"/>
+              </a:rPr>
+              <a:t>OUT_DIR=out</a:t>
+            </a:r>
+          </a:p>
+          <a:p>
+            <a:r>
+              <a:rPr lang="en-US" altLang="ko-KR" sz="2000" smtClean="0">
+                <a:latin typeface="나눔고딕코딩" panose="020D0009000000000000" pitchFamily="49" charset="-127"/>
+                <a:ea typeface="나눔고딕코딩" panose="020D0009000000000000" pitchFamily="49" charset="-127"/>
+              </a:rPr>
+              <a:t>============================================</a:t>
+            </a:r>
+          </a:p>
+        </p:txBody>
+      </p:sp>
+    </p:spTree>
+    <p:extLst>
+      <p:ext uri="{BB962C8B-B14F-4D97-AF65-F5344CB8AC3E}">
+        <p14:creationId xmlns:p14="http://schemas.microsoft.com/office/powerpoint/2010/main" val="2184536318"/>
+      </p:ext>
+    </p:extLst>
+  </p:cSld>
+  <p:clrMapOvr>
+    <a:masterClrMapping/>
+  </p:clrMapOvr>
+</p:sld>
+</file>
+
+<file path=ppt/slides/slide14.xml><?xml version="1.0" encoding="utf-8"?>
+<p:sld xmlns:a="http://schemas.openxmlformats.org/drawingml/2006/main" xmlns:r="http://schemas.openxmlformats.org/officeDocument/2006/relationships" xmlns:p="http://schemas.openxmlformats.org/presentationml/2006/main">
+  <p:cSld>
+    <p:spTree>
+      <p:nvGrpSpPr>
+        <p:cNvPr id="1" name=""/>
+        <p:cNvGrpSpPr/>
+        <p:nvPr/>
+      </p:nvGrpSpPr>
+      <p:grpSpPr>
+        <a:xfrm>
+          <a:off x="0" y="0"/>
+          <a:ext cx="0" cy="0"/>
+          <a:chOff x="0" y="0"/>
+          <a:chExt cx="0" cy="0"/>
+        </a:xfrm>
+      </p:grpSpPr>
+      <p:sp>
+        <p:nvSpPr>
+          <p:cNvPr id="4" name="TextBox 3"/>
+          <p:cNvSpPr txBox="1"/>
+          <p:nvPr/>
+        </p:nvSpPr>
+        <p:spPr>
+          <a:xfrm>
+            <a:off x="218661" y="327991"/>
+            <a:ext cx="6724918" cy="2862322"/>
+          </a:xfrm>
+          <a:prstGeom prst="rect">
+            <a:avLst/>
+          </a:prstGeom>
+          <a:noFill/>
+        </p:spPr>
+        <p:txBody>
+          <a:bodyPr wrap="none" rtlCol="0">
+            <a:spAutoFit/>
+          </a:bodyPr>
+          <a:lstStyle/>
+          <a:p>
+            <a:r>
+              <a:rPr lang="en-US" altLang="ko-KR" sz="2000" smtClean="0">
+                <a:latin typeface="나눔고딕코딩" panose="020D0009000000000000" pitchFamily="49" charset="-127"/>
+                <a:ea typeface="나눔고딕코딩" panose="020D0009000000000000" pitchFamily="49" charset="-127"/>
+              </a:rPr>
+              <a:t>&lt; hello, PDK &gt;</a:t>
+            </a:r>
+          </a:p>
+          <a:p>
+            <a:endParaRPr lang="en-US" altLang="ko-KR" sz="2000">
+              <a:latin typeface="나눔고딕코딩" panose="020D0009000000000000" pitchFamily="49" charset="-127"/>
+              <a:ea typeface="나눔고딕코딩" panose="020D0009000000000000" pitchFamily="49" charset="-127"/>
+            </a:endParaRPr>
+          </a:p>
+          <a:p>
+            <a:r>
+              <a:rPr lang="en-US" altLang="ko-KR" sz="2000" smtClean="0">
+                <a:latin typeface="나눔고딕코딩" panose="020D0009000000000000" pitchFamily="49" charset="-127"/>
+                <a:ea typeface="나눔고딕코딩" panose="020D0009000000000000" pitchFamily="49" charset="-127"/>
+              </a:rPr>
+              <a:t>1. aosp </a:t>
+            </a:r>
+            <a:r>
+              <a:rPr lang="ko-KR" altLang="en-US" sz="2000" smtClean="0">
+                <a:latin typeface="나눔고딕코딩" panose="020D0009000000000000" pitchFamily="49" charset="-127"/>
+                <a:ea typeface="나눔고딕코딩" panose="020D0009000000000000" pitchFamily="49" charset="-127"/>
+              </a:rPr>
+              <a:t>폴더로 이동하여 프로젝트 폴더를 생성합니다</a:t>
+            </a:r>
+            <a:r>
+              <a:rPr lang="en-US" altLang="ko-KR" sz="2000" smtClean="0">
+                <a:latin typeface="나눔고딕코딩" panose="020D0009000000000000" pitchFamily="49" charset="-127"/>
+                <a:ea typeface="나눔고딕코딩" panose="020D0009000000000000" pitchFamily="49" charset="-127"/>
+              </a:rPr>
+              <a:t>.</a:t>
+            </a:r>
+          </a:p>
+          <a:p>
+            <a:r>
+              <a:rPr lang="en-US" altLang="ko-KR" sz="2000" smtClean="0">
+                <a:latin typeface="나눔고딕코딩" panose="020D0009000000000000" pitchFamily="49" charset="-127"/>
+                <a:ea typeface="나눔고딕코딩" panose="020D0009000000000000" pitchFamily="49" charset="-127"/>
+              </a:rPr>
+              <a:t># cd ~/android-google</a:t>
+            </a:r>
+          </a:p>
+          <a:p>
+            <a:r>
+              <a:rPr lang="en-US" altLang="ko-KR" sz="2000" smtClean="0">
+                <a:latin typeface="나눔고딕코딩" panose="020D0009000000000000" pitchFamily="49" charset="-127"/>
+                <a:ea typeface="나눔고딕코딩" panose="020D0009000000000000" pitchFamily="49" charset="-127"/>
+              </a:rPr>
+              <a:t># mkdir hello_pdk</a:t>
+            </a:r>
+          </a:p>
+          <a:p>
+            <a:r>
+              <a:rPr lang="en-US" altLang="ko-KR" sz="2000" smtClean="0">
+                <a:latin typeface="나눔고딕코딩" panose="020D0009000000000000" pitchFamily="49" charset="-127"/>
+                <a:ea typeface="나눔고딕코딩" panose="020D0009000000000000" pitchFamily="49" charset="-127"/>
+              </a:rPr>
+              <a:t># cd hello_pdk</a:t>
+            </a:r>
+          </a:p>
+          <a:p>
+            <a:endParaRPr lang="en-US" altLang="ko-KR" sz="2000">
+              <a:latin typeface="나눔고딕코딩" panose="020D0009000000000000" pitchFamily="49" charset="-127"/>
+              <a:ea typeface="나눔고딕코딩" panose="020D0009000000000000" pitchFamily="49" charset="-127"/>
+            </a:endParaRPr>
+          </a:p>
+          <a:p>
+            <a:r>
+              <a:rPr lang="en-US" altLang="ko-KR" sz="2000" smtClean="0">
+                <a:latin typeface="나눔고딕코딩" panose="020D0009000000000000" pitchFamily="49" charset="-127"/>
+                <a:ea typeface="나눔고딕코딩" panose="020D0009000000000000" pitchFamily="49" charset="-127"/>
+              </a:rPr>
+              <a:t>2. </a:t>
+            </a:r>
+            <a:r>
+              <a:rPr lang="ko-KR" altLang="en-US" sz="2000" smtClean="0">
+                <a:latin typeface="나눔고딕코딩" panose="020D0009000000000000" pitchFamily="49" charset="-127"/>
+                <a:ea typeface="나눔고딕코딩" panose="020D0009000000000000" pitchFamily="49" charset="-127"/>
+              </a:rPr>
+              <a:t>소스 코드를 작성합니다</a:t>
+            </a:r>
+            <a:r>
+              <a:rPr lang="en-US" altLang="ko-KR" sz="2000" smtClean="0">
+                <a:latin typeface="나눔고딕코딩" panose="020D0009000000000000" pitchFamily="49" charset="-127"/>
+                <a:ea typeface="나눔고딕코딩" panose="020D0009000000000000" pitchFamily="49" charset="-127"/>
+              </a:rPr>
+              <a:t>.</a:t>
+            </a:r>
+          </a:p>
+          <a:p>
+            <a:endParaRPr lang="ko-KR" altLang="en-US" sz="2000" smtClean="0">
+              <a:latin typeface="나눔고딕코딩" panose="020D0009000000000000" pitchFamily="49" charset="-127"/>
+              <a:ea typeface="나눔고딕코딩" panose="020D0009000000000000" pitchFamily="49" charset="-127"/>
+            </a:endParaRPr>
+          </a:p>
+        </p:txBody>
+      </p:sp>
+      <p:sp>
+        <p:nvSpPr>
+          <p:cNvPr id="5" name="TextBox 4"/>
+          <p:cNvSpPr txBox="1"/>
+          <p:nvPr/>
+        </p:nvSpPr>
+        <p:spPr>
+          <a:xfrm>
+            <a:off x="318052" y="3061105"/>
+            <a:ext cx="3647152" cy="2554545"/>
+          </a:xfrm>
+          <a:prstGeom prst="rect">
+            <a:avLst/>
+          </a:prstGeom>
+          <a:noFill/>
+          <a:ln>
+            <a:solidFill>
+              <a:schemeClr val="tx1"/>
+            </a:solidFill>
+          </a:ln>
+        </p:spPr>
+        <p:txBody>
+          <a:bodyPr wrap="none" rtlCol="0">
+            <a:spAutoFit/>
+          </a:bodyPr>
+          <a:lstStyle/>
+          <a:p>
+            <a:r>
+              <a:rPr lang="en-US" altLang="ko-KR" sz="2000" smtClean="0">
+                <a:latin typeface="나눔고딕코딩" panose="020D0009000000000000" pitchFamily="49" charset="-127"/>
+                <a:ea typeface="나눔고딕코딩" panose="020D0009000000000000" pitchFamily="49" charset="-127"/>
+              </a:rPr>
+              <a:t>// hello.c</a:t>
+            </a:r>
+          </a:p>
+          <a:p>
+            <a:r>
+              <a:rPr lang="en-US" altLang="ko-KR" sz="2000" smtClean="0">
+                <a:latin typeface="나눔고딕코딩" panose="020D0009000000000000" pitchFamily="49" charset="-127"/>
+                <a:ea typeface="나눔고딕코딩" panose="020D0009000000000000" pitchFamily="49" charset="-127"/>
+              </a:rPr>
+              <a:t>#include &lt;stdio.h&gt;</a:t>
+            </a:r>
+          </a:p>
+          <a:p>
+            <a:endParaRPr lang="en-US" altLang="ko-KR" sz="2000" smtClean="0">
+              <a:latin typeface="나눔고딕코딩" panose="020D0009000000000000" pitchFamily="49" charset="-127"/>
+              <a:ea typeface="나눔고딕코딩" panose="020D0009000000000000" pitchFamily="49" charset="-127"/>
+            </a:endParaRPr>
+          </a:p>
+          <a:p>
+            <a:r>
+              <a:rPr lang="en-US" altLang="ko-KR" sz="2000" smtClean="0">
+                <a:latin typeface="나눔고딕코딩" panose="020D0009000000000000" pitchFamily="49" charset="-127"/>
+                <a:ea typeface="나눔고딕코딩" panose="020D0009000000000000" pitchFamily="49" charset="-127"/>
+              </a:rPr>
+              <a:t>int main()</a:t>
+            </a:r>
+          </a:p>
+          <a:p>
+            <a:r>
+              <a:rPr lang="en-US" altLang="ko-KR" sz="2000" smtClean="0">
+                <a:latin typeface="나눔고딕코딩" panose="020D0009000000000000" pitchFamily="49" charset="-127"/>
+                <a:ea typeface="나눔고딕코딩" panose="020D0009000000000000" pitchFamily="49" charset="-127"/>
+              </a:rPr>
+              <a:t>{</a:t>
+            </a:r>
+          </a:p>
+          <a:p>
+            <a:r>
+              <a:rPr lang="en-US" altLang="ko-KR" sz="2000" smtClean="0">
+                <a:latin typeface="나눔고딕코딩" panose="020D0009000000000000" pitchFamily="49" charset="-127"/>
+                <a:ea typeface="나눔고딕코딩" panose="020D0009000000000000" pitchFamily="49" charset="-127"/>
+              </a:rPr>
+              <a:t>    printf("hello, PDK\n");</a:t>
+            </a:r>
+          </a:p>
+          <a:p>
+            <a:r>
+              <a:rPr lang="en-US" altLang="ko-KR" sz="2000" smtClean="0">
+                <a:latin typeface="나눔고딕코딩" panose="020D0009000000000000" pitchFamily="49" charset="-127"/>
+                <a:ea typeface="나눔고딕코딩" panose="020D0009000000000000" pitchFamily="49" charset="-127"/>
+              </a:rPr>
+              <a:t>    return 0;</a:t>
+            </a:r>
+          </a:p>
+          <a:p>
+            <a:r>
+              <a:rPr lang="en-US" altLang="ko-KR" sz="2000" smtClean="0">
+                <a:latin typeface="나눔고딕코딩" panose="020D0009000000000000" pitchFamily="49" charset="-127"/>
+                <a:ea typeface="나눔고딕코딩" panose="020D0009000000000000" pitchFamily="49" charset="-127"/>
+              </a:rPr>
+              <a:t>}</a:t>
+            </a:r>
+            <a:endParaRPr lang="ko-KR" altLang="en-US" sz="2000" smtClean="0">
+              <a:latin typeface="나눔고딕코딩" panose="020D0009000000000000" pitchFamily="49" charset="-127"/>
+              <a:ea typeface="나눔고딕코딩" panose="020D0009000000000000" pitchFamily="49" charset="-127"/>
+            </a:endParaRPr>
+          </a:p>
+        </p:txBody>
+      </p:sp>
+    </p:spTree>
+    <p:extLst>
+      <p:ext uri="{BB962C8B-B14F-4D97-AF65-F5344CB8AC3E}">
+        <p14:creationId xmlns:p14="http://schemas.microsoft.com/office/powerpoint/2010/main" val="831856483"/>
+      </p:ext>
+    </p:extLst>
+  </p:cSld>
+  <p:clrMapOvr>
+    <a:masterClrMapping/>
+  </p:clrMapOvr>
+</p:sld>
+</file>
+
+<file path=ppt/slides/slide15.xml><?xml version="1.0" encoding="utf-8"?>
+<p:sld xmlns:a="http://schemas.openxmlformats.org/drawingml/2006/main" xmlns:r="http://schemas.openxmlformats.org/officeDocument/2006/relationships" xmlns:p="http://schemas.openxmlformats.org/presentationml/2006/main">
+  <p:cSld>
+    <p:spTree>
+      <p:nvGrpSpPr>
+        <p:cNvPr id="1" name=""/>
+        <p:cNvGrpSpPr/>
+        <p:nvPr/>
+      </p:nvGrpSpPr>
+      <p:grpSpPr>
+        <a:xfrm>
+          <a:off x="0" y="0"/>
+          <a:ext cx="0" cy="0"/>
+          <a:chOff x="0" y="0"/>
+          <a:chExt cx="0" cy="0"/>
+        </a:xfrm>
+      </p:grpSpPr>
+      <p:sp>
+        <p:nvSpPr>
+          <p:cNvPr id="4" name="TextBox 3"/>
+          <p:cNvSpPr txBox="1"/>
+          <p:nvPr/>
+        </p:nvSpPr>
+        <p:spPr>
+          <a:xfrm>
+            <a:off x="218661" y="327991"/>
+            <a:ext cx="5698996" cy="707886"/>
+          </a:xfrm>
+          <a:prstGeom prst="rect">
+            <a:avLst/>
+          </a:prstGeom>
+          <a:noFill/>
+        </p:spPr>
+        <p:txBody>
+          <a:bodyPr wrap="none" rtlCol="0">
+            <a:spAutoFit/>
+          </a:bodyPr>
+          <a:lstStyle/>
+          <a:p>
+            <a:r>
+              <a:rPr lang="en-US" altLang="ko-KR" sz="2000" smtClean="0">
+                <a:latin typeface="나눔고딕코딩" panose="020D0009000000000000" pitchFamily="49" charset="-127"/>
+                <a:ea typeface="나눔고딕코딩" panose="020D0009000000000000" pitchFamily="49" charset="-127"/>
+              </a:rPr>
+              <a:t>3. </a:t>
+            </a:r>
+            <a:r>
+              <a:rPr lang="ko-KR" altLang="en-US" sz="2000" smtClean="0">
+                <a:latin typeface="나눔고딕코딩" panose="020D0009000000000000" pitchFamily="49" charset="-127"/>
+                <a:ea typeface="나눔고딕코딩" panose="020D0009000000000000" pitchFamily="49" charset="-127"/>
+              </a:rPr>
+              <a:t>빌드 위한 스크립트 파일 작성</a:t>
+            </a:r>
+            <a:r>
+              <a:rPr lang="en-US" altLang="ko-KR" sz="2000" smtClean="0">
+                <a:latin typeface="나눔고딕코딩" panose="020D0009000000000000" pitchFamily="49" charset="-127"/>
+                <a:ea typeface="나눔고딕코딩" panose="020D0009000000000000" pitchFamily="49" charset="-127"/>
+              </a:rPr>
+              <a:t>(Android.mk)</a:t>
+            </a:r>
+          </a:p>
+          <a:p>
+            <a:endParaRPr lang="ko-KR" altLang="en-US" sz="2000" smtClean="0">
+              <a:latin typeface="나눔고딕코딩" panose="020D0009000000000000" pitchFamily="49" charset="-127"/>
+              <a:ea typeface="나눔고딕코딩" panose="020D0009000000000000" pitchFamily="49" charset="-127"/>
+            </a:endParaRPr>
+          </a:p>
+        </p:txBody>
+      </p:sp>
+      <p:sp>
+        <p:nvSpPr>
+          <p:cNvPr id="5" name="TextBox 4"/>
+          <p:cNvSpPr txBox="1"/>
+          <p:nvPr/>
+        </p:nvSpPr>
+        <p:spPr>
+          <a:xfrm>
+            <a:off x="218661" y="884435"/>
+            <a:ext cx="3775393" cy="2246769"/>
+          </a:xfrm>
+          <a:prstGeom prst="rect">
+            <a:avLst/>
+          </a:prstGeom>
+          <a:noFill/>
+          <a:ln>
+            <a:solidFill>
+              <a:schemeClr val="tx1"/>
+            </a:solidFill>
+          </a:ln>
+        </p:spPr>
+        <p:txBody>
+          <a:bodyPr wrap="none" rtlCol="0">
+            <a:spAutoFit/>
+          </a:bodyPr>
+          <a:lstStyle/>
+          <a:p>
+            <a:r>
+              <a:rPr lang="en-US" altLang="ko-KR" sz="2000" smtClean="0">
+                <a:latin typeface="나눔고딕코딩" panose="020D0009000000000000" pitchFamily="49" charset="-127"/>
+                <a:ea typeface="나눔고딕코딩" panose="020D0009000000000000" pitchFamily="49" charset="-127"/>
+              </a:rPr>
+              <a:t># Android.mk</a:t>
+            </a:r>
+          </a:p>
+          <a:p>
+            <a:endParaRPr lang="en-US" altLang="ko-KR" sz="2000" smtClean="0">
+              <a:latin typeface="나눔고딕코딩" panose="020D0009000000000000" pitchFamily="49" charset="-127"/>
+              <a:ea typeface="나눔고딕코딩" panose="020D0009000000000000" pitchFamily="49" charset="-127"/>
+            </a:endParaRPr>
+          </a:p>
+          <a:p>
+            <a:r>
+              <a:rPr lang="en-US" altLang="ko-KR" sz="2000" smtClean="0">
+                <a:latin typeface="나눔고딕코딩" panose="020D0009000000000000" pitchFamily="49" charset="-127"/>
+                <a:ea typeface="나눔고딕코딩" panose="020D0009000000000000" pitchFamily="49" charset="-127"/>
+              </a:rPr>
+              <a:t>LOCAL_PATH := $(call my-dir)</a:t>
+            </a:r>
+          </a:p>
+          <a:p>
+            <a:r>
+              <a:rPr lang="en-US" altLang="ko-KR" sz="2000" smtClean="0">
+                <a:latin typeface="나눔고딕코딩" panose="020D0009000000000000" pitchFamily="49" charset="-127"/>
+                <a:ea typeface="나눔고딕코딩" panose="020D0009000000000000" pitchFamily="49" charset="-127"/>
+              </a:rPr>
+              <a:t>include $(CLEAR_VARS)</a:t>
+            </a:r>
+          </a:p>
+          <a:p>
+            <a:r>
+              <a:rPr lang="en-US" altLang="ko-KR" sz="2000" smtClean="0">
+                <a:latin typeface="나눔고딕코딩" panose="020D0009000000000000" pitchFamily="49" charset="-127"/>
+                <a:ea typeface="나눔고딕코딩" panose="020D0009000000000000" pitchFamily="49" charset="-127"/>
+              </a:rPr>
+              <a:t>LOCAL_MODULE := hello</a:t>
+            </a:r>
+          </a:p>
+          <a:p>
+            <a:r>
+              <a:rPr lang="en-US" altLang="ko-KR" sz="2000" smtClean="0">
+                <a:latin typeface="나눔고딕코딩" panose="020D0009000000000000" pitchFamily="49" charset="-127"/>
+                <a:ea typeface="나눔고딕코딩" panose="020D0009000000000000" pitchFamily="49" charset="-127"/>
+              </a:rPr>
+              <a:t>LOCAL_SRC_FILES := hello.c</a:t>
+            </a:r>
+          </a:p>
+          <a:p>
+            <a:r>
+              <a:rPr lang="en-US" altLang="ko-KR" sz="2000" smtClean="0">
+                <a:latin typeface="나눔고딕코딩" panose="020D0009000000000000" pitchFamily="49" charset="-127"/>
+                <a:ea typeface="나눔고딕코딩" panose="020D0009000000000000" pitchFamily="49" charset="-127"/>
+              </a:rPr>
+              <a:t>include $(BUILD_EXECUTABLE)</a:t>
+            </a:r>
+            <a:endParaRPr lang="ko-KR" altLang="en-US" sz="2000" smtClean="0">
+              <a:latin typeface="나눔고딕코딩" panose="020D0009000000000000" pitchFamily="49" charset="-127"/>
+              <a:ea typeface="나눔고딕코딩" panose="020D0009000000000000" pitchFamily="49" charset="-127"/>
+            </a:endParaRPr>
+          </a:p>
+        </p:txBody>
+      </p:sp>
+      <p:sp>
+        <p:nvSpPr>
+          <p:cNvPr id="6" name="TextBox 5"/>
+          <p:cNvSpPr txBox="1"/>
+          <p:nvPr/>
+        </p:nvSpPr>
+        <p:spPr>
+          <a:xfrm>
+            <a:off x="218661" y="3548269"/>
+            <a:ext cx="3262432" cy="400110"/>
+          </a:xfrm>
+          <a:prstGeom prst="rect">
+            <a:avLst/>
+          </a:prstGeom>
+          <a:noFill/>
+        </p:spPr>
+        <p:txBody>
+          <a:bodyPr wrap="none" rtlCol="0">
+            <a:spAutoFit/>
+          </a:bodyPr>
+          <a:lstStyle/>
+          <a:p>
+            <a:r>
+              <a:rPr lang="en-US" altLang="ko-KR" sz="2000" smtClean="0">
+                <a:latin typeface="나눔고딕코딩" panose="020D0009000000000000" pitchFamily="49" charset="-127"/>
+                <a:ea typeface="나눔고딕코딩" panose="020D0009000000000000" pitchFamily="49" charset="-127"/>
+              </a:rPr>
+              <a:t>4. </a:t>
+            </a:r>
+            <a:r>
+              <a:rPr lang="ko-KR" altLang="en-US" sz="2000" smtClean="0">
+                <a:latin typeface="나눔고딕코딩" panose="020D0009000000000000" pitchFamily="49" charset="-127"/>
+                <a:ea typeface="나눔고딕코딩" panose="020D0009000000000000" pitchFamily="49" charset="-127"/>
+              </a:rPr>
+              <a:t>빌드 수행</a:t>
+            </a:r>
+            <a:r>
+              <a:rPr lang="en-US" altLang="ko-KR" sz="2000" smtClean="0">
+                <a:latin typeface="나눔고딕코딩" panose="020D0009000000000000" pitchFamily="49" charset="-127"/>
+                <a:ea typeface="나눔고딕코딩" panose="020D0009000000000000" pitchFamily="49" charset="-127"/>
+              </a:rPr>
+              <a:t>(m, </a:t>
+            </a:r>
+            <a:r>
+              <a:rPr lang="en-US" altLang="ko-KR" sz="2000" smtClean="0">
+                <a:solidFill>
+                  <a:srgbClr val="FF0000"/>
+                </a:solidFill>
+                <a:latin typeface="나눔고딕코딩" panose="020D0009000000000000" pitchFamily="49" charset="-127"/>
+                <a:ea typeface="나눔고딕코딩" panose="020D0009000000000000" pitchFamily="49" charset="-127"/>
+              </a:rPr>
+              <a:t>mm</a:t>
+            </a:r>
+            <a:r>
+              <a:rPr lang="en-US" altLang="ko-KR" sz="2000" smtClean="0">
+                <a:latin typeface="나눔고딕코딩" panose="020D0009000000000000" pitchFamily="49" charset="-127"/>
+                <a:ea typeface="나눔고딕코딩" panose="020D0009000000000000" pitchFamily="49" charset="-127"/>
+              </a:rPr>
+              <a:t>, mmm)</a:t>
+            </a:r>
+            <a:endParaRPr lang="ko-KR" altLang="en-US" sz="2000" smtClean="0">
+              <a:latin typeface="나눔고딕코딩" panose="020D0009000000000000" pitchFamily="49" charset="-127"/>
+              <a:ea typeface="나눔고딕코딩" panose="020D0009000000000000" pitchFamily="49" charset="-127"/>
+            </a:endParaRPr>
+          </a:p>
+        </p:txBody>
+      </p:sp>
+    </p:spTree>
+    <p:extLst>
+      <p:ext uri="{BB962C8B-B14F-4D97-AF65-F5344CB8AC3E}">
+        <p14:creationId xmlns:p14="http://schemas.microsoft.com/office/powerpoint/2010/main" val="1613210114"/>
+      </p:ext>
+    </p:extLst>
+  </p:cSld>
+  <p:clrMapOvr>
+    <a:masterClrMapping/>
+  </p:clrMapOvr>
+</p:sld>
+</file>
+
+<file path=ppt/slides/slide16.xml><?xml version="1.0" encoding="utf-8"?>
+<p:sld xmlns:a="http://schemas.openxmlformats.org/drawingml/2006/main" xmlns:r="http://schemas.openxmlformats.org/officeDocument/2006/relationships" xmlns:p="http://schemas.openxmlformats.org/presentationml/2006/main">
+  <p:cSld>
+    <p:spTree>
+      <p:nvGrpSpPr>
+        <p:cNvPr id="1" name=""/>
+        <p:cNvGrpSpPr/>
+        <p:nvPr/>
+      </p:nvGrpSpPr>
+      <p:grpSpPr>
+        <a:xfrm>
+          <a:off x="0" y="0"/>
+          <a:ext cx="0" cy="0"/>
+          <a:chOff x="0" y="0"/>
+          <a:chExt cx="0" cy="0"/>
+        </a:xfrm>
+      </p:grpSpPr>
+      <p:sp>
+        <p:nvSpPr>
+          <p:cNvPr id="4" name="TextBox 3"/>
+          <p:cNvSpPr txBox="1"/>
+          <p:nvPr/>
+        </p:nvSpPr>
+        <p:spPr>
+          <a:xfrm>
+            <a:off x="218661" y="327991"/>
+            <a:ext cx="16214695" cy="6247864"/>
+          </a:xfrm>
+          <a:prstGeom prst="rect">
+            <a:avLst/>
+          </a:prstGeom>
+          <a:noFill/>
+        </p:spPr>
+        <p:txBody>
+          <a:bodyPr wrap="none" rtlCol="0">
+            <a:spAutoFit/>
+          </a:bodyPr>
+          <a:lstStyle/>
+          <a:p>
+            <a:r>
+              <a:rPr lang="en-US" altLang="ko-KR" sz="2000" smtClean="0">
+                <a:latin typeface="나눔고딕코딩" panose="020D0009000000000000" pitchFamily="49" charset="-127"/>
+                <a:ea typeface="나눔고딕코딩" panose="020D0009000000000000" pitchFamily="49" charset="-127"/>
+              </a:rPr>
+              <a:t>android-google/hello_pdk # mm</a:t>
+            </a:r>
+          </a:p>
+          <a:p>
+            <a:r>
+              <a:rPr lang="en-US" altLang="ko-KR" sz="2000" smtClean="0">
+                <a:latin typeface="나눔고딕코딩" panose="020D0009000000000000" pitchFamily="49" charset="-127"/>
+                <a:ea typeface="나눔고딕코딩" panose="020D0009000000000000" pitchFamily="49" charset="-127"/>
+              </a:rPr>
+              <a:t>============================================</a:t>
+            </a:r>
+          </a:p>
+          <a:p>
+            <a:r>
+              <a:rPr lang="en-US" altLang="ko-KR" sz="2000" smtClean="0">
+                <a:latin typeface="나눔고딕코딩" panose="020D0009000000000000" pitchFamily="49" charset="-127"/>
+                <a:ea typeface="나눔고딕코딩" panose="020D0009000000000000" pitchFamily="49" charset="-127"/>
+              </a:rPr>
+              <a:t>PLATFORM_VERSION_CODENAME=REL</a:t>
+            </a:r>
+          </a:p>
+          <a:p>
+            <a:r>
+              <a:rPr lang="en-US" altLang="ko-KR" sz="2000" smtClean="0">
+                <a:latin typeface="나눔고딕코딩" panose="020D0009000000000000" pitchFamily="49" charset="-127"/>
+                <a:ea typeface="나눔고딕코딩" panose="020D0009000000000000" pitchFamily="49" charset="-127"/>
+              </a:rPr>
+              <a:t>//</a:t>
+            </a:r>
+            <a:r>
+              <a:rPr lang="ko-KR" altLang="en-US" sz="2000" smtClean="0">
+                <a:latin typeface="나눔고딕코딩" panose="020D0009000000000000" pitchFamily="49" charset="-127"/>
+                <a:ea typeface="나눔고딕코딩" panose="020D0009000000000000" pitchFamily="49" charset="-127"/>
+              </a:rPr>
+              <a:t>중략</a:t>
+            </a:r>
+            <a:endParaRPr lang="en-US" altLang="ko-KR" sz="2000" smtClean="0">
+              <a:latin typeface="나눔고딕코딩" panose="020D0009000000000000" pitchFamily="49" charset="-127"/>
+              <a:ea typeface="나눔고딕코딩" panose="020D0009000000000000" pitchFamily="49" charset="-127"/>
+            </a:endParaRPr>
+          </a:p>
+          <a:p>
+            <a:r>
+              <a:rPr lang="en-US" altLang="ko-KR" sz="2000" smtClean="0">
+                <a:latin typeface="나눔고딕코딩" panose="020D0009000000000000" pitchFamily="49" charset="-127"/>
+                <a:ea typeface="나눔고딕코딩" panose="020D0009000000000000" pitchFamily="49" charset="-127"/>
+              </a:rPr>
+              <a:t>OUT_DIR=out</a:t>
+            </a:r>
+          </a:p>
+          <a:p>
+            <a:r>
+              <a:rPr lang="en-US" altLang="ko-KR" sz="2000" smtClean="0">
+                <a:latin typeface="나눔고딕코딩" panose="020D0009000000000000" pitchFamily="49" charset="-127"/>
+                <a:ea typeface="나눔고딕코딩" panose="020D0009000000000000" pitchFamily="49" charset="-127"/>
+              </a:rPr>
+              <a:t>============================================</a:t>
+            </a:r>
+          </a:p>
+          <a:p>
+            <a:r>
+              <a:rPr lang="en-US" altLang="ko-KR" sz="2000" smtClean="0">
+                <a:latin typeface="나눔고딕코딩" panose="020D0009000000000000" pitchFamily="49" charset="-127"/>
+                <a:ea typeface="나눔고딕코딩" panose="020D0009000000000000" pitchFamily="49" charset="-127"/>
+              </a:rPr>
+              <a:t>No private recovery resources for TARGET_DEVICE flounder</a:t>
+            </a:r>
+          </a:p>
+          <a:p>
+            <a:r>
+              <a:rPr lang="en-US" altLang="ko-KR" sz="2000" smtClean="0">
+                <a:latin typeface="나눔고딕코딩" panose="020D0009000000000000" pitchFamily="49" charset="-127"/>
+                <a:ea typeface="나눔고딕코딩" panose="020D0009000000000000" pitchFamily="49" charset="-127"/>
+              </a:rPr>
+              <a:t>make: Entering directory `/root/android-google'</a:t>
+            </a:r>
+          </a:p>
+          <a:p>
+            <a:r>
+              <a:rPr lang="en-US" altLang="ko-KR" sz="2000" smtClean="0">
+                <a:latin typeface="나눔고딕코딩" panose="020D0009000000000000" pitchFamily="49" charset="-127"/>
+                <a:ea typeface="나눔고딕코딩" panose="020D0009000000000000" pitchFamily="49" charset="-127"/>
+              </a:rPr>
+              <a:t>Import includes file: out/target/product/flounder/obj/EXECUTABLES/hello_intermediates/import_includes</a:t>
+            </a:r>
+          </a:p>
+          <a:p>
+            <a:r>
+              <a:rPr lang="en-US" altLang="ko-KR" sz="2000" smtClean="0">
+                <a:latin typeface="나눔고딕코딩" panose="020D0009000000000000" pitchFamily="49" charset="-127"/>
+                <a:ea typeface="나눔고딕코딩" panose="020D0009000000000000" pitchFamily="49" charset="-127"/>
+              </a:rPr>
+              <a:t>target  C: hello &lt;= hello_pdk/hello.c</a:t>
+            </a:r>
+          </a:p>
+          <a:p>
+            <a:r>
+              <a:rPr lang="en-US" altLang="ko-KR" sz="2000" smtClean="0">
+                <a:latin typeface="나눔고딕코딩" panose="020D0009000000000000" pitchFamily="49" charset="-127"/>
+                <a:ea typeface="나눔고딕코딩" panose="020D0009000000000000" pitchFamily="49" charset="-127"/>
+              </a:rPr>
+              <a:t>target Executable: hello (out/target/product/flounder/obj/EXECUTABLES/hello_intermediates/LINKED/hello)</a:t>
+            </a:r>
+          </a:p>
+          <a:p>
+            <a:r>
+              <a:rPr lang="en-US" altLang="ko-KR" sz="2000" smtClean="0">
+                <a:latin typeface="나눔고딕코딩" panose="020D0009000000000000" pitchFamily="49" charset="-127"/>
+                <a:ea typeface="나눔고딕코딩" panose="020D0009000000000000" pitchFamily="49" charset="-127"/>
+              </a:rPr>
+              <a:t>target Symbolic: hello (out/target/product/flounder/symbols/system/bin/hello)</a:t>
+            </a:r>
+          </a:p>
+          <a:p>
+            <a:r>
+              <a:rPr lang="en-US" altLang="ko-KR" sz="2000" smtClean="0">
+                <a:latin typeface="나눔고딕코딩" panose="020D0009000000000000" pitchFamily="49" charset="-127"/>
+                <a:ea typeface="나눔고딕코딩" panose="020D0009000000000000" pitchFamily="49" charset="-127"/>
+              </a:rPr>
+              <a:t>Export includes file: hello_pdk/Android.mk -- out/target/product/flounder/obj/EXECUTABLES/hello_intermediates/export_includes</a:t>
+            </a:r>
+          </a:p>
+          <a:p>
+            <a:r>
+              <a:rPr lang="en-US" altLang="ko-KR" sz="2000" smtClean="0">
+                <a:latin typeface="나눔고딕코딩" panose="020D0009000000000000" pitchFamily="49" charset="-127"/>
+                <a:ea typeface="나눔고딕코딩" panose="020D0009000000000000" pitchFamily="49" charset="-127"/>
+              </a:rPr>
+              <a:t>target Strip: hello (out/target/product/flounder/obj/EXECUTABLES/hello_intermediates/hello)</a:t>
+            </a:r>
+          </a:p>
+          <a:p>
+            <a:r>
+              <a:rPr lang="en-US" altLang="ko-KR" sz="2000" smtClean="0">
+                <a:solidFill>
+                  <a:srgbClr val="FF0000"/>
+                </a:solidFill>
+                <a:latin typeface="나눔고딕코딩" panose="020D0009000000000000" pitchFamily="49" charset="-127"/>
+                <a:ea typeface="나눔고딕코딩" panose="020D0009000000000000" pitchFamily="49" charset="-127"/>
+              </a:rPr>
+              <a:t>Install: out/target/product/flounder/system/bin/hello</a:t>
+            </a:r>
+          </a:p>
+          <a:p>
+            <a:r>
+              <a:rPr lang="en-US" altLang="ko-KR" sz="2000" smtClean="0">
+                <a:latin typeface="나눔고딕코딩" panose="020D0009000000000000" pitchFamily="49" charset="-127"/>
+                <a:ea typeface="나눔고딕코딩" panose="020D0009000000000000" pitchFamily="49" charset="-127"/>
+              </a:rPr>
+              <a:t>make: Leaving directory `/root/android-google'</a:t>
+            </a:r>
+          </a:p>
+          <a:p>
+            <a:endParaRPr lang="en-US" altLang="ko-KR" sz="2000" smtClean="0">
+              <a:latin typeface="나눔고딕코딩" panose="020D0009000000000000" pitchFamily="49" charset="-127"/>
+              <a:ea typeface="나눔고딕코딩" panose="020D0009000000000000" pitchFamily="49" charset="-127"/>
+            </a:endParaRPr>
+          </a:p>
+          <a:p>
+            <a:r>
+              <a:rPr lang="en-US" altLang="ko-KR" sz="2000" smtClean="0">
+                <a:latin typeface="나눔고딕코딩" panose="020D0009000000000000" pitchFamily="49" charset="-127"/>
+                <a:ea typeface="나눔고딕코딩" panose="020D0009000000000000" pitchFamily="49" charset="-127"/>
+              </a:rPr>
+              <a:t>#### make completed successfully (3 seconds) ####</a:t>
+            </a:r>
+          </a:p>
+          <a:p>
+            <a:endParaRPr lang="en-US" altLang="ko-KR" sz="2000" smtClean="0">
+              <a:latin typeface="나눔고딕코딩" panose="020D0009000000000000" pitchFamily="49" charset="-127"/>
+              <a:ea typeface="나눔고딕코딩" panose="020D0009000000000000" pitchFamily="49" charset="-127"/>
+            </a:endParaRPr>
+          </a:p>
+          <a:p>
+            <a:endParaRPr lang="ko-KR" altLang="en-US" sz="2000" smtClean="0">
+              <a:latin typeface="나눔고딕코딩" panose="020D0009000000000000" pitchFamily="49" charset="-127"/>
+              <a:ea typeface="나눔고딕코딩" panose="020D0009000000000000" pitchFamily="49" charset="-127"/>
+            </a:endParaRPr>
+          </a:p>
+        </p:txBody>
+      </p:sp>
+    </p:spTree>
+    <p:extLst>
+      <p:ext uri="{BB962C8B-B14F-4D97-AF65-F5344CB8AC3E}">
+        <p14:creationId xmlns:p14="http://schemas.microsoft.com/office/powerpoint/2010/main" val="3334016256"/>
+      </p:ext>
+    </p:extLst>
+  </p:cSld>
+  <p:clrMapOvr>
+    <a:masterClrMapping/>
+  </p:clrMapOvr>
+</p:sld>
+</file>
+
+<file path=ppt/slides/slide17.xml><?xml version="1.0" encoding="utf-8"?>
+<p:sld xmlns:a="http://schemas.openxmlformats.org/drawingml/2006/main" xmlns:r="http://schemas.openxmlformats.org/officeDocument/2006/relationships" xmlns:p="http://schemas.openxmlformats.org/presentationml/2006/main">
+  <p:cSld>
+    <p:spTree>
+      <p:nvGrpSpPr>
+        <p:cNvPr id="1" name=""/>
+        <p:cNvGrpSpPr/>
+        <p:nvPr/>
+      </p:nvGrpSpPr>
+      <p:grpSpPr>
+        <a:xfrm>
+          <a:off x="0" y="0"/>
+          <a:ext cx="0" cy="0"/>
+          <a:chOff x="0" y="0"/>
+          <a:chExt cx="0" cy="0"/>
+        </a:xfrm>
+      </p:grpSpPr>
+      <p:sp>
+        <p:nvSpPr>
+          <p:cNvPr id="4" name="TextBox 3"/>
+          <p:cNvSpPr txBox="1"/>
+          <p:nvPr/>
+        </p:nvSpPr>
+        <p:spPr>
+          <a:xfrm>
+            <a:off x="218661" y="327991"/>
+            <a:ext cx="11598047" cy="5632311"/>
+          </a:xfrm>
+          <a:prstGeom prst="rect">
+            <a:avLst/>
+          </a:prstGeom>
+          <a:noFill/>
+        </p:spPr>
+        <p:txBody>
+          <a:bodyPr wrap="none" rtlCol="0">
+            <a:spAutoFit/>
+          </a:bodyPr>
+          <a:lstStyle/>
+          <a:p>
+            <a:r>
+              <a:rPr lang="ko-KR" altLang="en-US" sz="2000" smtClean="0">
+                <a:latin typeface="나눔고딕코딩" panose="020D0009000000000000" pitchFamily="49" charset="-127"/>
+                <a:ea typeface="나눔고딕코딩" panose="020D0009000000000000" pitchFamily="49" charset="-127"/>
+              </a:rPr>
+              <a:t>마지막으로 단말기에 다운로드하여 실행합니다</a:t>
+            </a:r>
+            <a:r>
+              <a:rPr lang="en-US" altLang="ko-KR" sz="2000" smtClean="0">
+                <a:latin typeface="나눔고딕코딩" panose="020D0009000000000000" pitchFamily="49" charset="-127"/>
+                <a:ea typeface="나눔고딕코딩" panose="020D0009000000000000" pitchFamily="49" charset="-127"/>
+              </a:rPr>
+              <a:t>.</a:t>
+            </a:r>
+          </a:p>
+          <a:p>
+            <a:r>
+              <a:rPr lang="en-US" altLang="ko-KR" sz="2000" smtClean="0">
+                <a:latin typeface="나눔고딕코딩" panose="020D0009000000000000" pitchFamily="49" charset="-127"/>
+                <a:ea typeface="나눔고딕코딩" panose="020D0009000000000000" pitchFamily="49" charset="-127"/>
+              </a:rPr>
+              <a:t>adb push &lt;</a:t>
+            </a:r>
+            <a:r>
+              <a:rPr lang="ko-KR" altLang="en-US" sz="2000" smtClean="0">
+                <a:latin typeface="나눔고딕코딩" panose="020D0009000000000000" pitchFamily="49" charset="-127"/>
+                <a:ea typeface="나눔고딕코딩" panose="020D0009000000000000" pitchFamily="49" charset="-127"/>
+              </a:rPr>
+              <a:t>파일명</a:t>
+            </a:r>
+            <a:r>
+              <a:rPr lang="en-US" altLang="ko-KR" sz="2000" smtClean="0">
+                <a:latin typeface="나눔고딕코딩" panose="020D0009000000000000" pitchFamily="49" charset="-127"/>
+                <a:ea typeface="나눔고딕코딩" panose="020D0009000000000000" pitchFamily="49" charset="-127"/>
+              </a:rPr>
+              <a:t>&gt; &lt;</a:t>
+            </a:r>
+            <a:r>
+              <a:rPr lang="ko-KR" altLang="en-US" sz="2000" smtClean="0">
+                <a:latin typeface="나눔고딕코딩" panose="020D0009000000000000" pitchFamily="49" charset="-127"/>
+                <a:ea typeface="나눔고딕코딩" panose="020D0009000000000000" pitchFamily="49" charset="-127"/>
+              </a:rPr>
+              <a:t>리모트디렉터리</a:t>
+            </a:r>
+            <a:r>
+              <a:rPr lang="en-US" altLang="ko-KR" sz="2000" smtClean="0">
+                <a:latin typeface="나눔고딕코딩" panose="020D0009000000000000" pitchFamily="49" charset="-127"/>
+                <a:ea typeface="나눔고딕코딩" panose="020D0009000000000000" pitchFamily="49" charset="-127"/>
+              </a:rPr>
+              <a:t>&gt;</a:t>
+            </a:r>
+          </a:p>
+          <a:p>
+            <a:endParaRPr lang="en-US" altLang="ko-KR" sz="2000" smtClean="0">
+              <a:solidFill>
+                <a:srgbClr val="FF0000"/>
+              </a:solidFill>
+              <a:latin typeface="나눔고딕코딩" panose="020D0009000000000000" pitchFamily="49" charset="-127"/>
+              <a:ea typeface="나눔고딕코딩" panose="020D0009000000000000" pitchFamily="49" charset="-127"/>
+            </a:endParaRPr>
+          </a:p>
+          <a:p>
+            <a:r>
+              <a:rPr lang="en-US" altLang="ko-KR" sz="2000" smtClean="0">
+                <a:solidFill>
+                  <a:srgbClr val="FF0000"/>
+                </a:solidFill>
+                <a:latin typeface="나눔고딕코딩" panose="020D0009000000000000" pitchFamily="49" charset="-127"/>
+                <a:ea typeface="나눔고딕코딩" panose="020D0009000000000000" pitchFamily="49" charset="-127"/>
+              </a:rPr>
+              <a:t>out/target/product/flounder/system/bin/hello</a:t>
+            </a:r>
+          </a:p>
+          <a:p>
+            <a:endParaRPr lang="en-US" altLang="ko-KR" sz="2000" smtClean="0">
+              <a:latin typeface="나눔고딕코딩" panose="020D0009000000000000" pitchFamily="49" charset="-127"/>
+              <a:ea typeface="나눔고딕코딩" panose="020D0009000000000000" pitchFamily="49" charset="-127"/>
+            </a:endParaRPr>
+          </a:p>
+          <a:p>
+            <a:r>
+              <a:rPr lang="en-US" altLang="ko-KR" sz="2000" smtClean="0">
+                <a:latin typeface="나눔고딕코딩" panose="020D0009000000000000" pitchFamily="49" charset="-127"/>
+                <a:ea typeface="나눔고딕코딩" panose="020D0009000000000000" pitchFamily="49" charset="-127"/>
+              </a:rPr>
+              <a:t>/android-google/hello_pdk# adb push ../out/target/product/flounder/system/bin/hello /data</a:t>
+            </a:r>
+          </a:p>
+          <a:p>
+            <a:r>
+              <a:rPr lang="en-US" altLang="ko-KR" sz="2000" smtClean="0">
+                <a:latin typeface="나눔고딕코딩" panose="020D0009000000000000" pitchFamily="49" charset="-127"/>
+                <a:ea typeface="나눔고딕코딩" panose="020D0009000000000000" pitchFamily="49" charset="-127"/>
+              </a:rPr>
+              <a:t>95 KB/s (5680 bytes in 0.058s)</a:t>
+            </a:r>
+          </a:p>
+          <a:p>
+            <a:endParaRPr lang="en-US" altLang="ko-KR" sz="2000">
+              <a:latin typeface="나눔고딕코딩" panose="020D0009000000000000" pitchFamily="49" charset="-127"/>
+              <a:ea typeface="나눔고딕코딩" panose="020D0009000000000000" pitchFamily="49" charset="-127"/>
+            </a:endParaRPr>
+          </a:p>
+          <a:p>
+            <a:r>
+              <a:rPr lang="en-US" altLang="ko-KR" sz="2000" smtClean="0">
+                <a:latin typeface="나눔고딕코딩" panose="020D0009000000000000" pitchFamily="49" charset="-127"/>
+                <a:ea typeface="나눔고딕코딩" panose="020D0009000000000000" pitchFamily="49" charset="-127"/>
+              </a:rPr>
+              <a:t># adb shell</a:t>
+            </a:r>
+          </a:p>
+          <a:p>
+            <a:r>
+              <a:rPr lang="en-US" altLang="ko-KR" sz="2000" smtClean="0">
+                <a:latin typeface="나눔고딕코딩" panose="020D0009000000000000" pitchFamily="49" charset="-127"/>
+                <a:ea typeface="나눔고딕코딩" panose="020D0009000000000000" pitchFamily="49" charset="-127"/>
+              </a:rPr>
+              <a:t># cd data</a:t>
+            </a:r>
+          </a:p>
+          <a:p>
+            <a:r>
+              <a:rPr lang="en-US" altLang="ko-KR" sz="2000" smtClean="0">
+                <a:latin typeface="나눔고딕코딩" panose="020D0009000000000000" pitchFamily="49" charset="-127"/>
+                <a:ea typeface="나눔고딕코딩" panose="020D0009000000000000" pitchFamily="49" charset="-127"/>
+              </a:rPr>
+              <a:t>./hello</a:t>
+            </a:r>
+          </a:p>
+          <a:p>
+            <a:r>
+              <a:rPr lang="en-US" altLang="ko-KR" sz="2000" smtClean="0">
+                <a:latin typeface="나눔고딕코딩" panose="020D0009000000000000" pitchFamily="49" charset="-127"/>
+                <a:ea typeface="나눔고딕코딩" panose="020D0009000000000000" pitchFamily="49" charset="-127"/>
+              </a:rPr>
+              <a:t>hello, PDK</a:t>
+            </a:r>
+          </a:p>
+          <a:p>
+            <a:endParaRPr lang="en-US" altLang="ko-KR" sz="2000">
+              <a:latin typeface="나눔고딕코딩" panose="020D0009000000000000" pitchFamily="49" charset="-127"/>
+              <a:ea typeface="나눔고딕코딩" panose="020D0009000000000000" pitchFamily="49" charset="-127"/>
+            </a:endParaRPr>
+          </a:p>
+          <a:p>
+            <a:r>
+              <a:rPr lang="en-US" altLang="ko-KR" sz="2000" smtClean="0">
+                <a:latin typeface="나눔고딕코딩" panose="020D0009000000000000" pitchFamily="49" charset="-127"/>
+                <a:ea typeface="나눔고딕코딩" panose="020D0009000000000000" pitchFamily="49" charset="-127"/>
+              </a:rPr>
+              <a:t>&lt; </a:t>
+            </a:r>
+            <a:r>
+              <a:rPr lang="ko-KR" altLang="en-US" sz="2000" smtClean="0">
+                <a:latin typeface="나눔고딕코딩" panose="020D0009000000000000" pitchFamily="49" charset="-127"/>
+                <a:ea typeface="나눔고딕코딩" panose="020D0009000000000000" pitchFamily="49" charset="-127"/>
+              </a:rPr>
+              <a:t>연습 문제</a:t>
+            </a:r>
+            <a:r>
+              <a:rPr lang="en-US" altLang="ko-KR" sz="2000">
+                <a:latin typeface="나눔고딕코딩" panose="020D0009000000000000" pitchFamily="49" charset="-127"/>
+                <a:ea typeface="나눔고딕코딩" panose="020D0009000000000000" pitchFamily="49" charset="-127"/>
+              </a:rPr>
+              <a:t> </a:t>
+            </a:r>
+            <a:r>
+              <a:rPr lang="en-US" altLang="ko-KR" sz="2000" smtClean="0">
+                <a:latin typeface="나눔고딕코딩" panose="020D0009000000000000" pitchFamily="49" charset="-127"/>
+                <a:ea typeface="나눔고딕코딩" panose="020D0009000000000000" pitchFamily="49" charset="-127"/>
+              </a:rPr>
+              <a:t>&gt;</a:t>
+            </a:r>
+            <a:br>
+              <a:rPr lang="en-US" altLang="ko-KR" sz="2000" smtClean="0">
+                <a:latin typeface="나눔고딕코딩" panose="020D0009000000000000" pitchFamily="49" charset="-127"/>
+                <a:ea typeface="나눔고딕코딩" panose="020D0009000000000000" pitchFamily="49" charset="-127"/>
+              </a:rPr>
+            </a:br>
+            <a:endParaRPr lang="en-US" altLang="ko-KR" sz="2000" smtClean="0">
+              <a:latin typeface="나눔고딕코딩" panose="020D0009000000000000" pitchFamily="49" charset="-127"/>
+              <a:ea typeface="나눔고딕코딩" panose="020D0009000000000000" pitchFamily="49" charset="-127"/>
+            </a:endParaRPr>
+          </a:p>
+          <a:p>
+            <a:r>
+              <a:rPr lang="ko-KR" altLang="en-US" sz="2000" smtClean="0">
+                <a:latin typeface="나눔고딕코딩" panose="020D0009000000000000" pitchFamily="49" charset="-127"/>
+                <a:ea typeface="나눔고딕코딩" panose="020D0009000000000000" pitchFamily="49" charset="-127"/>
+              </a:rPr>
+              <a:t>단말기 콘솔에서 </a:t>
+            </a:r>
+            <a:r>
+              <a:rPr lang="en-US" altLang="ko-KR" sz="2000" smtClean="0">
+                <a:latin typeface="나눔고딕코딩" panose="020D0009000000000000" pitchFamily="49" charset="-127"/>
+                <a:ea typeface="나눔고딕코딩" panose="020D0009000000000000" pitchFamily="49" charset="-127"/>
+              </a:rPr>
+              <a:t>hello, world</a:t>
+            </a:r>
+            <a:r>
+              <a:rPr lang="ko-KR" altLang="en-US" sz="2000" smtClean="0">
+                <a:latin typeface="나눔고딕코딩" panose="020D0009000000000000" pitchFamily="49" charset="-127"/>
+                <a:ea typeface="나눔고딕코딩" panose="020D0009000000000000" pitchFamily="49" charset="-127"/>
+              </a:rPr>
+              <a:t>라는 문자열이 출력되도록 실행 파일을 생성하세요</a:t>
+            </a:r>
+            <a:r>
+              <a:rPr lang="en-US" altLang="ko-KR" sz="2000" smtClean="0">
+                <a:latin typeface="나눔고딕코딩" panose="020D0009000000000000" pitchFamily="49" charset="-127"/>
+                <a:ea typeface="나눔고딕코딩" panose="020D0009000000000000" pitchFamily="49" charset="-127"/>
+              </a:rPr>
+              <a:t>.</a:t>
+            </a:r>
+          </a:p>
+          <a:p>
+            <a:r>
+              <a:rPr lang="ko-KR" altLang="en-US" sz="2000" smtClean="0">
+                <a:latin typeface="나눔고딕코딩" panose="020D0009000000000000" pitchFamily="49" charset="-127"/>
+                <a:ea typeface="나눔고딕코딩" panose="020D0009000000000000" pitchFamily="49" charset="-127"/>
+              </a:rPr>
+              <a:t>단</a:t>
+            </a:r>
+            <a:r>
+              <a:rPr lang="en-US" altLang="ko-KR" sz="2000" smtClean="0">
+                <a:latin typeface="나눔고딕코딩" panose="020D0009000000000000" pitchFamily="49" charset="-127"/>
+                <a:ea typeface="나눔고딕코딩" panose="020D0009000000000000" pitchFamily="49" charset="-127"/>
+              </a:rPr>
+              <a:t>, </a:t>
+            </a:r>
+            <a:r>
+              <a:rPr lang="ko-KR" altLang="en-US" sz="2000" smtClean="0">
+                <a:latin typeface="나눔고딕코딩" panose="020D0009000000000000" pitchFamily="49" charset="-127"/>
+                <a:ea typeface="나눔고딕코딩" panose="020D0009000000000000" pitchFamily="49" charset="-127"/>
+              </a:rPr>
+              <a:t>실행 파일의 이름 </a:t>
+            </a:r>
+            <a:r>
+              <a:rPr lang="en-US" altLang="ko-KR" sz="2000" smtClean="0">
+                <a:latin typeface="나눔고딕코딩" panose="020D0009000000000000" pitchFamily="49" charset="-127"/>
+                <a:ea typeface="나눔고딕코딩" panose="020D0009000000000000" pitchFamily="49" charset="-127"/>
+              </a:rPr>
+              <a:t>helloWorld</a:t>
+            </a:r>
+            <a:r>
+              <a:rPr lang="ko-KR" altLang="en-US" sz="2000" smtClean="0">
+                <a:latin typeface="나눔고딕코딩" panose="020D0009000000000000" pitchFamily="49" charset="-127"/>
+                <a:ea typeface="나눔고딕코딩" panose="020D0009000000000000" pitchFamily="49" charset="-127"/>
+              </a:rPr>
+              <a:t>로 합니다</a:t>
+            </a:r>
+            <a:r>
+              <a:rPr lang="en-US" altLang="ko-KR" sz="2000" smtClean="0">
+                <a:latin typeface="나눔고딕코딩" panose="020D0009000000000000" pitchFamily="49" charset="-127"/>
+                <a:ea typeface="나눔고딕코딩" panose="020D0009000000000000" pitchFamily="49" charset="-127"/>
+              </a:rPr>
+              <a:t>.</a:t>
+            </a:r>
+          </a:p>
+          <a:p>
+            <a:r>
+              <a:rPr lang="ko-KR" altLang="en-US" sz="2000" smtClean="0">
+                <a:latin typeface="나눔고딕코딩" panose="020D0009000000000000" pitchFamily="49" charset="-127"/>
+                <a:ea typeface="나눔고딕코딩" panose="020D0009000000000000" pitchFamily="49" charset="-127"/>
+              </a:rPr>
+              <a:t>또한 빌드는 </a:t>
+            </a:r>
+            <a:r>
+              <a:rPr lang="en-US" altLang="ko-KR" sz="2000" smtClean="0">
+                <a:latin typeface="나눔고딕코딩" panose="020D0009000000000000" pitchFamily="49" charset="-127"/>
+                <a:ea typeface="나눔고딕코딩" panose="020D0009000000000000" pitchFamily="49" charset="-127"/>
+              </a:rPr>
+              <a:t>NDK</a:t>
+            </a:r>
+            <a:r>
+              <a:rPr lang="ko-KR" altLang="en-US" sz="2000" smtClean="0">
+                <a:latin typeface="나눔고딕코딩" panose="020D0009000000000000" pitchFamily="49" charset="-127"/>
+                <a:ea typeface="나눔고딕코딩" panose="020D0009000000000000" pitchFamily="49" charset="-127"/>
+              </a:rPr>
+              <a:t>를 사용하는 것이 아니라 </a:t>
+            </a:r>
+            <a:r>
+              <a:rPr lang="en-US" altLang="ko-KR" sz="2000" smtClean="0">
+                <a:latin typeface="나눔고딕코딩" panose="020D0009000000000000" pitchFamily="49" charset="-127"/>
+                <a:ea typeface="나눔고딕코딩" panose="020D0009000000000000" pitchFamily="49" charset="-127"/>
+              </a:rPr>
+              <a:t>PDK</a:t>
+            </a:r>
+            <a:r>
+              <a:rPr lang="ko-KR" altLang="en-US" sz="2000" smtClean="0">
+                <a:latin typeface="나눔고딕코딩" panose="020D0009000000000000" pitchFamily="49" charset="-127"/>
+                <a:ea typeface="나눔고딕코딩" panose="020D0009000000000000" pitchFamily="49" charset="-127"/>
+              </a:rPr>
+              <a:t>를 사용해야 합니다</a:t>
+            </a:r>
+            <a:r>
+              <a:rPr lang="en-US" altLang="ko-KR" sz="2000" smtClean="0">
+                <a:latin typeface="나눔고딕코딩" panose="020D0009000000000000" pitchFamily="49" charset="-127"/>
+                <a:ea typeface="나눔고딕코딩" panose="020D0009000000000000" pitchFamily="49" charset="-127"/>
+              </a:rPr>
+              <a:t>.</a:t>
+            </a:r>
+          </a:p>
+        </p:txBody>
+      </p:sp>
+    </p:spTree>
+    <p:extLst>
+      <p:ext uri="{BB962C8B-B14F-4D97-AF65-F5344CB8AC3E}">
+        <p14:creationId xmlns:p14="http://schemas.microsoft.com/office/powerpoint/2010/main" val="2821763959"/>
+      </p:ext>
+    </p:extLst>
+  </p:cSld>
+  <p:clrMapOvr>
+    <a:masterClrMapping/>
+  </p:clrMapOvr>
+</p:sld>
+</file>
+
+<file path=ppt/slides/slide18.xml><?xml version="1.0" encoding="utf-8"?>
+<p:sld xmlns:a="http://schemas.openxmlformats.org/drawingml/2006/main" xmlns:r="http://schemas.openxmlformats.org/officeDocument/2006/relationships" xmlns:p="http://schemas.openxmlformats.org/presentationml/2006/main">
+  <p:cSld>
+    <p:spTree>
+      <p:nvGrpSpPr>
+        <p:cNvPr id="1" name=""/>
+        <p:cNvGrpSpPr/>
+        <p:nvPr/>
+      </p:nvGrpSpPr>
+      <p:grpSpPr>
+        <a:xfrm>
+          <a:off x="0" y="0"/>
+          <a:ext cx="0" cy="0"/>
+          <a:chOff x="0" y="0"/>
+          <a:chExt cx="0" cy="0"/>
+        </a:xfrm>
+      </p:grpSpPr>
+      <p:sp>
+        <p:nvSpPr>
+          <p:cNvPr id="4" name="TextBox 3"/>
+          <p:cNvSpPr txBox="1"/>
+          <p:nvPr/>
+        </p:nvSpPr>
+        <p:spPr>
+          <a:xfrm>
+            <a:off x="288235" y="437322"/>
+            <a:ext cx="9289723" cy="4708981"/>
+          </a:xfrm>
+          <a:prstGeom prst="rect">
+            <a:avLst/>
+          </a:prstGeom>
+          <a:noFill/>
+        </p:spPr>
+        <p:txBody>
+          <a:bodyPr wrap="none" rtlCol="0">
+            <a:spAutoFit/>
+          </a:bodyPr>
+          <a:lstStyle/>
+          <a:p>
+            <a:r>
+              <a:rPr lang="en-US" altLang="ko-KR" sz="2000" smtClean="0">
+                <a:latin typeface="나눔고딕코딩" panose="020D0009000000000000" pitchFamily="49" charset="-127"/>
+                <a:ea typeface="나눔고딕코딩" panose="020D0009000000000000" pitchFamily="49" charset="-127"/>
+              </a:rPr>
+              <a:t>&lt; </a:t>
+            </a:r>
+            <a:r>
+              <a:rPr lang="ko-KR" altLang="en-US" sz="2000" smtClean="0">
+                <a:latin typeface="나눔고딕코딩" panose="020D0009000000000000" pitchFamily="49" charset="-127"/>
+                <a:ea typeface="나눔고딕코딩" panose="020D0009000000000000" pitchFamily="49" charset="-127"/>
+              </a:rPr>
+              <a:t>바인더 라이브러리 위치 </a:t>
+            </a:r>
+            <a:r>
+              <a:rPr lang="en-US" altLang="ko-KR" sz="2000" smtClean="0">
+                <a:latin typeface="나눔고딕코딩" panose="020D0009000000000000" pitchFamily="49" charset="-127"/>
+                <a:ea typeface="나눔고딕코딩" panose="020D0009000000000000" pitchFamily="49" charset="-127"/>
+              </a:rPr>
+              <a:t>&gt;</a:t>
+            </a:r>
+          </a:p>
+          <a:p>
+            <a:endParaRPr lang="en-US" altLang="ko-KR" sz="2000">
+              <a:latin typeface="나눔고딕코딩" panose="020D0009000000000000" pitchFamily="49" charset="-127"/>
+              <a:ea typeface="나눔고딕코딩" panose="020D0009000000000000" pitchFamily="49" charset="-127"/>
+            </a:endParaRPr>
+          </a:p>
+          <a:p>
+            <a:r>
+              <a:rPr lang="en-US" altLang="ko-KR" sz="2000" smtClean="0">
+                <a:latin typeface="나눔고딕코딩" panose="020D0009000000000000" pitchFamily="49" charset="-127"/>
+                <a:ea typeface="나눔고딕코딩" panose="020D0009000000000000" pitchFamily="49" charset="-127"/>
+              </a:rPr>
+              <a:t>/android-google# ls</a:t>
+            </a:r>
+          </a:p>
+          <a:p>
+            <a:r>
+              <a:rPr lang="en-US" altLang="ko-KR" sz="2000" smtClean="0">
+                <a:latin typeface="나눔고딕코딩" panose="020D0009000000000000" pitchFamily="49" charset="-127"/>
+                <a:ea typeface="나눔고딕코딩" panose="020D0009000000000000" pitchFamily="49" charset="-127"/>
+              </a:rPr>
+              <a:t>Makefile  bootable  developers   </a:t>
+            </a:r>
+            <a:r>
+              <a:rPr lang="en-US" altLang="ko-KR" sz="2000" smtClean="0">
+                <a:solidFill>
+                  <a:srgbClr val="FF0000"/>
+                </a:solidFill>
+                <a:latin typeface="나눔고딕코딩" panose="020D0009000000000000" pitchFamily="49" charset="-127"/>
+                <a:ea typeface="나눔고딕코딩" panose="020D0009000000000000" pitchFamily="49" charset="-127"/>
+              </a:rPr>
+              <a:t>frameworks</a:t>
+            </a:r>
+            <a:r>
+              <a:rPr lang="en-US" altLang="ko-KR" sz="2000" smtClean="0">
+                <a:latin typeface="나눔고딕코딩" panose="020D0009000000000000" pitchFamily="49" charset="-127"/>
+                <a:ea typeface="나눔고딕코딩" panose="020D0009000000000000" pitchFamily="49" charset="-127"/>
+              </a:rPr>
+              <a:t>  libnativehelper  prebuilts</a:t>
+            </a:r>
+          </a:p>
+          <a:p>
+            <a:r>
+              <a:rPr lang="en-US" altLang="ko-KR" sz="2000" smtClean="0">
+                <a:latin typeface="나눔고딕코딩" panose="020D0009000000000000" pitchFamily="49" charset="-127"/>
+                <a:ea typeface="나눔고딕코딩" panose="020D0009000000000000" pitchFamily="49" charset="-127"/>
+              </a:rPr>
+              <a:t>abi       build     development  hardware    ndk              sdk</a:t>
+            </a:r>
+          </a:p>
+          <a:p>
+            <a:r>
+              <a:rPr lang="en-US" altLang="ko-KR" sz="2000" smtClean="0">
+                <a:latin typeface="나눔고딕코딩" panose="020D0009000000000000" pitchFamily="49" charset="-127"/>
+                <a:ea typeface="나눔고딕코딩" panose="020D0009000000000000" pitchFamily="49" charset="-127"/>
+              </a:rPr>
+              <a:t>art       c_tags    device       hello_pdk   out              system</a:t>
+            </a:r>
+          </a:p>
+          <a:p>
+            <a:r>
+              <a:rPr lang="en-US" altLang="ko-KR" sz="2000" smtClean="0">
+                <a:latin typeface="나눔고딕코딩" panose="020D0009000000000000" pitchFamily="49" charset="-127"/>
+                <a:ea typeface="나눔고딕코딩" panose="020D0009000000000000" pitchFamily="49" charset="-127"/>
+              </a:rPr>
+              <a:t>asm_tags  cts       docs         java_tags   packages         tools</a:t>
+            </a:r>
+          </a:p>
+          <a:p>
+            <a:r>
+              <a:rPr lang="en-US" altLang="ko-KR" sz="2000" smtClean="0">
+                <a:latin typeface="나눔고딕코딩" panose="020D0009000000000000" pitchFamily="49" charset="-127"/>
+                <a:ea typeface="나눔고딕코딩" panose="020D0009000000000000" pitchFamily="49" charset="-127"/>
+              </a:rPr>
+              <a:t>bionic    dalvik    external     libcore     pdk</a:t>
+            </a:r>
+          </a:p>
+          <a:p>
+            <a:endParaRPr lang="en-US" altLang="ko-KR" sz="2000">
+              <a:latin typeface="나눔고딕코딩" panose="020D0009000000000000" pitchFamily="49" charset="-127"/>
+              <a:ea typeface="나눔고딕코딩" panose="020D0009000000000000" pitchFamily="49" charset="-127"/>
+            </a:endParaRPr>
+          </a:p>
+          <a:p>
+            <a:r>
+              <a:rPr lang="ko-KR" altLang="en-US" sz="2000" smtClean="0">
+                <a:latin typeface="나눔고딕코딩" panose="020D0009000000000000" pitchFamily="49" charset="-127"/>
+                <a:ea typeface="나눔고딕코딩" panose="020D0009000000000000" pitchFamily="49" charset="-127"/>
+              </a:rPr>
+              <a:t>다음의 경로로 이동합니다</a:t>
+            </a:r>
+            <a:r>
+              <a:rPr lang="en-US" altLang="ko-KR" sz="2000" smtClean="0">
+                <a:latin typeface="나눔고딕코딩" panose="020D0009000000000000" pitchFamily="49" charset="-127"/>
+                <a:ea typeface="나눔고딕코딩" panose="020D0009000000000000" pitchFamily="49" charset="-127"/>
+              </a:rPr>
+              <a:t>.</a:t>
+            </a:r>
+          </a:p>
+          <a:p>
+            <a:r>
+              <a:rPr lang="en-US" altLang="ko-KR" sz="2000" smtClean="0">
+                <a:latin typeface="나눔고딕코딩" panose="020D0009000000000000" pitchFamily="49" charset="-127"/>
+                <a:ea typeface="나눔고딕코딩" panose="020D0009000000000000" pitchFamily="49" charset="-127"/>
+              </a:rPr>
+              <a:t># cd /root/android-google/frameworks/native/cmds/servicemanager</a:t>
+            </a:r>
+          </a:p>
+          <a:p>
+            <a:r>
+              <a:rPr lang="en-US" altLang="ko-KR" sz="2000" smtClean="0">
+                <a:latin typeface="나눔고딕코딩" panose="020D0009000000000000" pitchFamily="49" charset="-127"/>
+                <a:ea typeface="나눔고딕코딩" panose="020D0009000000000000" pitchFamily="49" charset="-127"/>
+              </a:rPr>
+              <a:t># ls</a:t>
+            </a:r>
+          </a:p>
+          <a:p>
+            <a:r>
+              <a:rPr lang="en-US" altLang="ko-KR" sz="2000" smtClean="0">
+                <a:latin typeface="나눔고딕코딩" panose="020D0009000000000000" pitchFamily="49" charset="-127"/>
+                <a:ea typeface="나눔고딕코딩" panose="020D0009000000000000" pitchFamily="49" charset="-127"/>
+              </a:rPr>
+              <a:t>Android.mk  bctest.c  </a:t>
+            </a:r>
+            <a:r>
+              <a:rPr lang="en-US" altLang="ko-KR" sz="2000" smtClean="0">
+                <a:solidFill>
+                  <a:srgbClr val="FF0000"/>
+                </a:solidFill>
+                <a:latin typeface="나눔고딕코딩" panose="020D0009000000000000" pitchFamily="49" charset="-127"/>
+                <a:ea typeface="나눔고딕코딩" panose="020D0009000000000000" pitchFamily="49" charset="-127"/>
+              </a:rPr>
+              <a:t>binder.c  binder.h  </a:t>
+            </a:r>
+            <a:r>
+              <a:rPr lang="en-US" altLang="ko-KR" sz="2000" smtClean="0">
+                <a:latin typeface="나눔고딕코딩" panose="020D0009000000000000" pitchFamily="49" charset="-127"/>
+                <a:ea typeface="나눔고딕코딩" panose="020D0009000000000000" pitchFamily="49" charset="-127"/>
+              </a:rPr>
+              <a:t>service_manager.c</a:t>
+            </a:r>
+          </a:p>
+          <a:p>
+            <a:endParaRPr lang="en-US" altLang="ko-KR" sz="2000" smtClean="0">
+              <a:latin typeface="나눔고딕코딩" panose="020D0009000000000000" pitchFamily="49" charset="-127"/>
+              <a:ea typeface="나눔고딕코딩" panose="020D0009000000000000" pitchFamily="49" charset="-127"/>
+            </a:endParaRPr>
+          </a:p>
+          <a:p>
+            <a:endParaRPr lang="ko-KR" altLang="en-US" sz="2000" smtClean="0">
+              <a:latin typeface="나눔고딕코딩" panose="020D0009000000000000" pitchFamily="49" charset="-127"/>
+              <a:ea typeface="나눔고딕코딩" panose="020D0009000000000000" pitchFamily="49" charset="-127"/>
+            </a:endParaRPr>
+          </a:p>
+        </p:txBody>
+      </p:sp>
+    </p:spTree>
+    <p:extLst>
+      <p:ext uri="{BB962C8B-B14F-4D97-AF65-F5344CB8AC3E}">
+        <p14:creationId xmlns:p14="http://schemas.microsoft.com/office/powerpoint/2010/main" val="3905611041"/>
+      </p:ext>
+    </p:extLst>
+  </p:cSld>
+  <p:clrMapOvr>
+    <a:masterClrMapping/>
+  </p:clrMapOvr>
+</p:sld>
+</file>
+
+<file path=ppt/slides/slide19.xml><?xml version="1.0" encoding="utf-8"?>
+<p:sld xmlns:a="http://schemas.openxmlformats.org/drawingml/2006/main" xmlns:r="http://schemas.openxmlformats.org/officeDocument/2006/relationships" xmlns:p="http://schemas.openxmlformats.org/presentationml/2006/main">
+  <p:cSld>
+    <p:spTree>
+      <p:nvGrpSpPr>
+        <p:cNvPr id="1" name=""/>
+        <p:cNvGrpSpPr/>
+        <p:nvPr/>
+      </p:nvGrpSpPr>
+      <p:grpSpPr>
+        <a:xfrm>
+          <a:off x="0" y="0"/>
+          <a:ext cx="0" cy="0"/>
+          <a:chOff x="0" y="0"/>
+          <a:chExt cx="0" cy="0"/>
+        </a:xfrm>
+      </p:grpSpPr>
+      <p:sp>
+        <p:nvSpPr>
+          <p:cNvPr id="4" name="TextBox 3"/>
+          <p:cNvSpPr txBox="1"/>
+          <p:nvPr/>
+        </p:nvSpPr>
+        <p:spPr>
+          <a:xfrm>
+            <a:off x="238539" y="258418"/>
+            <a:ext cx="10572125" cy="5016758"/>
+          </a:xfrm>
+          <a:prstGeom prst="rect">
+            <a:avLst/>
+          </a:prstGeom>
+          <a:noFill/>
+        </p:spPr>
+        <p:txBody>
+          <a:bodyPr wrap="none" rtlCol="0">
+            <a:spAutoFit/>
+          </a:bodyPr>
+          <a:lstStyle/>
+          <a:p>
+            <a:r>
+              <a:rPr lang="en-US" altLang="ko-KR" sz="2000" smtClean="0">
+                <a:latin typeface="나눔고딕코딩" panose="020D0009000000000000" pitchFamily="49" charset="-127"/>
+                <a:ea typeface="나눔고딕코딩" panose="020D0009000000000000" pitchFamily="49" charset="-127"/>
+              </a:rPr>
+              <a:t>&lt; led_service </a:t>
+            </a:r>
+            <a:r>
+              <a:rPr lang="ko-KR" altLang="en-US" sz="2000" smtClean="0">
+                <a:latin typeface="나눔고딕코딩" panose="020D0009000000000000" pitchFamily="49" charset="-127"/>
+                <a:ea typeface="나눔고딕코딩" panose="020D0009000000000000" pitchFamily="49" charset="-127"/>
+              </a:rPr>
+              <a:t>구현 </a:t>
+            </a:r>
+            <a:r>
+              <a:rPr lang="en-US" altLang="ko-KR" sz="2000" smtClean="0">
+                <a:latin typeface="나눔고딕코딩" panose="020D0009000000000000" pitchFamily="49" charset="-127"/>
+                <a:ea typeface="나눔고딕코딩" panose="020D0009000000000000" pitchFamily="49" charset="-127"/>
+              </a:rPr>
+              <a:t>&gt;</a:t>
+            </a:r>
+          </a:p>
+          <a:p>
+            <a:endParaRPr lang="en-US" altLang="ko-KR" sz="2000">
+              <a:latin typeface="나눔고딕코딩" panose="020D0009000000000000" pitchFamily="49" charset="-127"/>
+              <a:ea typeface="나눔고딕코딩" panose="020D0009000000000000" pitchFamily="49" charset="-127"/>
+            </a:endParaRPr>
+          </a:p>
+          <a:p>
+            <a:r>
+              <a:rPr lang="en-US" altLang="ko-KR" sz="2000" smtClean="0">
+                <a:latin typeface="나눔고딕코딩" panose="020D0009000000000000" pitchFamily="49" charset="-127"/>
+                <a:ea typeface="나눔고딕코딩" panose="020D0009000000000000" pitchFamily="49" charset="-127"/>
+              </a:rPr>
+              <a:t>1. aosp </a:t>
+            </a:r>
+            <a:r>
+              <a:rPr lang="ko-KR" altLang="en-US" sz="2000" smtClean="0">
+                <a:latin typeface="나눔고딕코딩" panose="020D0009000000000000" pitchFamily="49" charset="-127"/>
+                <a:ea typeface="나눔고딕코딩" panose="020D0009000000000000" pitchFamily="49" charset="-127"/>
+              </a:rPr>
+              <a:t>폴더 내에 </a:t>
+            </a:r>
+            <a:r>
+              <a:rPr lang="en-US" altLang="ko-KR" sz="2000" smtClean="0">
+                <a:latin typeface="나눔고딕코딩" panose="020D0009000000000000" pitchFamily="49" charset="-127"/>
+                <a:ea typeface="나눔고딕코딩" panose="020D0009000000000000" pitchFamily="49" charset="-127"/>
+              </a:rPr>
+              <a:t>led_service</a:t>
+            </a:r>
+            <a:r>
+              <a:rPr lang="ko-KR" altLang="en-US" sz="2000" smtClean="0">
+                <a:latin typeface="나눔고딕코딩" panose="020D0009000000000000" pitchFamily="49" charset="-127"/>
+                <a:ea typeface="나눔고딕코딩" panose="020D0009000000000000" pitchFamily="49" charset="-127"/>
+              </a:rPr>
+              <a:t>라는 프로젝트 폴더를 생성합니다</a:t>
+            </a:r>
+            <a:r>
+              <a:rPr lang="en-US" altLang="ko-KR" sz="2000" smtClean="0">
+                <a:latin typeface="나눔고딕코딩" panose="020D0009000000000000" pitchFamily="49" charset="-127"/>
+                <a:ea typeface="나눔고딕코딩" panose="020D0009000000000000" pitchFamily="49" charset="-127"/>
+              </a:rPr>
+              <a:t>.</a:t>
+            </a:r>
+          </a:p>
+          <a:p>
+            <a:endParaRPr lang="en-US" altLang="ko-KR" sz="2000" smtClean="0">
+              <a:latin typeface="나눔고딕코딩" panose="020D0009000000000000" pitchFamily="49" charset="-127"/>
+              <a:ea typeface="나눔고딕코딩" panose="020D0009000000000000" pitchFamily="49" charset="-127"/>
+            </a:endParaRPr>
+          </a:p>
+          <a:p>
+            <a:r>
+              <a:rPr lang="en-US" altLang="ko-KR" sz="2000" smtClean="0">
+                <a:latin typeface="나눔고딕코딩" panose="020D0009000000000000" pitchFamily="49" charset="-127"/>
+                <a:ea typeface="나눔고딕코딩" panose="020D0009000000000000" pitchFamily="49" charset="-127"/>
+              </a:rPr>
+              <a:t>2. servicemanager </a:t>
+            </a:r>
+            <a:r>
+              <a:rPr lang="ko-KR" altLang="en-US" sz="2000" smtClean="0">
+                <a:latin typeface="나눔고딕코딩" panose="020D0009000000000000" pitchFamily="49" charset="-127"/>
+                <a:ea typeface="나눔고딕코딩" panose="020D0009000000000000" pitchFamily="49" charset="-127"/>
+              </a:rPr>
+              <a:t>폴더의 모든 코드를 현재 프로젝트 폴더에 복사하세요</a:t>
+            </a:r>
+            <a:r>
+              <a:rPr lang="en-US" altLang="ko-KR" sz="2000" smtClean="0">
+                <a:latin typeface="나눔고딕코딩" panose="020D0009000000000000" pitchFamily="49" charset="-127"/>
+                <a:ea typeface="나눔고딕코딩" panose="020D0009000000000000" pitchFamily="49" charset="-127"/>
+              </a:rPr>
+              <a:t>.</a:t>
+            </a:r>
+          </a:p>
+          <a:p>
+            <a:endParaRPr lang="en-US" altLang="ko-KR" sz="2000" smtClean="0">
+              <a:latin typeface="나눔고딕코딩" panose="020D0009000000000000" pitchFamily="49" charset="-127"/>
+              <a:ea typeface="나눔고딕코딩" panose="020D0009000000000000" pitchFamily="49" charset="-127"/>
+            </a:endParaRPr>
+          </a:p>
+          <a:p>
+            <a:r>
+              <a:rPr lang="en-US" altLang="ko-KR" sz="2000" smtClean="0">
+                <a:latin typeface="나눔고딕코딩" panose="020D0009000000000000" pitchFamily="49" charset="-127"/>
+                <a:ea typeface="나눔고딕코딩" panose="020D0009000000000000" pitchFamily="49" charset="-127"/>
+              </a:rPr>
+              <a:t>led_service # cp ../frameworks/native/cmds/servicemanager/* </a:t>
+            </a:r>
+            <a:r>
+              <a:rPr lang="en-US" altLang="ko-KR" sz="2000" smtClean="0">
+                <a:solidFill>
+                  <a:srgbClr val="FF0000"/>
+                </a:solidFill>
+                <a:latin typeface="나눔고딕코딩" panose="020D0009000000000000" pitchFamily="49" charset="-127"/>
+                <a:ea typeface="나눔고딕코딩" panose="020D0009000000000000" pitchFamily="49" charset="-127"/>
+              </a:rPr>
+              <a:t>.</a:t>
+            </a:r>
+          </a:p>
+          <a:p>
+            <a:r>
+              <a:rPr lang="en-US" altLang="ko-KR" sz="2000" smtClean="0">
+                <a:latin typeface="나눔고딕코딩" panose="020D0009000000000000" pitchFamily="49" charset="-127"/>
+                <a:ea typeface="나눔고딕코딩" panose="020D0009000000000000" pitchFamily="49" charset="-127"/>
+              </a:rPr>
+              <a:t>led_service # ls</a:t>
+            </a:r>
+          </a:p>
+          <a:p>
+            <a:r>
+              <a:rPr lang="en-US" altLang="ko-KR" sz="2000" smtClean="0">
+                <a:latin typeface="나눔고딕코딩" panose="020D0009000000000000" pitchFamily="49" charset="-127"/>
+                <a:ea typeface="나눔고딕코딩" panose="020D0009000000000000" pitchFamily="49" charset="-127"/>
+              </a:rPr>
+              <a:t>Android.mk  bctest.c  binder.c  binder.h  service_manager.c</a:t>
+            </a:r>
+          </a:p>
+          <a:p>
+            <a:endParaRPr lang="en-US" altLang="ko-KR" sz="2000">
+              <a:latin typeface="나눔고딕코딩" panose="020D0009000000000000" pitchFamily="49" charset="-127"/>
+              <a:ea typeface="나눔고딕코딩" panose="020D0009000000000000" pitchFamily="49" charset="-127"/>
+            </a:endParaRPr>
+          </a:p>
+          <a:p>
+            <a:r>
+              <a:rPr lang="en-US" altLang="ko-KR" sz="2000" smtClean="0">
+                <a:latin typeface="나눔고딕코딩" panose="020D0009000000000000" pitchFamily="49" charset="-127"/>
+                <a:ea typeface="나눔고딕코딩" panose="020D0009000000000000" pitchFamily="49" charset="-127"/>
+              </a:rPr>
+              <a:t>3. bctest.c </a:t>
+            </a:r>
+            <a:r>
+              <a:rPr lang="ko-KR" altLang="en-US" sz="2000" smtClean="0">
+                <a:latin typeface="나눔고딕코딩" panose="020D0009000000000000" pitchFamily="49" charset="-127"/>
+                <a:ea typeface="나눔고딕코딩" panose="020D0009000000000000" pitchFamily="49" charset="-127"/>
+              </a:rPr>
+              <a:t>파일을 복사하여 </a:t>
+            </a:r>
+            <a:r>
+              <a:rPr lang="en-US" altLang="ko-KR" sz="2000" smtClean="0">
+                <a:latin typeface="나눔고딕코딩" panose="020D0009000000000000" pitchFamily="49" charset="-127"/>
+                <a:ea typeface="나눔고딕코딩" panose="020D0009000000000000" pitchFamily="49" charset="-127"/>
+              </a:rPr>
+              <a:t>led_service.c</a:t>
+            </a:r>
+            <a:r>
+              <a:rPr lang="ko-KR" altLang="en-US" sz="2000" smtClean="0">
+                <a:latin typeface="나눔고딕코딩" panose="020D0009000000000000" pitchFamily="49" charset="-127"/>
+                <a:ea typeface="나눔고딕코딩" panose="020D0009000000000000" pitchFamily="49" charset="-127"/>
+              </a:rPr>
+              <a:t>와 </a:t>
+            </a:r>
+            <a:r>
+              <a:rPr lang="en-US" altLang="ko-KR" sz="2000" smtClean="0">
+                <a:latin typeface="나눔고딕코딩" panose="020D0009000000000000" pitchFamily="49" charset="-127"/>
+                <a:ea typeface="나눔고딕코딩" panose="020D0009000000000000" pitchFamily="49" charset="-127"/>
+              </a:rPr>
+              <a:t>led_client.c </a:t>
+            </a:r>
+            <a:r>
+              <a:rPr lang="ko-KR" altLang="en-US" sz="2000" smtClean="0">
+                <a:latin typeface="나눔고딕코딩" panose="020D0009000000000000" pitchFamily="49" charset="-127"/>
+                <a:ea typeface="나눔고딕코딩" panose="020D0009000000000000" pitchFamily="49" charset="-127"/>
+              </a:rPr>
+              <a:t>파일을 생성하세요</a:t>
+            </a:r>
+            <a:endParaRPr lang="en-US" altLang="ko-KR" sz="2000" smtClean="0">
+              <a:latin typeface="나눔고딕코딩" panose="020D0009000000000000" pitchFamily="49" charset="-127"/>
+              <a:ea typeface="나눔고딕코딩" panose="020D0009000000000000" pitchFamily="49" charset="-127"/>
+            </a:endParaRPr>
+          </a:p>
+          <a:p>
+            <a:endParaRPr lang="en-US" altLang="ko-KR" sz="2000">
+              <a:latin typeface="나눔고딕코딩" panose="020D0009000000000000" pitchFamily="49" charset="-127"/>
+              <a:ea typeface="나눔고딕코딩" panose="020D0009000000000000" pitchFamily="49" charset="-127"/>
+            </a:endParaRPr>
+          </a:p>
+          <a:p>
+            <a:r>
+              <a:rPr lang="en-US" altLang="ko-KR" sz="2000" smtClean="0">
+                <a:latin typeface="나눔고딕코딩" panose="020D0009000000000000" pitchFamily="49" charset="-127"/>
+                <a:ea typeface="나눔고딕코딩" panose="020D0009000000000000" pitchFamily="49" charset="-127"/>
+              </a:rPr>
+              <a:t>4. led_service.c</a:t>
+            </a:r>
+            <a:r>
+              <a:rPr lang="ko-KR" altLang="en-US" sz="2000" smtClean="0">
+                <a:latin typeface="나눔고딕코딩" panose="020D0009000000000000" pitchFamily="49" charset="-127"/>
+                <a:ea typeface="나눔고딕코딩" panose="020D0009000000000000" pitchFamily="49" charset="-127"/>
+              </a:rPr>
+              <a:t>와 </a:t>
+            </a:r>
+            <a:r>
+              <a:rPr lang="en-US" altLang="ko-KR" sz="2000" smtClean="0">
+                <a:latin typeface="나눔고딕코딩" panose="020D0009000000000000" pitchFamily="49" charset="-127"/>
+                <a:ea typeface="나눔고딕코딩" panose="020D0009000000000000" pitchFamily="49" charset="-127"/>
+              </a:rPr>
+              <a:t>led_client.c </a:t>
+            </a:r>
+            <a:r>
+              <a:rPr lang="ko-KR" altLang="en-US" sz="2000" smtClean="0">
+                <a:latin typeface="나눔고딕코딩" panose="020D0009000000000000" pitchFamily="49" charset="-127"/>
+                <a:ea typeface="나눔고딕코딩" panose="020D0009000000000000" pitchFamily="49" charset="-127"/>
+              </a:rPr>
+              <a:t>코드를 수정합니다</a:t>
+            </a:r>
+            <a:r>
+              <a:rPr lang="en-US" altLang="ko-KR" sz="2000" smtClean="0">
+                <a:latin typeface="나눔고딕코딩" panose="020D0009000000000000" pitchFamily="49" charset="-127"/>
+                <a:ea typeface="나눔고딕코딩" panose="020D0009000000000000" pitchFamily="49" charset="-127"/>
+              </a:rPr>
+              <a:t>. </a:t>
+            </a:r>
+            <a:r>
+              <a:rPr lang="ko-KR" altLang="en-US" sz="2000" smtClean="0">
+                <a:latin typeface="나눔고딕코딩" panose="020D0009000000000000" pitchFamily="49" charset="-127"/>
+                <a:ea typeface="나눔고딕코딩" panose="020D0009000000000000" pitchFamily="49" charset="-127"/>
+              </a:rPr>
+              <a:t>수정은 파일을 참고하세요</a:t>
+            </a:r>
+            <a:r>
+              <a:rPr lang="en-US" altLang="ko-KR" sz="2000" smtClean="0">
+                <a:latin typeface="나눔고딕코딩" panose="020D0009000000000000" pitchFamily="49" charset="-127"/>
+                <a:ea typeface="나눔고딕코딩" panose="020D0009000000000000" pitchFamily="49" charset="-127"/>
+              </a:rPr>
+              <a:t>.</a:t>
+            </a:r>
+          </a:p>
+          <a:p>
+            <a:endParaRPr lang="en-US" altLang="ko-KR" sz="2000">
+              <a:latin typeface="나눔고딕코딩" panose="020D0009000000000000" pitchFamily="49" charset="-127"/>
+              <a:ea typeface="나눔고딕코딩" panose="020D0009000000000000" pitchFamily="49" charset="-127"/>
+            </a:endParaRPr>
+          </a:p>
+          <a:p>
+            <a:r>
+              <a:rPr lang="en-US" altLang="ko-KR" sz="2000" smtClean="0">
+                <a:latin typeface="나눔고딕코딩" panose="020D0009000000000000" pitchFamily="49" charset="-127"/>
+                <a:ea typeface="나눔고딕코딩" panose="020D0009000000000000" pitchFamily="49" charset="-127"/>
+              </a:rPr>
+              <a:t>5. PDK </a:t>
+            </a:r>
+            <a:r>
+              <a:rPr lang="ko-KR" altLang="en-US" sz="2000" smtClean="0">
+                <a:latin typeface="나눔고딕코딩" panose="020D0009000000000000" pitchFamily="49" charset="-127"/>
+                <a:ea typeface="나눔고딕코딩" panose="020D0009000000000000" pitchFamily="49" charset="-127"/>
+              </a:rPr>
+              <a:t>빌드 후</a:t>
+            </a:r>
+            <a:r>
+              <a:rPr lang="en-US" altLang="ko-KR" sz="2000" smtClean="0">
+                <a:latin typeface="나눔고딕코딩" panose="020D0009000000000000" pitchFamily="49" charset="-127"/>
+                <a:ea typeface="나눔고딕코딩" panose="020D0009000000000000" pitchFamily="49" charset="-127"/>
+              </a:rPr>
+              <a:t>, </a:t>
+            </a:r>
+            <a:r>
+              <a:rPr lang="ko-KR" altLang="en-US" sz="2000" smtClean="0">
+                <a:latin typeface="나눔고딕코딩" panose="020D0009000000000000" pitchFamily="49" charset="-127"/>
+                <a:ea typeface="나눔고딕코딩" panose="020D0009000000000000" pitchFamily="49" charset="-127"/>
+              </a:rPr>
+              <a:t>단말기에 밀어넣고 창을 </a:t>
+            </a:r>
+            <a:r>
+              <a:rPr lang="en-US" altLang="ko-KR" sz="2000" smtClean="0">
+                <a:latin typeface="나눔고딕코딩" panose="020D0009000000000000" pitchFamily="49" charset="-127"/>
+                <a:ea typeface="나눔고딕코딩" panose="020D0009000000000000" pitchFamily="49" charset="-127"/>
+              </a:rPr>
+              <a:t>2</a:t>
+            </a:r>
+            <a:r>
+              <a:rPr lang="ko-KR" altLang="en-US" sz="2000" smtClean="0">
+                <a:latin typeface="나눔고딕코딩" panose="020D0009000000000000" pitchFamily="49" charset="-127"/>
+                <a:ea typeface="나눔고딕코딩" panose="020D0009000000000000" pitchFamily="49" charset="-127"/>
+              </a:rPr>
+              <a:t>개 실행한 후</a:t>
+            </a:r>
+            <a:r>
+              <a:rPr lang="en-US" altLang="ko-KR" sz="2000" smtClean="0">
+                <a:latin typeface="나눔고딕코딩" panose="020D0009000000000000" pitchFamily="49" charset="-127"/>
+                <a:ea typeface="나눔고딕코딩" panose="020D0009000000000000" pitchFamily="49" charset="-127"/>
+              </a:rPr>
+              <a:t>, </a:t>
+            </a:r>
+            <a:r>
+              <a:rPr lang="ko-KR" altLang="en-US" sz="2000" smtClean="0">
+                <a:latin typeface="나눔고딕코딩" panose="020D0009000000000000" pitchFamily="49" charset="-127"/>
+                <a:ea typeface="나눔고딕코딩" panose="020D0009000000000000" pitchFamily="49" charset="-127"/>
+              </a:rPr>
+              <a:t>한쪽에는 </a:t>
+            </a:r>
+            <a:r>
+              <a:rPr lang="en-US" altLang="ko-KR" sz="2000" smtClean="0">
+                <a:latin typeface="나눔고딕코딩" panose="020D0009000000000000" pitchFamily="49" charset="-127"/>
+                <a:ea typeface="나눔고딕코딩" panose="020D0009000000000000" pitchFamily="49" charset="-127"/>
+              </a:rPr>
+              <a:t>led_service</a:t>
+            </a:r>
+            <a:r>
+              <a:rPr lang="ko-KR" altLang="en-US" sz="2000" smtClean="0">
+                <a:latin typeface="나눔고딕코딩" panose="020D0009000000000000" pitchFamily="49" charset="-127"/>
+                <a:ea typeface="나눔고딕코딩" panose="020D0009000000000000" pitchFamily="49" charset="-127"/>
+              </a:rPr>
+              <a:t>를 실행</a:t>
+            </a:r>
+            <a:endParaRPr lang="en-US" altLang="ko-KR" sz="2000" smtClean="0">
+              <a:latin typeface="나눔고딕코딩" panose="020D0009000000000000" pitchFamily="49" charset="-127"/>
+              <a:ea typeface="나눔고딕코딩" panose="020D0009000000000000" pitchFamily="49" charset="-127"/>
+            </a:endParaRPr>
+          </a:p>
+          <a:p>
+            <a:r>
+              <a:rPr lang="ko-KR" altLang="en-US" sz="2000" smtClean="0">
+                <a:latin typeface="나눔고딕코딩" panose="020D0009000000000000" pitchFamily="49" charset="-127"/>
+                <a:ea typeface="나눔고딕코딩" panose="020D0009000000000000" pitchFamily="49" charset="-127"/>
+              </a:rPr>
+              <a:t>하시고 한 쪽은 </a:t>
+            </a:r>
+            <a:r>
+              <a:rPr lang="en-US" altLang="ko-KR" sz="2000" smtClean="0">
+                <a:latin typeface="나눔고딕코딩" panose="020D0009000000000000" pitchFamily="49" charset="-127"/>
+                <a:ea typeface="나눔고딕코딩" panose="020D0009000000000000" pitchFamily="49" charset="-127"/>
+              </a:rPr>
+              <a:t>led_client</a:t>
+            </a:r>
+            <a:r>
+              <a:rPr lang="ko-KR" altLang="en-US" sz="2000" smtClean="0">
+                <a:latin typeface="나눔고딕코딩" panose="020D0009000000000000" pitchFamily="49" charset="-127"/>
+                <a:ea typeface="나눔고딕코딩" panose="020D0009000000000000" pitchFamily="49" charset="-127"/>
+              </a:rPr>
+              <a:t>를 실행하면 됩니다</a:t>
+            </a:r>
+            <a:r>
+              <a:rPr lang="en-US" altLang="ko-KR" sz="2000" smtClean="0">
+                <a:latin typeface="나눔고딕코딩" panose="020D0009000000000000" pitchFamily="49" charset="-127"/>
+                <a:ea typeface="나눔고딕코딩" panose="020D0009000000000000" pitchFamily="49" charset="-127"/>
+              </a:rPr>
+              <a:t>.</a:t>
+            </a:r>
+            <a:endParaRPr lang="ko-KR" altLang="en-US" sz="2000" smtClean="0">
+              <a:latin typeface="나눔고딕코딩" panose="020D0009000000000000" pitchFamily="49" charset="-127"/>
+              <a:ea typeface="나눔고딕코딩" panose="020D0009000000000000" pitchFamily="49" charset="-127"/>
+            </a:endParaRPr>
+          </a:p>
+        </p:txBody>
+      </p:sp>
+    </p:spTree>
+    <p:extLst>
+      <p:ext uri="{BB962C8B-B14F-4D97-AF65-F5344CB8AC3E}">
+        <p14:creationId xmlns:p14="http://schemas.microsoft.com/office/powerpoint/2010/main" val="3352895905"/>
+      </p:ext>
+    </p:extLst>
+  </p:cSld>
+  <p:clrMapOvr>
+    <a:masterClrMapping/>
+  </p:clrMapOvr>
+</p:sld>
+</file>
+
 <file path=ppt/slides/slide2.xml><?xml version="1.0" encoding="utf-8"?>
 <p:sld xmlns:a="http://schemas.openxmlformats.org/drawingml/2006/main" xmlns:r="http://schemas.openxmlformats.org/officeDocument/2006/relationships" xmlns:p="http://schemas.openxmlformats.org/presentationml/2006/main">
   <p:cSld>
@@ -3564,6 +6339,36 @@
     <p:extLst>
       <p:ext uri="{BB962C8B-B14F-4D97-AF65-F5344CB8AC3E}">
         <p14:creationId xmlns:p14="http://schemas.microsoft.com/office/powerpoint/2010/main" val="107687247"/>
+      </p:ext>
+    </p:extLst>
+  </p:cSld>
+  <p:clrMapOvr>
+    <a:masterClrMapping/>
+  </p:clrMapOvr>
+</p:sld>
+</file>
+
+<file path=ppt/slides/slide20.xml><?xml version="1.0" encoding="utf-8"?>
+<p:sld xmlns:a="http://schemas.openxmlformats.org/drawingml/2006/main" xmlns:r="http://schemas.openxmlformats.org/officeDocument/2006/relationships" xmlns:p="http://schemas.openxmlformats.org/presentationml/2006/main">
+  <p:cSld>
+    <p:spTree>
+      <p:nvGrpSpPr>
+        <p:cNvPr id="1" name=""/>
+        <p:cNvGrpSpPr/>
+        <p:nvPr/>
+      </p:nvGrpSpPr>
+      <p:grpSpPr>
+        <a:xfrm>
+          <a:off x="0" y="0"/>
+          <a:ext cx="0" cy="0"/>
+          <a:chOff x="0" y="0"/>
+          <a:chExt cx="0" cy="0"/>
+        </a:xfrm>
+      </p:grpSpPr>
+    </p:spTree>
+    <p:extLst>
+      <p:ext uri="{BB962C8B-B14F-4D97-AF65-F5344CB8AC3E}">
+        <p14:creationId xmlns:p14="http://schemas.microsoft.com/office/powerpoint/2010/main" val="802483471"/>
       </p:ext>
     </p:extLst>
   </p:cSld>
@@ -3855,6 +6660,1541 @@
     <p:extLst>
       <p:ext uri="{BB962C8B-B14F-4D97-AF65-F5344CB8AC3E}">
         <p14:creationId xmlns:p14="http://schemas.microsoft.com/office/powerpoint/2010/main" val="187321439"/>
+      </p:ext>
+    </p:extLst>
+  </p:cSld>
+  <p:clrMapOvr>
+    <a:masterClrMapping/>
+  </p:clrMapOvr>
+</p:sld>
+</file>
+
+<file path=ppt/slides/slide4.xml><?xml version="1.0" encoding="utf-8"?>
+<p:sld xmlns:a="http://schemas.openxmlformats.org/drawingml/2006/main" xmlns:r="http://schemas.openxmlformats.org/officeDocument/2006/relationships" xmlns:p="http://schemas.openxmlformats.org/presentationml/2006/main">
+  <p:cSld>
+    <p:spTree>
+      <p:nvGrpSpPr>
+        <p:cNvPr id="1" name=""/>
+        <p:cNvGrpSpPr/>
+        <p:nvPr/>
+      </p:nvGrpSpPr>
+      <p:grpSpPr>
+        <a:xfrm>
+          <a:off x="0" y="0"/>
+          <a:ext cx="0" cy="0"/>
+          <a:chOff x="0" y="0"/>
+          <a:chExt cx="0" cy="0"/>
+        </a:xfrm>
+      </p:grpSpPr>
+      <p:sp>
+        <p:nvSpPr>
+          <p:cNvPr id="4" name="TextBox 3"/>
+          <p:cNvSpPr txBox="1"/>
+          <p:nvPr/>
+        </p:nvSpPr>
+        <p:spPr>
+          <a:xfrm>
+            <a:off x="288235" y="397565"/>
+            <a:ext cx="6853158" cy="6555641"/>
+          </a:xfrm>
+          <a:prstGeom prst="rect">
+            <a:avLst/>
+          </a:prstGeom>
+          <a:noFill/>
+        </p:spPr>
+        <p:txBody>
+          <a:bodyPr wrap="none" rtlCol="0">
+            <a:spAutoFit/>
+          </a:bodyPr>
+          <a:lstStyle/>
+          <a:p>
+            <a:r>
+              <a:rPr lang="en-US" altLang="ko-KR" sz="2000" smtClean="0">
+                <a:latin typeface="나눔고딕코딩" panose="020D0009000000000000" pitchFamily="49" charset="-127"/>
+                <a:ea typeface="나눔고딕코딩" panose="020D0009000000000000" pitchFamily="49" charset="-127"/>
+              </a:rPr>
+              <a:t>&lt; </a:t>
+            </a:r>
+            <a:r>
+              <a:rPr lang="ko-KR" altLang="en-US" sz="2000" smtClean="0">
+                <a:latin typeface="나눔고딕코딩" panose="020D0009000000000000" pitchFamily="49" charset="-127"/>
+                <a:ea typeface="나눔고딕코딩" panose="020D0009000000000000" pitchFamily="49" charset="-127"/>
+              </a:rPr>
+              <a:t>단말기 백라이트 제어 방법 </a:t>
+            </a:r>
+            <a:r>
+              <a:rPr lang="en-US" altLang="ko-KR" sz="2000" smtClean="0">
+                <a:latin typeface="나눔고딕코딩" panose="020D0009000000000000" pitchFamily="49" charset="-127"/>
+                <a:ea typeface="나눔고딕코딩" panose="020D0009000000000000" pitchFamily="49" charset="-127"/>
+              </a:rPr>
+              <a:t>&gt;</a:t>
+            </a:r>
+          </a:p>
+          <a:p>
+            <a:endParaRPr lang="en-US" altLang="ko-KR" sz="2000">
+              <a:latin typeface="나눔고딕코딩" panose="020D0009000000000000" pitchFamily="49" charset="-127"/>
+              <a:ea typeface="나눔고딕코딩" panose="020D0009000000000000" pitchFamily="49" charset="-127"/>
+            </a:endParaRPr>
+          </a:p>
+          <a:p>
+            <a:r>
+              <a:rPr lang="en-US" altLang="ko-KR" sz="2000" smtClean="0">
+                <a:latin typeface="나눔고딕코딩" panose="020D0009000000000000" pitchFamily="49" charset="-127"/>
+                <a:ea typeface="나눔고딕코딩" panose="020D0009000000000000" pitchFamily="49" charset="-127"/>
+              </a:rPr>
+              <a:t>1. </a:t>
+            </a:r>
+            <a:r>
+              <a:rPr lang="ko-KR" altLang="en-US" sz="2000" smtClean="0">
+                <a:latin typeface="나눔고딕코딩" panose="020D0009000000000000" pitchFamily="49" charset="-127"/>
+                <a:ea typeface="나눔고딕코딩" panose="020D0009000000000000" pitchFamily="49" charset="-127"/>
+              </a:rPr>
+              <a:t>단말기 접속</a:t>
+            </a:r>
+            <a:endParaRPr lang="en-US" altLang="ko-KR" sz="2000" smtClean="0">
+              <a:latin typeface="나눔고딕코딩" panose="020D0009000000000000" pitchFamily="49" charset="-127"/>
+              <a:ea typeface="나눔고딕코딩" panose="020D0009000000000000" pitchFamily="49" charset="-127"/>
+            </a:endParaRPr>
+          </a:p>
+          <a:p>
+            <a:r>
+              <a:rPr lang="en-US" altLang="ko-KR" sz="2000" smtClean="0">
+                <a:latin typeface="나눔고딕코딩" panose="020D0009000000000000" pitchFamily="49" charset="-127"/>
+                <a:ea typeface="나눔고딕코딩" panose="020D0009000000000000" pitchFamily="49" charset="-127"/>
+              </a:rPr>
+              <a:t># adb shell</a:t>
+            </a:r>
+          </a:p>
+          <a:p>
+            <a:endParaRPr lang="en-US" altLang="ko-KR" sz="2000">
+              <a:latin typeface="나눔고딕코딩" panose="020D0009000000000000" pitchFamily="49" charset="-127"/>
+              <a:ea typeface="나눔고딕코딩" panose="020D0009000000000000" pitchFamily="49" charset="-127"/>
+            </a:endParaRPr>
+          </a:p>
+          <a:p>
+            <a:r>
+              <a:rPr lang="en-US" altLang="ko-KR" sz="2000" smtClean="0">
+                <a:latin typeface="나눔고딕코딩" panose="020D0009000000000000" pitchFamily="49" charset="-127"/>
+                <a:ea typeface="나눔고딕코딩" panose="020D0009000000000000" pitchFamily="49" charset="-127"/>
+              </a:rPr>
+              <a:t>2. </a:t>
+            </a:r>
+            <a:r>
+              <a:rPr lang="ko-KR" altLang="en-US" sz="2000" smtClean="0">
+                <a:latin typeface="나눔고딕코딩" panose="020D0009000000000000" pitchFamily="49" charset="-127"/>
+                <a:ea typeface="나눔고딕코딩" panose="020D0009000000000000" pitchFamily="49" charset="-127"/>
+              </a:rPr>
+              <a:t>백라이트 제어 파일의 위치로 이동</a:t>
+            </a:r>
+            <a:endParaRPr lang="en-US" altLang="ko-KR" sz="2000" smtClean="0">
+              <a:latin typeface="나눔고딕코딩" panose="020D0009000000000000" pitchFamily="49" charset="-127"/>
+              <a:ea typeface="나눔고딕코딩" panose="020D0009000000000000" pitchFamily="49" charset="-127"/>
+            </a:endParaRPr>
+          </a:p>
+          <a:p>
+            <a:r>
+              <a:rPr lang="en-US" altLang="ko-KR" sz="2000" smtClean="0">
+                <a:latin typeface="나눔고딕코딩" panose="020D0009000000000000" pitchFamily="49" charset="-127"/>
+                <a:ea typeface="나눔고딕코딩" panose="020D0009000000000000" pitchFamily="49" charset="-127"/>
+              </a:rPr>
+              <a:t># cd /sys/class/backlight/tegra-dsi-backlight.0</a:t>
+            </a:r>
+          </a:p>
+          <a:p>
+            <a:r>
+              <a:rPr lang="en-US" altLang="ko-KR" sz="2000" smtClean="0">
+                <a:latin typeface="나눔고딕코딩" panose="020D0009000000000000" pitchFamily="49" charset="-127"/>
+                <a:ea typeface="나눔고딕코딩" panose="020D0009000000000000" pitchFamily="49" charset="-127"/>
+              </a:rPr>
+              <a:t> # ls</a:t>
+            </a:r>
+          </a:p>
+          <a:p>
+            <a:r>
+              <a:rPr lang="en-US" altLang="ko-KR" sz="2000" smtClean="0">
+                <a:latin typeface="나눔고딕코딩" panose="020D0009000000000000" pitchFamily="49" charset="-127"/>
+                <a:ea typeface="나눔고딕코딩" panose="020D0009000000000000" pitchFamily="49" charset="-127"/>
+              </a:rPr>
+              <a:t>actual_brightness</a:t>
+            </a:r>
+          </a:p>
+          <a:p>
+            <a:r>
+              <a:rPr lang="en-US" altLang="ko-KR" sz="2000" smtClean="0">
+                <a:latin typeface="나눔고딕코딩" panose="020D0009000000000000" pitchFamily="49" charset="-127"/>
+                <a:ea typeface="나눔고딕코딩" panose="020D0009000000000000" pitchFamily="49" charset="-127"/>
+              </a:rPr>
+              <a:t>bl_power</a:t>
+            </a:r>
+          </a:p>
+          <a:p>
+            <a:r>
+              <a:rPr lang="en-US" altLang="ko-KR" sz="2000" smtClean="0">
+                <a:solidFill>
+                  <a:srgbClr val="FF0000"/>
+                </a:solidFill>
+                <a:latin typeface="나눔고딕코딩" panose="020D0009000000000000" pitchFamily="49" charset="-127"/>
+                <a:ea typeface="나눔고딕코딩" panose="020D0009000000000000" pitchFamily="49" charset="-127"/>
+              </a:rPr>
+              <a:t>brightness</a:t>
+            </a:r>
+          </a:p>
+          <a:p>
+            <a:r>
+              <a:rPr lang="en-US" altLang="ko-KR" sz="2000" smtClean="0">
+                <a:latin typeface="나눔고딕코딩" panose="020D0009000000000000" pitchFamily="49" charset="-127"/>
+                <a:ea typeface="나눔고딕코딩" panose="020D0009000000000000" pitchFamily="49" charset="-127"/>
+              </a:rPr>
+              <a:t>device</a:t>
+            </a:r>
+          </a:p>
+          <a:p>
+            <a:r>
+              <a:rPr lang="en-US" altLang="ko-KR" sz="2000" smtClean="0">
+                <a:latin typeface="나눔고딕코딩" panose="020D0009000000000000" pitchFamily="49" charset="-127"/>
+                <a:ea typeface="나눔고딕코딩" panose="020D0009000000000000" pitchFamily="49" charset="-127"/>
+              </a:rPr>
+              <a:t>max_brightness</a:t>
+            </a:r>
+          </a:p>
+          <a:p>
+            <a:r>
+              <a:rPr lang="en-US" altLang="ko-KR" sz="2000" smtClean="0">
+                <a:latin typeface="나눔고딕코딩" panose="020D0009000000000000" pitchFamily="49" charset="-127"/>
+                <a:ea typeface="나눔고딕코딩" panose="020D0009000000000000" pitchFamily="49" charset="-127"/>
+              </a:rPr>
+              <a:t>power</a:t>
+            </a:r>
+          </a:p>
+          <a:p>
+            <a:r>
+              <a:rPr lang="en-US" altLang="ko-KR" sz="2000" smtClean="0">
+                <a:latin typeface="나눔고딕코딩" panose="020D0009000000000000" pitchFamily="49" charset="-127"/>
+                <a:ea typeface="나눔고딕코딩" panose="020D0009000000000000" pitchFamily="49" charset="-127"/>
+              </a:rPr>
+              <a:t>subsystem</a:t>
+            </a:r>
+          </a:p>
+          <a:p>
+            <a:r>
+              <a:rPr lang="en-US" altLang="ko-KR" sz="2000" smtClean="0">
+                <a:latin typeface="나눔고딕코딩" panose="020D0009000000000000" pitchFamily="49" charset="-127"/>
+                <a:ea typeface="나눔고딕코딩" panose="020D0009000000000000" pitchFamily="49" charset="-127"/>
+              </a:rPr>
+              <a:t>type</a:t>
+            </a:r>
+          </a:p>
+          <a:p>
+            <a:r>
+              <a:rPr lang="en-US" altLang="ko-KR" sz="2000" smtClean="0">
+                <a:latin typeface="나눔고딕코딩" panose="020D0009000000000000" pitchFamily="49" charset="-127"/>
+                <a:ea typeface="나눔고딕코딩" panose="020D0009000000000000" pitchFamily="49" charset="-127"/>
+              </a:rPr>
+              <a:t>uevent</a:t>
+            </a:r>
+          </a:p>
+          <a:p>
+            <a:endParaRPr lang="en-US" altLang="ko-KR" sz="2000">
+              <a:latin typeface="나눔고딕코딩" panose="020D0009000000000000" pitchFamily="49" charset="-127"/>
+              <a:ea typeface="나눔고딕코딩" panose="020D0009000000000000" pitchFamily="49" charset="-127"/>
+            </a:endParaRPr>
+          </a:p>
+          <a:p>
+            <a:r>
+              <a:rPr lang="en-US" altLang="ko-KR" sz="2000" smtClean="0">
+                <a:latin typeface="나눔고딕코딩" panose="020D0009000000000000" pitchFamily="49" charset="-127"/>
+                <a:ea typeface="나눔고딕코딩" panose="020D0009000000000000" pitchFamily="49" charset="-127"/>
+              </a:rPr>
+              <a:t>3. </a:t>
+            </a:r>
+            <a:r>
+              <a:rPr lang="ko-KR" altLang="en-US" sz="2000" smtClean="0">
+                <a:latin typeface="나눔고딕코딩" panose="020D0009000000000000" pitchFamily="49" charset="-127"/>
+                <a:ea typeface="나눔고딕코딩" panose="020D0009000000000000" pitchFamily="49" charset="-127"/>
+              </a:rPr>
+              <a:t>제어 방법</a:t>
+            </a:r>
+            <a:endParaRPr lang="en-US" altLang="ko-KR" sz="2000" smtClean="0">
+              <a:latin typeface="나눔고딕코딩" panose="020D0009000000000000" pitchFamily="49" charset="-127"/>
+              <a:ea typeface="나눔고딕코딩" panose="020D0009000000000000" pitchFamily="49" charset="-127"/>
+            </a:endParaRPr>
+          </a:p>
+          <a:p>
+            <a:r>
+              <a:rPr lang="en-US" altLang="ko-KR" sz="2000" smtClean="0">
+                <a:latin typeface="나눔고딕코딩" panose="020D0009000000000000" pitchFamily="49" charset="-127"/>
+                <a:ea typeface="나눔고딕코딩" panose="020D0009000000000000" pitchFamily="49" charset="-127"/>
+              </a:rPr>
+              <a:t># echo 0 &gt; brightness			// </a:t>
+            </a:r>
+            <a:r>
+              <a:rPr lang="ko-KR" altLang="en-US" sz="2000" smtClean="0">
+                <a:latin typeface="나눔고딕코딩" panose="020D0009000000000000" pitchFamily="49" charset="-127"/>
+                <a:ea typeface="나눔고딕코딩" panose="020D0009000000000000" pitchFamily="49" charset="-127"/>
+              </a:rPr>
+              <a:t>백라이트 오프</a:t>
+            </a:r>
+            <a:endParaRPr lang="en-US" altLang="ko-KR" sz="2000" smtClean="0">
+              <a:latin typeface="나눔고딕코딩" panose="020D0009000000000000" pitchFamily="49" charset="-127"/>
+              <a:ea typeface="나눔고딕코딩" panose="020D0009000000000000" pitchFamily="49" charset="-127"/>
+            </a:endParaRPr>
+          </a:p>
+          <a:p>
+            <a:r>
+              <a:rPr lang="en-US" altLang="ko-KR" sz="2000" smtClean="0">
+                <a:latin typeface="나눔고딕코딩" panose="020D0009000000000000" pitchFamily="49" charset="-127"/>
+                <a:ea typeface="나눔고딕코딩" panose="020D0009000000000000" pitchFamily="49" charset="-127"/>
+              </a:rPr>
+              <a:t># echo 255 &gt; brightness		// </a:t>
+            </a:r>
+            <a:r>
+              <a:rPr lang="ko-KR" altLang="en-US" sz="2000" smtClean="0">
+                <a:latin typeface="나눔고딕코딩" panose="020D0009000000000000" pitchFamily="49" charset="-127"/>
+                <a:ea typeface="나눔고딕코딩" panose="020D0009000000000000" pitchFamily="49" charset="-127"/>
+              </a:rPr>
+              <a:t>백라이트 온</a:t>
+            </a:r>
+            <a:endParaRPr lang="en-US" altLang="ko-KR" sz="2000">
+              <a:latin typeface="나눔고딕코딩" panose="020D0009000000000000" pitchFamily="49" charset="-127"/>
+              <a:ea typeface="나눔고딕코딩" panose="020D0009000000000000" pitchFamily="49" charset="-127"/>
+            </a:endParaRPr>
+          </a:p>
+        </p:txBody>
+      </p:sp>
+    </p:spTree>
+    <p:extLst>
+      <p:ext uri="{BB962C8B-B14F-4D97-AF65-F5344CB8AC3E}">
+        <p14:creationId xmlns:p14="http://schemas.microsoft.com/office/powerpoint/2010/main" val="3981327314"/>
+      </p:ext>
+    </p:extLst>
+  </p:cSld>
+  <p:clrMapOvr>
+    <a:masterClrMapping/>
+  </p:clrMapOvr>
+</p:sld>
+</file>
+
+<file path=ppt/slides/slide5.xml><?xml version="1.0" encoding="utf-8"?>
+<p:sld xmlns:a="http://schemas.openxmlformats.org/drawingml/2006/main" xmlns:r="http://schemas.openxmlformats.org/officeDocument/2006/relationships" xmlns:p="http://schemas.openxmlformats.org/presentationml/2006/main">
+  <p:cSld>
+    <p:spTree>
+      <p:nvGrpSpPr>
+        <p:cNvPr id="1" name=""/>
+        <p:cNvGrpSpPr/>
+        <p:nvPr/>
+      </p:nvGrpSpPr>
+      <p:grpSpPr>
+        <a:xfrm>
+          <a:off x="0" y="0"/>
+          <a:ext cx="0" cy="0"/>
+          <a:chOff x="0" y="0"/>
+          <a:chExt cx="0" cy="0"/>
+        </a:xfrm>
+      </p:grpSpPr>
+      <p:sp>
+        <p:nvSpPr>
+          <p:cNvPr id="4" name="TextBox 3"/>
+          <p:cNvSpPr txBox="1"/>
+          <p:nvPr/>
+        </p:nvSpPr>
+        <p:spPr>
+          <a:xfrm>
+            <a:off x="298174" y="377687"/>
+            <a:ext cx="2749471" cy="1015663"/>
+          </a:xfrm>
+          <a:prstGeom prst="rect">
+            <a:avLst/>
+          </a:prstGeom>
+          <a:noFill/>
+        </p:spPr>
+        <p:txBody>
+          <a:bodyPr wrap="none" rtlCol="0">
+            <a:spAutoFit/>
+          </a:bodyPr>
+          <a:lstStyle/>
+          <a:p>
+            <a:r>
+              <a:rPr lang="en-US" altLang="ko-KR" sz="2000" smtClean="0">
+                <a:latin typeface="나눔고딕코딩" panose="020D0009000000000000" pitchFamily="49" charset="-127"/>
+                <a:ea typeface="나눔고딕코딩" panose="020D0009000000000000" pitchFamily="49" charset="-127"/>
+              </a:rPr>
+              <a:t>&lt; </a:t>
+            </a:r>
+            <a:r>
+              <a:rPr lang="ko-KR" altLang="en-US" sz="2000" smtClean="0">
+                <a:latin typeface="나눔고딕코딩" panose="020D0009000000000000" pitchFamily="49" charset="-127"/>
+                <a:ea typeface="나눔고딕코딩" panose="020D0009000000000000" pitchFamily="49" charset="-127"/>
+              </a:rPr>
+              <a:t>백라이트 제어 앱 </a:t>
+            </a:r>
+            <a:r>
+              <a:rPr lang="en-US" altLang="ko-KR" sz="2000" smtClean="0">
+                <a:latin typeface="나눔고딕코딩" panose="020D0009000000000000" pitchFamily="49" charset="-127"/>
+                <a:ea typeface="나눔고딕코딩" panose="020D0009000000000000" pitchFamily="49" charset="-127"/>
+              </a:rPr>
+              <a:t>&gt;</a:t>
+            </a:r>
+          </a:p>
+          <a:p>
+            <a:endParaRPr lang="en-US" altLang="ko-KR" sz="2000">
+              <a:latin typeface="나눔고딕코딩" panose="020D0009000000000000" pitchFamily="49" charset="-127"/>
+              <a:ea typeface="나눔고딕코딩" panose="020D0009000000000000" pitchFamily="49" charset="-127"/>
+            </a:endParaRPr>
+          </a:p>
+          <a:p>
+            <a:r>
+              <a:rPr lang="en-US" altLang="ko-KR" sz="2000" smtClean="0">
+                <a:latin typeface="나눔고딕코딩" panose="020D0009000000000000" pitchFamily="49" charset="-127"/>
+                <a:ea typeface="나눔고딕코딩" panose="020D0009000000000000" pitchFamily="49" charset="-127"/>
+              </a:rPr>
+              <a:t>1. </a:t>
+            </a:r>
+            <a:r>
+              <a:rPr lang="ko-KR" altLang="en-US" sz="2000" smtClean="0">
+                <a:latin typeface="나눔고딕코딩" panose="020D0009000000000000" pitchFamily="49" charset="-127"/>
+                <a:ea typeface="나눔고딕코딩" panose="020D0009000000000000" pitchFamily="49" charset="-127"/>
+              </a:rPr>
+              <a:t>화면 설계</a:t>
+            </a:r>
+          </a:p>
+        </p:txBody>
+      </p:sp>
+      <p:sp>
+        <p:nvSpPr>
+          <p:cNvPr id="5" name="TextBox 4"/>
+          <p:cNvSpPr txBox="1"/>
+          <p:nvPr/>
+        </p:nvSpPr>
+        <p:spPr>
+          <a:xfrm>
+            <a:off x="407504" y="1639957"/>
+            <a:ext cx="11213326" cy="5016758"/>
+          </a:xfrm>
+          <a:prstGeom prst="rect">
+            <a:avLst/>
+          </a:prstGeom>
+          <a:noFill/>
+          <a:ln>
+            <a:solidFill>
+              <a:schemeClr val="tx1"/>
+            </a:solidFill>
+          </a:ln>
+        </p:spPr>
+        <p:txBody>
+          <a:bodyPr wrap="none" rtlCol="0">
+            <a:spAutoFit/>
+          </a:bodyPr>
+          <a:lstStyle/>
+          <a:p>
+            <a:r>
+              <a:rPr lang="en-US" altLang="ko-KR" sz="2000" smtClean="0">
+                <a:latin typeface="나눔고딕코딩" panose="020D0009000000000000" pitchFamily="49" charset="-127"/>
+                <a:ea typeface="나눔고딕코딩" panose="020D0009000000000000" pitchFamily="49" charset="-127"/>
+              </a:rPr>
+              <a:t>&lt;LinearLayout xmlns:android="http://schemas.android.com/apk/res/android"</a:t>
+            </a:r>
+          </a:p>
+          <a:p>
+            <a:r>
+              <a:rPr lang="en-US" altLang="ko-KR" sz="2000" smtClean="0">
+                <a:latin typeface="나눔고딕코딩" panose="020D0009000000000000" pitchFamily="49" charset="-127"/>
+                <a:ea typeface="나눔고딕코딩" panose="020D0009000000000000" pitchFamily="49" charset="-127"/>
+              </a:rPr>
+              <a:t>    xmlns:tools="http://schemas.android.com/tools" android:layout_width="match_parent"</a:t>
+            </a:r>
+          </a:p>
+          <a:p>
+            <a:r>
+              <a:rPr lang="en-US" altLang="ko-KR" sz="2000" smtClean="0">
+                <a:latin typeface="나눔고딕코딩" panose="020D0009000000000000" pitchFamily="49" charset="-127"/>
+                <a:ea typeface="나눔고딕코딩" panose="020D0009000000000000" pitchFamily="49" charset="-127"/>
+              </a:rPr>
+              <a:t>    android:layout_height="match_parent"</a:t>
+            </a:r>
+          </a:p>
+          <a:p>
+            <a:r>
+              <a:rPr lang="en-US" altLang="ko-KR" sz="2000" smtClean="0">
+                <a:latin typeface="나눔고딕코딩" panose="020D0009000000000000" pitchFamily="49" charset="-127"/>
+                <a:ea typeface="나눔고딕코딩" panose="020D0009000000000000" pitchFamily="49" charset="-127"/>
+              </a:rPr>
+              <a:t>    android:orientation="vertical" &gt;</a:t>
+            </a:r>
+          </a:p>
+          <a:p>
+            <a:endParaRPr lang="en-US" altLang="ko-KR" sz="2000" smtClean="0">
+              <a:latin typeface="나눔고딕코딩" panose="020D0009000000000000" pitchFamily="49" charset="-127"/>
+              <a:ea typeface="나눔고딕코딩" panose="020D0009000000000000" pitchFamily="49" charset="-127"/>
+            </a:endParaRPr>
+          </a:p>
+          <a:p>
+            <a:r>
+              <a:rPr lang="en-US" altLang="ko-KR" sz="2000" smtClean="0">
+                <a:latin typeface="나눔고딕코딩" panose="020D0009000000000000" pitchFamily="49" charset="-127"/>
+                <a:ea typeface="나눔고딕코딩" panose="020D0009000000000000" pitchFamily="49" charset="-127"/>
+              </a:rPr>
+              <a:t>    &lt;Button android:id="@+id/btn_on"</a:t>
+            </a:r>
+          </a:p>
+          <a:p>
+            <a:r>
+              <a:rPr lang="en-US" altLang="ko-KR" sz="2000" smtClean="0">
+                <a:latin typeface="나눔고딕코딩" panose="020D0009000000000000" pitchFamily="49" charset="-127"/>
+                <a:ea typeface="나눔고딕코딩" panose="020D0009000000000000" pitchFamily="49" charset="-127"/>
+              </a:rPr>
+              <a:t>        android:text="Backlight ON"</a:t>
+            </a:r>
+          </a:p>
+          <a:p>
+            <a:r>
+              <a:rPr lang="en-US" altLang="ko-KR" sz="2000" smtClean="0">
+                <a:latin typeface="나눔고딕코딩" panose="020D0009000000000000" pitchFamily="49" charset="-127"/>
+                <a:ea typeface="나눔고딕코딩" panose="020D0009000000000000" pitchFamily="49" charset="-127"/>
+              </a:rPr>
+              <a:t>        android:layout_width="match_parent" android:layout_height="wrap_content"</a:t>
+            </a:r>
+          </a:p>
+          <a:p>
+            <a:r>
+              <a:rPr lang="en-US" altLang="ko-KR" sz="2000" smtClean="0">
+                <a:latin typeface="나눔고딕코딩" panose="020D0009000000000000" pitchFamily="49" charset="-127"/>
+                <a:ea typeface="나눔고딕코딩" panose="020D0009000000000000" pitchFamily="49" charset="-127"/>
+              </a:rPr>
+              <a:t>        android:textSize="60sp" android:onClick="onClick"/&gt;</a:t>
+            </a:r>
+          </a:p>
+          <a:p>
+            <a:endParaRPr lang="en-US" altLang="ko-KR" sz="2000" smtClean="0">
+              <a:latin typeface="나눔고딕코딩" panose="020D0009000000000000" pitchFamily="49" charset="-127"/>
+              <a:ea typeface="나눔고딕코딩" panose="020D0009000000000000" pitchFamily="49" charset="-127"/>
+            </a:endParaRPr>
+          </a:p>
+          <a:p>
+            <a:r>
+              <a:rPr lang="en-US" altLang="ko-KR" sz="2000" smtClean="0">
+                <a:latin typeface="나눔고딕코딩" panose="020D0009000000000000" pitchFamily="49" charset="-127"/>
+                <a:ea typeface="나눔고딕코딩" panose="020D0009000000000000" pitchFamily="49" charset="-127"/>
+              </a:rPr>
+              <a:t>    &lt;Button android:id="@+id/btn_off"</a:t>
+            </a:r>
+          </a:p>
+          <a:p>
+            <a:r>
+              <a:rPr lang="en-US" altLang="ko-KR" sz="2000" smtClean="0">
+                <a:latin typeface="나눔고딕코딩" panose="020D0009000000000000" pitchFamily="49" charset="-127"/>
+                <a:ea typeface="나눔고딕코딩" panose="020D0009000000000000" pitchFamily="49" charset="-127"/>
+              </a:rPr>
+              <a:t>        android:text="Backlight OFF"</a:t>
+            </a:r>
+          </a:p>
+          <a:p>
+            <a:r>
+              <a:rPr lang="en-US" altLang="ko-KR" sz="2000" smtClean="0">
+                <a:latin typeface="나눔고딕코딩" panose="020D0009000000000000" pitchFamily="49" charset="-127"/>
+                <a:ea typeface="나눔고딕코딩" panose="020D0009000000000000" pitchFamily="49" charset="-127"/>
+              </a:rPr>
+              <a:t>        android:layout_width="match_parent" android:layout_height="wrap_content"</a:t>
+            </a:r>
+          </a:p>
+          <a:p>
+            <a:r>
+              <a:rPr lang="en-US" altLang="ko-KR" sz="2000" smtClean="0">
+                <a:latin typeface="나눔고딕코딩" panose="020D0009000000000000" pitchFamily="49" charset="-127"/>
+                <a:ea typeface="나눔고딕코딩" panose="020D0009000000000000" pitchFamily="49" charset="-127"/>
+              </a:rPr>
+              <a:t>        android:textSize="60sp" android:onClick="onClick"/&gt;</a:t>
+            </a:r>
+          </a:p>
+          <a:p>
+            <a:r>
+              <a:rPr lang="en-US" altLang="ko-KR" sz="2000" smtClean="0">
+                <a:latin typeface="나눔고딕코딩" panose="020D0009000000000000" pitchFamily="49" charset="-127"/>
+                <a:ea typeface="나눔고딕코딩" panose="020D0009000000000000" pitchFamily="49" charset="-127"/>
+              </a:rPr>
+              <a:t>&lt;/LinearLayout&gt;</a:t>
+            </a:r>
+          </a:p>
+          <a:p>
+            <a:endParaRPr lang="ko-KR" altLang="en-US" sz="2000" smtClean="0">
+              <a:latin typeface="나눔고딕코딩" panose="020D0009000000000000" pitchFamily="49" charset="-127"/>
+              <a:ea typeface="나눔고딕코딩" panose="020D0009000000000000" pitchFamily="49" charset="-127"/>
+            </a:endParaRPr>
+          </a:p>
+        </p:txBody>
+      </p:sp>
+    </p:spTree>
+    <p:extLst>
+      <p:ext uri="{BB962C8B-B14F-4D97-AF65-F5344CB8AC3E}">
+        <p14:creationId xmlns:p14="http://schemas.microsoft.com/office/powerpoint/2010/main" val="3331905853"/>
+      </p:ext>
+    </p:extLst>
+  </p:cSld>
+  <p:clrMapOvr>
+    <a:masterClrMapping/>
+  </p:clrMapOvr>
+</p:sld>
+</file>
+
+<file path=ppt/slides/slide6.xml><?xml version="1.0" encoding="utf-8"?>
+<p:sld xmlns:a="http://schemas.openxmlformats.org/drawingml/2006/main" xmlns:r="http://schemas.openxmlformats.org/officeDocument/2006/relationships" xmlns:p="http://schemas.openxmlformats.org/presentationml/2006/main">
+  <p:cSld>
+    <p:spTree>
+      <p:nvGrpSpPr>
+        <p:cNvPr id="1" name=""/>
+        <p:cNvGrpSpPr/>
+        <p:nvPr/>
+      </p:nvGrpSpPr>
+      <p:grpSpPr>
+        <a:xfrm>
+          <a:off x="0" y="0"/>
+          <a:ext cx="0" cy="0"/>
+          <a:chOff x="0" y="0"/>
+          <a:chExt cx="0" cy="0"/>
+        </a:xfrm>
+      </p:grpSpPr>
+      <p:sp>
+        <p:nvSpPr>
+          <p:cNvPr id="4" name="TextBox 3"/>
+          <p:cNvSpPr txBox="1"/>
+          <p:nvPr/>
+        </p:nvSpPr>
+        <p:spPr>
+          <a:xfrm>
+            <a:off x="327991" y="457200"/>
+            <a:ext cx="2621230" cy="400110"/>
+          </a:xfrm>
+          <a:prstGeom prst="rect">
+            <a:avLst/>
+          </a:prstGeom>
+          <a:noFill/>
+        </p:spPr>
+        <p:txBody>
+          <a:bodyPr wrap="none" rtlCol="0">
+            <a:spAutoFit/>
+          </a:bodyPr>
+          <a:lstStyle/>
+          <a:p>
+            <a:r>
+              <a:rPr lang="en-US" altLang="ko-KR" sz="2000" smtClean="0">
+                <a:latin typeface="나눔고딕코딩" panose="020D0009000000000000" pitchFamily="49" charset="-127"/>
+                <a:ea typeface="나눔고딕코딩" panose="020D0009000000000000" pitchFamily="49" charset="-127"/>
+              </a:rPr>
+              <a:t>2. </a:t>
+            </a:r>
+            <a:r>
+              <a:rPr lang="ko-KR" altLang="en-US" sz="2000" smtClean="0">
+                <a:latin typeface="나눔고딕코딩" panose="020D0009000000000000" pitchFamily="49" charset="-127"/>
+                <a:ea typeface="나눔고딕코딩" panose="020D0009000000000000" pitchFamily="49" charset="-127"/>
+              </a:rPr>
+              <a:t>사용자 로직 작성</a:t>
+            </a:r>
+          </a:p>
+        </p:txBody>
+      </p:sp>
+      <p:sp>
+        <p:nvSpPr>
+          <p:cNvPr id="5" name="TextBox 4"/>
+          <p:cNvSpPr txBox="1"/>
+          <p:nvPr/>
+        </p:nvSpPr>
+        <p:spPr>
+          <a:xfrm>
+            <a:off x="397565" y="1152939"/>
+            <a:ext cx="8648521" cy="5324535"/>
+          </a:xfrm>
+          <a:prstGeom prst="rect">
+            <a:avLst/>
+          </a:prstGeom>
+          <a:noFill/>
+          <a:ln>
+            <a:solidFill>
+              <a:schemeClr val="tx1"/>
+            </a:solidFill>
+          </a:ln>
+        </p:spPr>
+        <p:txBody>
+          <a:bodyPr wrap="none" rtlCol="0">
+            <a:spAutoFit/>
+          </a:bodyPr>
+          <a:lstStyle/>
+          <a:p>
+            <a:r>
+              <a:rPr lang="en-US" altLang="ko-KR" sz="2000" smtClean="0">
+                <a:latin typeface="나눔고딕코딩" panose="020D0009000000000000" pitchFamily="49" charset="-127"/>
+                <a:ea typeface="나눔고딕코딩" panose="020D0009000000000000" pitchFamily="49" charset="-127"/>
+              </a:rPr>
+              <a:t>public class MainActivity extends Activity {</a:t>
+            </a:r>
+          </a:p>
+          <a:p>
+            <a:r>
+              <a:rPr lang="en-US" altLang="ko-KR" sz="2000" smtClean="0">
+                <a:latin typeface="나눔고딕코딩" panose="020D0009000000000000" pitchFamily="49" charset="-127"/>
+                <a:ea typeface="나눔고딕코딩" panose="020D0009000000000000" pitchFamily="49" charset="-127"/>
+              </a:rPr>
+              <a:t>    @Override</a:t>
+            </a:r>
+          </a:p>
+          <a:p>
+            <a:r>
+              <a:rPr lang="en-US" altLang="ko-KR" sz="2000" smtClean="0">
+                <a:latin typeface="나눔고딕코딩" panose="020D0009000000000000" pitchFamily="49" charset="-127"/>
+                <a:ea typeface="나눔고딕코딩" panose="020D0009000000000000" pitchFamily="49" charset="-127"/>
+              </a:rPr>
+              <a:t>    protected void onCreate(Bundle savedInstanceState) {</a:t>
+            </a:r>
+          </a:p>
+          <a:p>
+            <a:r>
+              <a:rPr lang="en-US" altLang="ko-KR" sz="2000" smtClean="0">
+                <a:latin typeface="나눔고딕코딩" panose="020D0009000000000000" pitchFamily="49" charset="-127"/>
+                <a:ea typeface="나눔고딕코딩" panose="020D0009000000000000" pitchFamily="49" charset="-127"/>
+              </a:rPr>
+              <a:t>        super.onCreate(savedInstanceState);</a:t>
+            </a:r>
+          </a:p>
+          <a:p>
+            <a:r>
+              <a:rPr lang="en-US" altLang="ko-KR" sz="2000" smtClean="0">
+                <a:latin typeface="나눔고딕코딩" panose="020D0009000000000000" pitchFamily="49" charset="-127"/>
+                <a:ea typeface="나눔고딕코딩" panose="020D0009000000000000" pitchFamily="49" charset="-127"/>
+              </a:rPr>
+              <a:t>        setContentView(R.layout.activity_main);</a:t>
+            </a:r>
+          </a:p>
+          <a:p>
+            <a:r>
+              <a:rPr lang="en-US" altLang="ko-KR" sz="2000" smtClean="0">
+                <a:latin typeface="나눔고딕코딩" panose="020D0009000000000000" pitchFamily="49" charset="-127"/>
+                <a:ea typeface="나눔고딕코딩" panose="020D0009000000000000" pitchFamily="49" charset="-127"/>
+              </a:rPr>
+              <a:t>    }</a:t>
+            </a:r>
+          </a:p>
+          <a:p>
+            <a:endParaRPr lang="en-US" altLang="ko-KR" sz="2000" smtClean="0">
+              <a:latin typeface="나눔고딕코딩" panose="020D0009000000000000" pitchFamily="49" charset="-127"/>
+              <a:ea typeface="나눔고딕코딩" panose="020D0009000000000000" pitchFamily="49" charset="-127"/>
+            </a:endParaRPr>
+          </a:p>
+          <a:p>
+            <a:r>
+              <a:rPr lang="en-US" altLang="ko-KR" sz="2000" smtClean="0">
+                <a:latin typeface="나눔고딕코딩" panose="020D0009000000000000" pitchFamily="49" charset="-127"/>
+                <a:ea typeface="나눔고딕코딩" panose="020D0009000000000000" pitchFamily="49" charset="-127"/>
+              </a:rPr>
+              <a:t>    public void onClick(View view) {</a:t>
+            </a:r>
+          </a:p>
+          <a:p>
+            <a:r>
+              <a:rPr lang="en-US" altLang="ko-KR" sz="2000" smtClean="0">
+                <a:latin typeface="나눔고딕코딩" panose="020D0009000000000000" pitchFamily="49" charset="-127"/>
+                <a:ea typeface="나눔고딕코딩" panose="020D0009000000000000" pitchFamily="49" charset="-127"/>
+              </a:rPr>
+              <a:t>        switch(view.getId()) {</a:t>
+            </a:r>
+          </a:p>
+          <a:p>
+            <a:r>
+              <a:rPr lang="en-US" altLang="ko-KR" sz="2000" smtClean="0">
+                <a:latin typeface="나눔고딕코딩" panose="020D0009000000000000" pitchFamily="49" charset="-127"/>
+                <a:ea typeface="나눔고딕코딩" panose="020D0009000000000000" pitchFamily="49" charset="-127"/>
+              </a:rPr>
+              <a:t>            case R.id.btn_on:  setBacklight(255); break;</a:t>
+            </a:r>
+          </a:p>
+          <a:p>
+            <a:r>
+              <a:rPr lang="en-US" altLang="ko-KR" sz="2000" smtClean="0">
+                <a:latin typeface="나눔고딕코딩" panose="020D0009000000000000" pitchFamily="49" charset="-127"/>
+                <a:ea typeface="나눔고딕코딩" panose="020D0009000000000000" pitchFamily="49" charset="-127"/>
+              </a:rPr>
+              <a:t>            case R.id.btn_off: setBacklight(10);  break;</a:t>
+            </a:r>
+          </a:p>
+          <a:p>
+            <a:r>
+              <a:rPr lang="en-US" altLang="ko-KR" sz="2000" smtClean="0">
+                <a:latin typeface="나눔고딕코딩" panose="020D0009000000000000" pitchFamily="49" charset="-127"/>
+                <a:ea typeface="나눔고딕코딩" panose="020D0009000000000000" pitchFamily="49" charset="-127"/>
+              </a:rPr>
+              <a:t>        }</a:t>
+            </a:r>
+          </a:p>
+          <a:p>
+            <a:r>
+              <a:rPr lang="en-US" altLang="ko-KR" sz="2000" smtClean="0">
+                <a:latin typeface="나눔고딕코딩" panose="020D0009000000000000" pitchFamily="49" charset="-127"/>
+                <a:ea typeface="나눔고딕코딩" panose="020D0009000000000000" pitchFamily="49" charset="-127"/>
+              </a:rPr>
+              <a:t>    }</a:t>
+            </a:r>
+          </a:p>
+          <a:p>
+            <a:endParaRPr lang="en-US" altLang="ko-KR" sz="2000" smtClean="0">
+              <a:latin typeface="나눔고딕코딩" panose="020D0009000000000000" pitchFamily="49" charset="-127"/>
+              <a:ea typeface="나눔고딕코딩" panose="020D0009000000000000" pitchFamily="49" charset="-127"/>
+            </a:endParaRPr>
+          </a:p>
+          <a:p>
+            <a:r>
+              <a:rPr lang="en-US" altLang="ko-KR" sz="2000" smtClean="0">
+                <a:solidFill>
+                  <a:srgbClr val="FF0000"/>
+                </a:solidFill>
+                <a:latin typeface="나눔고딕코딩" panose="020D0009000000000000" pitchFamily="49" charset="-127"/>
+                <a:ea typeface="나눔고딕코딩" panose="020D0009000000000000" pitchFamily="49" charset="-127"/>
+              </a:rPr>
+              <a:t>    public native void setBacklight(int brightness);</a:t>
+            </a:r>
+          </a:p>
+          <a:p>
+            <a:r>
+              <a:rPr lang="en-US" altLang="ko-KR" sz="2000" smtClean="0">
+                <a:solidFill>
+                  <a:srgbClr val="FF0000"/>
+                </a:solidFill>
+                <a:latin typeface="나눔고딕코딩" panose="020D0009000000000000" pitchFamily="49" charset="-127"/>
+                <a:ea typeface="나눔고딕코딩" panose="020D0009000000000000" pitchFamily="49" charset="-127"/>
+              </a:rPr>
+              <a:t>    static { System.loadLibrary("backlight"); } // libbacklight.so</a:t>
+            </a:r>
+          </a:p>
+          <a:p>
+            <a:r>
+              <a:rPr lang="en-US" altLang="ko-KR" sz="2000" smtClean="0">
+                <a:latin typeface="나눔고딕코딩" panose="020D0009000000000000" pitchFamily="49" charset="-127"/>
+                <a:ea typeface="나눔고딕코딩" panose="020D0009000000000000" pitchFamily="49" charset="-127"/>
+              </a:rPr>
+              <a:t>}</a:t>
+            </a:r>
+            <a:endParaRPr lang="ko-KR" altLang="en-US" sz="2000" smtClean="0">
+              <a:latin typeface="나눔고딕코딩" panose="020D0009000000000000" pitchFamily="49" charset="-127"/>
+              <a:ea typeface="나눔고딕코딩" panose="020D0009000000000000" pitchFamily="49" charset="-127"/>
+            </a:endParaRPr>
+          </a:p>
+        </p:txBody>
+      </p:sp>
+    </p:spTree>
+    <p:extLst>
+      <p:ext uri="{BB962C8B-B14F-4D97-AF65-F5344CB8AC3E}">
+        <p14:creationId xmlns:p14="http://schemas.microsoft.com/office/powerpoint/2010/main" val="4268546828"/>
+      </p:ext>
+    </p:extLst>
+  </p:cSld>
+  <p:clrMapOvr>
+    <a:masterClrMapping/>
+  </p:clrMapOvr>
+</p:sld>
+</file>
+
+<file path=ppt/slides/slide7.xml><?xml version="1.0" encoding="utf-8"?>
+<p:sld xmlns:a="http://schemas.openxmlformats.org/drawingml/2006/main" xmlns:r="http://schemas.openxmlformats.org/officeDocument/2006/relationships" xmlns:p="http://schemas.openxmlformats.org/presentationml/2006/main">
+  <p:cSld>
+    <p:spTree>
+      <p:nvGrpSpPr>
+        <p:cNvPr id="1" name=""/>
+        <p:cNvGrpSpPr/>
+        <p:nvPr/>
+      </p:nvGrpSpPr>
+      <p:grpSpPr>
+        <a:xfrm>
+          <a:off x="0" y="0"/>
+          <a:ext cx="0" cy="0"/>
+          <a:chOff x="0" y="0"/>
+          <a:chExt cx="0" cy="0"/>
+        </a:xfrm>
+      </p:grpSpPr>
+      <p:sp>
+        <p:nvSpPr>
+          <p:cNvPr id="4" name="TextBox 3"/>
+          <p:cNvSpPr txBox="1"/>
+          <p:nvPr/>
+        </p:nvSpPr>
+        <p:spPr>
+          <a:xfrm>
+            <a:off x="278296" y="298174"/>
+            <a:ext cx="14419332" cy="2246769"/>
+          </a:xfrm>
+          <a:prstGeom prst="rect">
+            <a:avLst/>
+          </a:prstGeom>
+          <a:noFill/>
+        </p:spPr>
+        <p:txBody>
+          <a:bodyPr wrap="none" rtlCol="0">
+            <a:spAutoFit/>
+          </a:bodyPr>
+          <a:lstStyle/>
+          <a:p>
+            <a:r>
+              <a:rPr lang="en-US" altLang="ko-KR" sz="2000" smtClean="0">
+                <a:latin typeface="나눔고딕코딩" panose="020D0009000000000000" pitchFamily="49" charset="-127"/>
+                <a:ea typeface="나눔고딕코딩" panose="020D0009000000000000" pitchFamily="49" charset="-127"/>
+              </a:rPr>
+              <a:t>3. </a:t>
+            </a:r>
+            <a:r>
+              <a:rPr lang="ko-KR" altLang="en-US" sz="2000" smtClean="0">
+                <a:latin typeface="나눔고딕코딩" panose="020D0009000000000000" pitchFamily="49" charset="-127"/>
+                <a:ea typeface="나눔고딕코딩" panose="020D0009000000000000" pitchFamily="49" charset="-127"/>
+              </a:rPr>
+              <a:t>리빌드 하여 클래스 파일 생성 </a:t>
+            </a:r>
+            <a:r>
+              <a:rPr lang="en-US" altLang="ko-KR" sz="2000" smtClean="0">
+                <a:latin typeface="나눔고딕코딩" panose="020D0009000000000000" pitchFamily="49" charset="-127"/>
+                <a:ea typeface="나눔고딕코딩" panose="020D0009000000000000" pitchFamily="49" charset="-127"/>
+              </a:rPr>
+              <a:t>-&gt; JNI </a:t>
+            </a:r>
+            <a:r>
+              <a:rPr lang="ko-KR" altLang="en-US" sz="2000" smtClean="0">
+                <a:latin typeface="나눔고딕코딩" panose="020D0009000000000000" pitchFamily="49" charset="-127"/>
+                <a:ea typeface="나눔고딕코딩" panose="020D0009000000000000" pitchFamily="49" charset="-127"/>
+              </a:rPr>
+              <a:t>폴더 생성</a:t>
+            </a:r>
+            <a:endParaRPr lang="en-US" altLang="ko-KR" sz="2000" smtClean="0">
+              <a:latin typeface="나눔고딕코딩" panose="020D0009000000000000" pitchFamily="49" charset="-127"/>
+              <a:ea typeface="나눔고딕코딩" panose="020D0009000000000000" pitchFamily="49" charset="-127"/>
+            </a:endParaRPr>
+          </a:p>
+          <a:p>
+            <a:endParaRPr lang="en-US" altLang="ko-KR" sz="2000">
+              <a:latin typeface="나눔고딕코딩" panose="020D0009000000000000" pitchFamily="49" charset="-127"/>
+              <a:ea typeface="나눔고딕코딩" panose="020D0009000000000000" pitchFamily="49" charset="-127"/>
+            </a:endParaRPr>
+          </a:p>
+          <a:p>
+            <a:r>
+              <a:rPr lang="en-US" altLang="ko-KR" sz="2000" smtClean="0">
+                <a:latin typeface="나눔고딕코딩" panose="020D0009000000000000" pitchFamily="49" charset="-127"/>
+                <a:ea typeface="나눔고딕코딩" panose="020D0009000000000000" pitchFamily="49" charset="-127"/>
+              </a:rPr>
+              <a:t>4. </a:t>
+            </a:r>
+            <a:r>
+              <a:rPr lang="ko-KR" altLang="en-US" sz="2000" smtClean="0">
+                <a:latin typeface="나눔고딕코딩" panose="020D0009000000000000" pitchFamily="49" charset="-127"/>
+                <a:ea typeface="나눔고딕코딩" panose="020D0009000000000000" pitchFamily="49" charset="-127"/>
+              </a:rPr>
+              <a:t>헤더 파일 생성</a:t>
+            </a:r>
+            <a:endParaRPr lang="en-US" altLang="ko-KR" sz="2000" smtClean="0">
+              <a:latin typeface="나눔고딕코딩" panose="020D0009000000000000" pitchFamily="49" charset="-127"/>
+              <a:ea typeface="나눔고딕코딩" panose="020D0009000000000000" pitchFamily="49" charset="-127"/>
+            </a:endParaRPr>
+          </a:p>
+          <a:p>
+            <a:r>
+              <a:rPr lang="en-US" altLang="ko-KR" sz="2000" smtClean="0">
+                <a:latin typeface="나눔고딕코딩" panose="020D0009000000000000" pitchFamily="49" charset="-127"/>
+                <a:ea typeface="나눔고딕코딩" panose="020D0009000000000000" pitchFamily="49" charset="-127"/>
+              </a:rPr>
+              <a:t>/AndroidStudioProjects/BacklightApp/app/src/main# javah</a:t>
+            </a:r>
+          </a:p>
+          <a:p>
+            <a:r>
+              <a:rPr lang="en-US" altLang="ko-KR" sz="2000" smtClean="0">
+                <a:latin typeface="나눔고딕코딩" panose="020D0009000000000000" pitchFamily="49" charset="-127"/>
+                <a:ea typeface="나눔고딕코딩" panose="020D0009000000000000" pitchFamily="49" charset="-127"/>
+              </a:rPr>
+              <a:t>   -classpath ../../build/intermediates/classes/debug/:/root/android-sdk-linux/platforms/android-21/android.jar</a:t>
+            </a:r>
+          </a:p>
+          <a:p>
+            <a:r>
+              <a:rPr lang="en-US" altLang="ko-KR" sz="2000">
+                <a:latin typeface="나눔고딕코딩" panose="020D0009000000000000" pitchFamily="49" charset="-127"/>
+                <a:ea typeface="나눔고딕코딩" panose="020D0009000000000000" pitchFamily="49" charset="-127"/>
+              </a:rPr>
+              <a:t> </a:t>
+            </a:r>
+            <a:r>
+              <a:rPr lang="en-US" altLang="ko-KR" sz="2000" smtClean="0">
+                <a:latin typeface="나눔고딕코딩" panose="020D0009000000000000" pitchFamily="49" charset="-127"/>
+                <a:ea typeface="나눔고딕코딩" panose="020D0009000000000000" pitchFamily="49" charset="-127"/>
+              </a:rPr>
+              <a:t>  -d ./jni</a:t>
+            </a:r>
+          </a:p>
+          <a:p>
+            <a:r>
+              <a:rPr lang="en-US" altLang="ko-KR" sz="2000">
+                <a:latin typeface="나눔고딕코딩" panose="020D0009000000000000" pitchFamily="49" charset="-127"/>
+                <a:ea typeface="나눔고딕코딩" panose="020D0009000000000000" pitchFamily="49" charset="-127"/>
+              </a:rPr>
+              <a:t> </a:t>
+            </a:r>
+            <a:r>
+              <a:rPr lang="en-US" altLang="ko-KR" sz="2000" smtClean="0">
+                <a:latin typeface="나눔고딕코딩" panose="020D0009000000000000" pitchFamily="49" charset="-127"/>
+                <a:ea typeface="나눔고딕코딩" panose="020D0009000000000000" pitchFamily="49" charset="-127"/>
+              </a:rPr>
+              <a:t>  com.example.backlightapp.MainActivity</a:t>
+            </a:r>
+            <a:endParaRPr lang="ko-KR" altLang="en-US" sz="2000" smtClean="0">
+              <a:latin typeface="나눔고딕코딩" panose="020D0009000000000000" pitchFamily="49" charset="-127"/>
+              <a:ea typeface="나눔고딕코딩" panose="020D0009000000000000" pitchFamily="49" charset="-127"/>
+            </a:endParaRPr>
+          </a:p>
+        </p:txBody>
+      </p:sp>
+    </p:spTree>
+    <p:extLst>
+      <p:ext uri="{BB962C8B-B14F-4D97-AF65-F5344CB8AC3E}">
+        <p14:creationId xmlns:p14="http://schemas.microsoft.com/office/powerpoint/2010/main" val="2346396679"/>
+      </p:ext>
+    </p:extLst>
+  </p:cSld>
+  <p:clrMapOvr>
+    <a:masterClrMapping/>
+  </p:clrMapOvr>
+</p:sld>
+</file>
+
+<file path=ppt/slides/slide8.xml><?xml version="1.0" encoding="utf-8"?>
+<p:sld xmlns:a="http://schemas.openxmlformats.org/drawingml/2006/main" xmlns:r="http://schemas.openxmlformats.org/officeDocument/2006/relationships" xmlns:p="http://schemas.openxmlformats.org/presentationml/2006/main">
+  <p:cSld>
+    <p:spTree>
+      <p:nvGrpSpPr>
+        <p:cNvPr id="1" name=""/>
+        <p:cNvGrpSpPr/>
+        <p:nvPr/>
+      </p:nvGrpSpPr>
+      <p:grpSpPr>
+        <a:xfrm>
+          <a:off x="0" y="0"/>
+          <a:ext cx="0" cy="0"/>
+          <a:chOff x="0" y="0"/>
+          <a:chExt cx="0" cy="0"/>
+        </a:xfrm>
+      </p:grpSpPr>
+      <p:sp>
+        <p:nvSpPr>
+          <p:cNvPr id="4" name="TextBox 3"/>
+          <p:cNvSpPr txBox="1"/>
+          <p:nvPr/>
+        </p:nvSpPr>
+        <p:spPr>
+          <a:xfrm>
+            <a:off x="298173" y="765313"/>
+            <a:ext cx="11072191" cy="7478970"/>
+          </a:xfrm>
+          <a:prstGeom prst="rect">
+            <a:avLst/>
+          </a:prstGeom>
+          <a:noFill/>
+          <a:ln>
+            <a:solidFill>
+              <a:schemeClr val="tx1"/>
+            </a:solidFill>
+          </a:ln>
+        </p:spPr>
+        <p:txBody>
+          <a:bodyPr wrap="square" rtlCol="0">
+            <a:spAutoFit/>
+          </a:bodyPr>
+          <a:lstStyle/>
+          <a:p>
+            <a:r>
+              <a:rPr lang="en-US" altLang="ko-KR" sz="2000" smtClean="0">
+                <a:latin typeface="나눔고딕코딩" panose="020D0009000000000000" pitchFamily="49" charset="-127"/>
+                <a:ea typeface="나눔고딕코딩" panose="020D0009000000000000" pitchFamily="49" charset="-127"/>
+              </a:rPr>
+              <a:t>// MainActivity.c</a:t>
+            </a:r>
+          </a:p>
+          <a:p>
+            <a:r>
+              <a:rPr lang="en-US" altLang="ko-KR" sz="2000" smtClean="0">
+                <a:latin typeface="나눔고딕코딩" panose="020D0009000000000000" pitchFamily="49" charset="-127"/>
+                <a:ea typeface="나눔고딕코딩" panose="020D0009000000000000" pitchFamily="49" charset="-127"/>
+              </a:rPr>
+              <a:t>#include &lt;stdio.h&gt;</a:t>
+            </a:r>
+          </a:p>
+          <a:p>
+            <a:r>
+              <a:rPr lang="en-US" altLang="ko-KR" sz="2000" smtClean="0">
+                <a:latin typeface="나눔고딕코딩" panose="020D0009000000000000" pitchFamily="49" charset="-127"/>
+                <a:ea typeface="나눔고딕코딩" panose="020D0009000000000000" pitchFamily="49" charset="-127"/>
+              </a:rPr>
+              <a:t>#include &lt;sys/types.h&gt;</a:t>
+            </a:r>
+          </a:p>
+          <a:p>
+            <a:r>
+              <a:rPr lang="en-US" altLang="ko-KR" sz="2000" smtClean="0">
+                <a:latin typeface="나눔고딕코딩" panose="020D0009000000000000" pitchFamily="49" charset="-127"/>
+                <a:ea typeface="나눔고딕코딩" panose="020D0009000000000000" pitchFamily="49" charset="-127"/>
+              </a:rPr>
+              <a:t>#include &lt;sys/stat.h&gt;</a:t>
+            </a:r>
+          </a:p>
+          <a:p>
+            <a:r>
+              <a:rPr lang="en-US" altLang="ko-KR" sz="2000" smtClean="0">
+                <a:latin typeface="나눔고딕코딩" panose="020D0009000000000000" pitchFamily="49" charset="-127"/>
+                <a:ea typeface="나눔고딕코딩" panose="020D0009000000000000" pitchFamily="49" charset="-127"/>
+              </a:rPr>
+              <a:t>#include &lt;fcntl.h&gt;</a:t>
+            </a:r>
+          </a:p>
+          <a:p>
+            <a:r>
+              <a:rPr lang="en-US" altLang="ko-KR" sz="2000" smtClean="0">
+                <a:latin typeface="나눔고딕코딩" panose="020D0009000000000000" pitchFamily="49" charset="-127"/>
+                <a:ea typeface="나눔고딕코딩" panose="020D0009000000000000" pitchFamily="49" charset="-127"/>
+              </a:rPr>
+              <a:t>#include &lt;unistd.h&gt;</a:t>
+            </a:r>
+          </a:p>
+          <a:p>
+            <a:r>
+              <a:rPr lang="en-US" altLang="ko-KR" sz="2000" smtClean="0">
+                <a:latin typeface="나눔고딕코딩" panose="020D0009000000000000" pitchFamily="49" charset="-127"/>
+                <a:ea typeface="나눔고딕코딩" panose="020D0009000000000000" pitchFamily="49" charset="-127"/>
+              </a:rPr>
+              <a:t>#include "MainActivity.h"</a:t>
+            </a:r>
+          </a:p>
+          <a:p>
+            <a:endParaRPr lang="en-US" altLang="ko-KR" sz="2000" smtClean="0">
+              <a:latin typeface="나눔고딕코딩" panose="020D0009000000000000" pitchFamily="49" charset="-127"/>
+              <a:ea typeface="나눔고딕코딩" panose="020D0009000000000000" pitchFamily="49" charset="-127"/>
+            </a:endParaRPr>
+          </a:p>
+          <a:p>
+            <a:r>
+              <a:rPr lang="en-US" altLang="ko-KR" sz="2000" smtClean="0">
+                <a:latin typeface="나눔고딕코딩" panose="020D0009000000000000" pitchFamily="49" charset="-127"/>
+                <a:ea typeface="나눔고딕코딩" panose="020D0009000000000000" pitchFamily="49" charset="-127"/>
+              </a:rPr>
+              <a:t>JNIEXPORT void JNICALL Java_com_example_backlightapp_MainActivity_setBacklight</a:t>
+            </a:r>
+          </a:p>
+          <a:p>
+            <a:r>
+              <a:rPr lang="en-US" altLang="ko-KR" sz="2000" smtClean="0">
+                <a:latin typeface="나눔고딕코딩" panose="020D0009000000000000" pitchFamily="49" charset="-127"/>
+                <a:ea typeface="나눔고딕코딩" panose="020D0009000000000000" pitchFamily="49" charset="-127"/>
+              </a:rPr>
+              <a:t>        (JNIEnv *pEnv, jobject thiz, jint brightness) {</a:t>
+            </a:r>
+          </a:p>
+          <a:p>
+            <a:r>
+              <a:rPr lang="en-US" altLang="ko-KR" sz="2000" smtClean="0">
+                <a:latin typeface="나눔고딕코딩" panose="020D0009000000000000" pitchFamily="49" charset="-127"/>
+                <a:ea typeface="나눔고딕코딩" panose="020D0009000000000000" pitchFamily="49" charset="-127"/>
+              </a:rPr>
+              <a:t>    // open</a:t>
+            </a:r>
+            <a:r>
+              <a:rPr lang="ko-KR" altLang="en-US" sz="2000" smtClean="0">
+                <a:latin typeface="나눔고딕코딩" panose="020D0009000000000000" pitchFamily="49" charset="-127"/>
+                <a:ea typeface="나눔고딕코딩" panose="020D0009000000000000" pitchFamily="49" charset="-127"/>
+              </a:rPr>
+              <a:t>에 대한 메뉴얼 페이지 보는 방법</a:t>
+            </a:r>
+            <a:r>
+              <a:rPr lang="en-US" altLang="ko-KR" sz="2000" smtClean="0">
+                <a:latin typeface="나눔고딕코딩" panose="020D0009000000000000" pitchFamily="49" charset="-127"/>
+                <a:ea typeface="나눔고딕코딩" panose="020D0009000000000000" pitchFamily="49" charset="-127"/>
+              </a:rPr>
+              <a:t>: 2 + K, </a:t>
+            </a:r>
+            <a:r>
+              <a:rPr lang="ko-KR" altLang="en-US" sz="2000" smtClean="0">
+                <a:latin typeface="나눔고딕코딩" panose="020D0009000000000000" pitchFamily="49" charset="-127"/>
+                <a:ea typeface="나눔고딕코딩" panose="020D0009000000000000" pitchFamily="49" charset="-127"/>
+              </a:rPr>
+              <a:t>복귀 방법</a:t>
+            </a:r>
+            <a:r>
+              <a:rPr lang="en-US" altLang="ko-KR" sz="2000" smtClean="0">
+                <a:latin typeface="나눔고딕코딩" panose="020D0009000000000000" pitchFamily="49" charset="-127"/>
+                <a:ea typeface="나눔고딕코딩" panose="020D0009000000000000" pitchFamily="49" charset="-127"/>
+              </a:rPr>
+              <a:t>: q</a:t>
+            </a:r>
+          </a:p>
+          <a:p>
+            <a:r>
+              <a:rPr lang="en-US" altLang="ko-KR" sz="2000" smtClean="0">
+                <a:latin typeface="나눔고딕코딩" panose="020D0009000000000000" pitchFamily="49" charset="-127"/>
+                <a:ea typeface="나눔고딕코딩" panose="020D0009000000000000" pitchFamily="49" charset="-127"/>
+              </a:rPr>
+              <a:t>    // int open(const char *pathname, int flags);</a:t>
+            </a:r>
+          </a:p>
+          <a:p>
+            <a:r>
+              <a:rPr lang="en-US" altLang="ko-KR" sz="2000" smtClean="0">
+                <a:latin typeface="나눔고딕코딩" panose="020D0009000000000000" pitchFamily="49" charset="-127"/>
+                <a:ea typeface="나눔고딕코딩" panose="020D0009000000000000" pitchFamily="49" charset="-127"/>
+              </a:rPr>
+              <a:t>    int backlight_fd =</a:t>
+            </a:r>
+          </a:p>
+          <a:p>
+            <a:r>
+              <a:rPr lang="en-US" altLang="ko-KR" sz="2000" smtClean="0">
+                <a:latin typeface="나눔고딕코딩" panose="020D0009000000000000" pitchFamily="49" charset="-127"/>
+                <a:ea typeface="나눔고딕코딩" panose="020D0009000000000000" pitchFamily="49" charset="-127"/>
+              </a:rPr>
+              <a:t>        open("/sys/class/backlight/tegra-dsi-backlight.0/brightness", O_RDWR);</a:t>
+            </a:r>
+          </a:p>
+          <a:p>
+            <a:r>
+              <a:rPr lang="en-US" altLang="ko-KR" sz="2000" smtClean="0">
+                <a:latin typeface="나눔고딕코딩" panose="020D0009000000000000" pitchFamily="49" charset="-127"/>
+                <a:ea typeface="나눔고딕코딩" panose="020D0009000000000000" pitchFamily="49" charset="-127"/>
+              </a:rPr>
+              <a:t>    if (backlight_fd &lt; 0)</a:t>
+            </a:r>
+          </a:p>
+          <a:p>
+            <a:r>
+              <a:rPr lang="en-US" altLang="ko-KR" sz="2000" smtClean="0">
+                <a:latin typeface="나눔고딕코딩" panose="020D0009000000000000" pitchFamily="49" charset="-127"/>
+                <a:ea typeface="나눔고딕코딩" panose="020D0009000000000000" pitchFamily="49" charset="-127"/>
+              </a:rPr>
+              <a:t>        return;</a:t>
+            </a:r>
+          </a:p>
+          <a:p>
+            <a:endParaRPr lang="en-US" altLang="ko-KR" sz="2000" smtClean="0">
+              <a:latin typeface="나눔고딕코딩" panose="020D0009000000000000" pitchFamily="49" charset="-127"/>
+              <a:ea typeface="나눔고딕코딩" panose="020D0009000000000000" pitchFamily="49" charset="-127"/>
+            </a:endParaRPr>
+          </a:p>
+          <a:p>
+            <a:r>
+              <a:rPr lang="en-US" altLang="ko-KR" sz="2000" smtClean="0">
+                <a:latin typeface="나눔고딕코딩" panose="020D0009000000000000" pitchFamily="49" charset="-127"/>
+                <a:ea typeface="나눔고딕코딩" panose="020D0009000000000000" pitchFamily="49" charset="-127"/>
+              </a:rPr>
+              <a:t>    char buff[10];  // application buffer</a:t>
+            </a:r>
+          </a:p>
+          <a:p>
+            <a:r>
+              <a:rPr lang="en-US" altLang="ko-KR" sz="2000" smtClean="0">
+                <a:latin typeface="나눔고딕코딩" panose="020D0009000000000000" pitchFamily="49" charset="-127"/>
+                <a:ea typeface="나눔고딕코딩" panose="020D0009000000000000" pitchFamily="49" charset="-127"/>
+              </a:rPr>
+              <a:t>    // int sprintf(char *str, const char *format, ...);</a:t>
+            </a:r>
+          </a:p>
+          <a:p>
+            <a:r>
+              <a:rPr lang="en-US" altLang="ko-KR" sz="2000" smtClean="0">
+                <a:latin typeface="나눔고딕코딩" panose="020D0009000000000000" pitchFamily="49" charset="-127"/>
+                <a:ea typeface="나눔고딕코딩" panose="020D0009000000000000" pitchFamily="49" charset="-127"/>
+              </a:rPr>
+              <a:t>    sprintf(buff, "%d", brightness);</a:t>
+            </a:r>
+          </a:p>
+          <a:p>
+            <a:r>
+              <a:rPr lang="en-US" altLang="ko-KR" sz="2000" smtClean="0">
+                <a:latin typeface="나눔고딕코딩" panose="020D0009000000000000" pitchFamily="49" charset="-127"/>
+                <a:ea typeface="나눔고딕코딩" panose="020D0009000000000000" pitchFamily="49" charset="-127"/>
+              </a:rPr>
+              <a:t>    write(backlight_fd, buff, strlen(buff));</a:t>
+            </a:r>
+          </a:p>
+          <a:p>
+            <a:endParaRPr lang="en-US" altLang="ko-KR" sz="2000" smtClean="0">
+              <a:latin typeface="나눔고딕코딩" panose="020D0009000000000000" pitchFamily="49" charset="-127"/>
+              <a:ea typeface="나눔고딕코딩" panose="020D0009000000000000" pitchFamily="49" charset="-127"/>
+            </a:endParaRPr>
+          </a:p>
+          <a:p>
+            <a:r>
+              <a:rPr lang="en-US" altLang="ko-KR" sz="2000" smtClean="0">
+                <a:latin typeface="나눔고딕코딩" panose="020D0009000000000000" pitchFamily="49" charset="-127"/>
+                <a:ea typeface="나눔고딕코딩" panose="020D0009000000000000" pitchFamily="49" charset="-127"/>
+              </a:rPr>
+              <a:t>    close(backlight_fd);</a:t>
+            </a:r>
+          </a:p>
+          <a:p>
+            <a:r>
+              <a:rPr lang="en-US" altLang="ko-KR" sz="2000" smtClean="0">
+                <a:latin typeface="나눔고딕코딩" panose="020D0009000000000000" pitchFamily="49" charset="-127"/>
+                <a:ea typeface="나눔고딕코딩" panose="020D0009000000000000" pitchFamily="49" charset="-127"/>
+              </a:rPr>
+              <a:t>}</a:t>
+            </a:r>
+            <a:endParaRPr lang="ko-KR" altLang="en-US" sz="2000" smtClean="0">
+              <a:latin typeface="나눔고딕코딩" panose="020D0009000000000000" pitchFamily="49" charset="-127"/>
+              <a:ea typeface="나눔고딕코딩" panose="020D0009000000000000" pitchFamily="49" charset="-127"/>
+            </a:endParaRPr>
+          </a:p>
+        </p:txBody>
+      </p:sp>
+      <p:sp>
+        <p:nvSpPr>
+          <p:cNvPr id="5" name="TextBox 4"/>
+          <p:cNvSpPr txBox="1"/>
+          <p:nvPr/>
+        </p:nvSpPr>
+        <p:spPr>
+          <a:xfrm>
+            <a:off x="318053" y="318053"/>
+            <a:ext cx="1210588" cy="400110"/>
+          </a:xfrm>
+          <a:prstGeom prst="rect">
+            <a:avLst/>
+          </a:prstGeom>
+          <a:noFill/>
+        </p:spPr>
+        <p:txBody>
+          <a:bodyPr wrap="none" rtlCol="0">
+            <a:spAutoFit/>
+          </a:bodyPr>
+          <a:lstStyle/>
+          <a:p>
+            <a:r>
+              <a:rPr lang="en-US" altLang="ko-KR" sz="2000" smtClean="0">
+                <a:latin typeface="나눔고딕코딩" panose="020D0009000000000000" pitchFamily="49" charset="-127"/>
+                <a:ea typeface="나눔고딕코딩" panose="020D0009000000000000" pitchFamily="49" charset="-127"/>
+              </a:rPr>
+              <a:t>JNI </a:t>
+            </a:r>
+            <a:r>
+              <a:rPr lang="ko-KR" altLang="en-US" sz="2000" smtClean="0">
+                <a:latin typeface="나눔고딕코딩" panose="020D0009000000000000" pitchFamily="49" charset="-127"/>
+                <a:ea typeface="나눔고딕코딩" panose="020D0009000000000000" pitchFamily="49" charset="-127"/>
+              </a:rPr>
+              <a:t>코드</a:t>
+            </a:r>
+          </a:p>
+        </p:txBody>
+      </p:sp>
+    </p:spTree>
+    <p:extLst>
+      <p:ext uri="{BB962C8B-B14F-4D97-AF65-F5344CB8AC3E}">
+        <p14:creationId xmlns:p14="http://schemas.microsoft.com/office/powerpoint/2010/main" val="1920406241"/>
+      </p:ext>
+    </p:extLst>
+  </p:cSld>
+  <p:clrMapOvr>
+    <a:masterClrMapping/>
+  </p:clrMapOvr>
+</p:sld>
+</file>
+
+<file path=ppt/slides/slide9.xml><?xml version="1.0" encoding="utf-8"?>
+<p:sld xmlns:a="http://schemas.openxmlformats.org/drawingml/2006/main" xmlns:r="http://schemas.openxmlformats.org/officeDocument/2006/relationships" xmlns:p="http://schemas.openxmlformats.org/presentationml/2006/main">
+  <p:cSld>
+    <p:spTree>
+      <p:nvGrpSpPr>
+        <p:cNvPr id="1" name=""/>
+        <p:cNvGrpSpPr/>
+        <p:nvPr/>
+      </p:nvGrpSpPr>
+      <p:grpSpPr>
+        <a:xfrm>
+          <a:off x="0" y="0"/>
+          <a:ext cx="0" cy="0"/>
+          <a:chOff x="0" y="0"/>
+          <a:chExt cx="0" cy="0"/>
+        </a:xfrm>
+      </p:grpSpPr>
+      <p:sp>
+        <p:nvSpPr>
+          <p:cNvPr id="4" name="TextBox 3"/>
+          <p:cNvSpPr txBox="1"/>
+          <p:nvPr/>
+        </p:nvSpPr>
+        <p:spPr>
+          <a:xfrm>
+            <a:off x="209232" y="298174"/>
+            <a:ext cx="11982768" cy="2554545"/>
+          </a:xfrm>
+          <a:prstGeom prst="rect">
+            <a:avLst/>
+          </a:prstGeom>
+          <a:noFill/>
+        </p:spPr>
+        <p:txBody>
+          <a:bodyPr wrap="none" rtlCol="0">
+            <a:spAutoFit/>
+          </a:bodyPr>
+          <a:lstStyle/>
+          <a:p>
+            <a:r>
+              <a:rPr lang="en-US" altLang="ko-KR" sz="2000" smtClean="0">
+                <a:latin typeface="나눔고딕코딩" panose="020D0009000000000000" pitchFamily="49" charset="-127"/>
+                <a:ea typeface="나눔고딕코딩" panose="020D0009000000000000" pitchFamily="49" charset="-127"/>
+              </a:rPr>
+              <a:t>&lt; PDK / NDK &gt;</a:t>
+            </a:r>
+          </a:p>
+          <a:p>
+            <a:endParaRPr lang="en-US" altLang="ko-KR" sz="2000">
+              <a:latin typeface="나눔고딕코딩" panose="020D0009000000000000" pitchFamily="49" charset="-127"/>
+              <a:ea typeface="나눔고딕코딩" panose="020D0009000000000000" pitchFamily="49" charset="-127"/>
+            </a:endParaRPr>
+          </a:p>
+          <a:p>
+            <a:r>
+              <a:rPr lang="en-US" altLang="ko-KR" sz="2000" smtClean="0">
+                <a:latin typeface="나눔고딕코딩" panose="020D0009000000000000" pitchFamily="49" charset="-127"/>
+                <a:ea typeface="나눔고딕코딩" panose="020D0009000000000000" pitchFamily="49" charset="-127"/>
+              </a:rPr>
+              <a:t>PDK(Platform Development Kit): </a:t>
+            </a:r>
+            <a:r>
+              <a:rPr lang="ko-KR" altLang="en-US" sz="2000" smtClean="0">
+                <a:latin typeface="나눔고딕코딩" panose="020D0009000000000000" pitchFamily="49" charset="-127"/>
+                <a:ea typeface="나눔고딕코딩" panose="020D0009000000000000" pitchFamily="49" charset="-127"/>
+              </a:rPr>
+              <a:t>개발 도구</a:t>
+            </a:r>
+            <a:r>
+              <a:rPr lang="en-US" altLang="ko-KR" sz="2000" smtClean="0">
+                <a:latin typeface="나눔고딕코딩" panose="020D0009000000000000" pitchFamily="49" charset="-127"/>
+                <a:ea typeface="나눔고딕코딩" panose="020D0009000000000000" pitchFamily="49" charset="-127"/>
+              </a:rPr>
+              <a:t>(</a:t>
+            </a:r>
+            <a:r>
+              <a:rPr lang="ko-KR" altLang="en-US" sz="2000" smtClean="0">
+                <a:latin typeface="나눔고딕코딩" panose="020D0009000000000000" pitchFamily="49" charset="-127"/>
+                <a:ea typeface="나눔고딕코딩" panose="020D0009000000000000" pitchFamily="49" charset="-127"/>
+              </a:rPr>
+              <a:t>크로스 컴파일러 툴 체인 포함</a:t>
+            </a:r>
+            <a:r>
+              <a:rPr lang="en-US" altLang="ko-KR" sz="2000" smtClean="0">
+                <a:latin typeface="나눔고딕코딩" panose="020D0009000000000000" pitchFamily="49" charset="-127"/>
+                <a:ea typeface="나눔고딕코딩" panose="020D0009000000000000" pitchFamily="49" charset="-127"/>
+              </a:rPr>
+              <a:t>), </a:t>
+            </a:r>
+            <a:r>
+              <a:rPr lang="ko-KR" altLang="en-US" sz="2000" smtClean="0">
+                <a:latin typeface="나눔고딕코딩" panose="020D0009000000000000" pitchFamily="49" charset="-127"/>
+                <a:ea typeface="나눔고딕코딩" panose="020D0009000000000000" pitchFamily="49" charset="-127"/>
+              </a:rPr>
+              <a:t>전체 소스 코드 사용</a:t>
+            </a:r>
+            <a:endParaRPr lang="en-US" altLang="ko-KR" sz="2000" smtClean="0">
+              <a:latin typeface="나눔고딕코딩" panose="020D0009000000000000" pitchFamily="49" charset="-127"/>
+              <a:ea typeface="나눔고딕코딩" panose="020D0009000000000000" pitchFamily="49" charset="-127"/>
+            </a:endParaRPr>
+          </a:p>
+          <a:p>
+            <a:r>
+              <a:rPr lang="en-US" altLang="ko-KR" sz="2000" smtClean="0">
+                <a:latin typeface="나눔고딕코딩" panose="020D0009000000000000" pitchFamily="49" charset="-127"/>
+                <a:ea typeface="나눔고딕코딩" panose="020D0009000000000000" pitchFamily="49" charset="-127"/>
+              </a:rPr>
+              <a:t>NDK(Native Development Kit): </a:t>
+            </a:r>
+            <a:r>
+              <a:rPr lang="ko-KR" altLang="en-US" sz="2000" smtClean="0">
+                <a:latin typeface="나눔고딕코딩" panose="020D0009000000000000" pitchFamily="49" charset="-127"/>
+                <a:ea typeface="나눔고딕코딩" panose="020D0009000000000000" pitchFamily="49" charset="-127"/>
+              </a:rPr>
+              <a:t>개발 도구</a:t>
+            </a:r>
+            <a:r>
+              <a:rPr lang="en-US" altLang="ko-KR" sz="2000" smtClean="0">
+                <a:latin typeface="나눔고딕코딩" panose="020D0009000000000000" pitchFamily="49" charset="-127"/>
+                <a:ea typeface="나눔고딕코딩" panose="020D0009000000000000" pitchFamily="49" charset="-127"/>
+              </a:rPr>
+              <a:t>(</a:t>
+            </a:r>
+            <a:r>
+              <a:rPr lang="ko-KR" altLang="en-US" sz="2000" smtClean="0">
+                <a:latin typeface="나눔고딕코딩" panose="020D0009000000000000" pitchFamily="49" charset="-127"/>
+                <a:ea typeface="나눔고딕코딩" panose="020D0009000000000000" pitchFamily="49" charset="-127"/>
+              </a:rPr>
+              <a:t>크로스 컴파일러 툴 체인 포함</a:t>
+            </a:r>
+            <a:r>
+              <a:rPr lang="en-US" altLang="ko-KR" sz="2000" smtClean="0">
+                <a:latin typeface="나눔고딕코딩" panose="020D0009000000000000" pitchFamily="49" charset="-127"/>
+                <a:ea typeface="나눔고딕코딩" panose="020D0009000000000000" pitchFamily="49" charset="-127"/>
+              </a:rPr>
+              <a:t>), </a:t>
+            </a:r>
+            <a:r>
+              <a:rPr lang="ko-KR" altLang="en-US" sz="2000" smtClean="0">
+                <a:latin typeface="나눔고딕코딩" panose="020D0009000000000000" pitchFamily="49" charset="-127"/>
+                <a:ea typeface="나눔고딕코딩" panose="020D0009000000000000" pitchFamily="49" charset="-127"/>
+              </a:rPr>
+              <a:t>공유 라이브러리를 사용</a:t>
+            </a:r>
+            <a:endParaRPr lang="en-US" altLang="ko-KR" sz="2000" smtClean="0">
+              <a:latin typeface="나눔고딕코딩" panose="020D0009000000000000" pitchFamily="49" charset="-127"/>
+              <a:ea typeface="나눔고딕코딩" panose="020D0009000000000000" pitchFamily="49" charset="-127"/>
+            </a:endParaRPr>
+          </a:p>
+          <a:p>
+            <a:r>
+              <a:rPr lang="en-US" altLang="ko-KR" sz="2000" smtClean="0">
+                <a:latin typeface="나눔고딕코딩" panose="020D0009000000000000" pitchFamily="49" charset="-127"/>
+                <a:ea typeface="나눔고딕코딩" panose="020D0009000000000000" pitchFamily="49" charset="-127"/>
+              </a:rPr>
+              <a:t>  </a:t>
+            </a:r>
+            <a:r>
+              <a:rPr lang="ko-KR" altLang="en-US" sz="2000" smtClean="0">
+                <a:latin typeface="나눔고딕코딩" panose="020D0009000000000000" pitchFamily="49" charset="-127"/>
+                <a:ea typeface="나눔고딕코딩" panose="020D0009000000000000" pitchFamily="49" charset="-127"/>
+              </a:rPr>
+              <a:t>예</a:t>
+            </a:r>
+            <a:r>
+              <a:rPr lang="en-US" altLang="ko-KR" sz="2000" smtClean="0">
+                <a:latin typeface="나눔고딕코딩" panose="020D0009000000000000" pitchFamily="49" charset="-127"/>
+                <a:ea typeface="나눔고딕코딩" panose="020D0009000000000000" pitchFamily="49" charset="-127"/>
+              </a:rPr>
+              <a:t>) ldLibs "log", "jnigraphics", ...</a:t>
+            </a:r>
+          </a:p>
+          <a:p>
+            <a:endParaRPr lang="en-US" altLang="ko-KR" sz="2000">
+              <a:latin typeface="나눔고딕코딩" panose="020D0009000000000000" pitchFamily="49" charset="-127"/>
+              <a:ea typeface="나눔고딕코딩" panose="020D0009000000000000" pitchFamily="49" charset="-127"/>
+            </a:endParaRPr>
+          </a:p>
+          <a:p>
+            <a:r>
+              <a:rPr lang="en-US" altLang="ko-KR" sz="2000" smtClean="0">
+                <a:latin typeface="나눔고딕코딩" panose="020D0009000000000000" pitchFamily="49" charset="-127"/>
+                <a:ea typeface="나눔고딕코딩" panose="020D0009000000000000" pitchFamily="49" charset="-127"/>
+              </a:rPr>
+              <a:t>Android.mk, Application.mk ...</a:t>
+            </a:r>
+            <a:endParaRPr lang="en-US" altLang="ko-KR" sz="2000">
+              <a:latin typeface="나눔고딕코딩" panose="020D0009000000000000" pitchFamily="49" charset="-127"/>
+              <a:ea typeface="나눔고딕코딩" panose="020D0009000000000000" pitchFamily="49" charset="-127"/>
+            </a:endParaRPr>
+          </a:p>
+          <a:p>
+            <a:endParaRPr lang="ko-KR" altLang="en-US" sz="2000" smtClean="0">
+              <a:latin typeface="나눔고딕코딩" panose="020D0009000000000000" pitchFamily="49" charset="-127"/>
+              <a:ea typeface="나눔고딕코딩" panose="020D0009000000000000" pitchFamily="49" charset="-127"/>
+            </a:endParaRPr>
+          </a:p>
+        </p:txBody>
+      </p:sp>
+    </p:spTree>
+    <p:extLst>
+      <p:ext uri="{BB962C8B-B14F-4D97-AF65-F5344CB8AC3E}">
+        <p14:creationId xmlns:p14="http://schemas.microsoft.com/office/powerpoint/2010/main" val="2748848361"/>
       </p:ext>
     </p:extLst>
   </p:cSld>

</xml_diff>